<commit_message>
Padam changes Kramam corr 20/01/2021
</commit_message>
<xml_diff>
--- a/Veda Lectures/Swaram Part 3.pptx
+++ b/Veda Lectures/Swaram Part 3.pptx
@@ -10,6 +10,15 @@
     <p:sldId id="259" r:id="rId4"/>
     <p:sldId id="260" r:id="rId5"/>
     <p:sldId id="258" r:id="rId6"/>
+    <p:sldId id="261" r:id="rId7"/>
+    <p:sldId id="262" r:id="rId8"/>
+    <p:sldId id="263" r:id="rId9"/>
+    <p:sldId id="264" r:id="rId10"/>
+    <p:sldId id="265" r:id="rId11"/>
+    <p:sldId id="266" r:id="rId12"/>
+    <p:sldId id="267" r:id="rId13"/>
+    <p:sldId id="268" r:id="rId14"/>
+    <p:sldId id="269" r:id="rId15"/>
   </p:sldIdLst>
   <p:sldSz cx="12192000" cy="6858000"/>
   <p:notesSz cx="6858000" cy="9144000"/>
@@ -452,7 +461,7 @@
             <a:fld id="{5923F103-BC34-4FE4-A40E-EDDEECFDA5D0}" type="datetimeFigureOut">
               <a:rPr lang="en-US" dirty="0"/>
               <a:pPr/>
-              <a:t>1/11/2021</a:t>
+              <a:t>1/19/2021</a:t>
             </a:fld>
             <a:endParaRPr lang="en-US" dirty="0"/>
           </a:p>
@@ -1540,7 +1549,7 @@
           <a:p>
             <a:fld id="{923A1CC3-2375-41D4-9E03-427CAF2A4C1A}" type="datetimeFigureOut">
               <a:rPr lang="en-US" dirty="0"/>
-              <a:t>1/11/2021</a:t>
+              <a:t>1/19/2021</a:t>
             </a:fld>
             <a:endParaRPr lang="en-US" dirty="0"/>
           </a:p>
@@ -2520,7 +2529,7 @@
           <a:p>
             <a:fld id="{AFF16868-8199-4C2C-A5B1-63AEE139F88E}" type="datetimeFigureOut">
               <a:rPr lang="en-US" dirty="0"/>
-              <a:t>1/11/2021</a:t>
+              <a:t>1/19/2021</a:t>
             </a:fld>
             <a:endParaRPr lang="en-US" dirty="0"/>
           </a:p>
@@ -3654,7 +3663,7 @@
           <a:p>
             <a:fld id="{AAD9FF7F-6988-44CC-821B-644E70CD2F73}" type="datetimeFigureOut">
               <a:rPr lang="en-US" dirty="0"/>
-              <a:t>1/11/2021</a:t>
+              <a:t>1/19/2021</a:t>
             </a:fld>
             <a:endParaRPr lang="en-US" dirty="0"/>
           </a:p>
@@ -4687,7 +4696,7 @@
           <a:p>
             <a:fld id="{5C12C299-16B2-4475-990D-751901EACC14}" type="datetimeFigureOut">
               <a:rPr lang="en-US" dirty="0"/>
-              <a:t>1/11/2021</a:t>
+              <a:t>1/19/2021</a:t>
             </a:fld>
             <a:endParaRPr lang="en-US" dirty="0"/>
           </a:p>
@@ -5347,7 +5356,7 @@
           <a:p>
             <a:fld id="{9FE86839-B9D8-4651-8783-F325ECE74E65}" type="datetimeFigureOut">
               <a:rPr lang="en-US" dirty="0"/>
-              <a:t>1/11/2021</a:t>
+              <a:t>1/19/2021</a:t>
             </a:fld>
             <a:endParaRPr lang="en-US" dirty="0"/>
           </a:p>
@@ -6208,7 +6217,7 @@
           <a:p>
             <a:fld id="{FD484F64-32F6-45C5-931F-ADC1662401D0}" type="datetimeFigureOut">
               <a:rPr lang="en-US" dirty="0"/>
-              <a:t>1/11/2021</a:t>
+              <a:t>1/19/2021</a:t>
             </a:fld>
             <a:endParaRPr lang="en-US" dirty="0"/>
           </a:p>
@@ -6398,7 +6407,7 @@
           <a:p>
             <a:fld id="{53086D93-FCAC-47E0-A2EE-787E62CA814C}" type="datetimeFigureOut">
               <a:rPr lang="en-US" dirty="0"/>
-              <a:t>1/11/2021</a:t>
+              <a:t>1/19/2021</a:t>
             </a:fld>
             <a:endParaRPr lang="en-US" dirty="0"/>
           </a:p>
@@ -7370,7 +7379,7 @@
           <a:p>
             <a:fld id="{CDA879A6-0FD0-4734-A311-86BFCA472E6E}" type="datetimeFigureOut">
               <a:rPr lang="en-US" dirty="0"/>
-              <a:t>1/11/2021</a:t>
+              <a:t>1/19/2021</a:t>
             </a:fld>
             <a:endParaRPr lang="en-US" dirty="0"/>
           </a:p>
@@ -7581,7 +7590,7 @@
           <a:p>
             <a:fld id="{19C9CA7B-DFD4-44B5-8C60-D14B8CD1FB59}" type="datetimeFigureOut">
               <a:rPr lang="en-US" dirty="0"/>
-              <a:t>1/11/2021</a:t>
+              <a:t>1/19/2021</a:t>
             </a:fld>
             <a:endParaRPr lang="en-US" dirty="0"/>
           </a:p>
@@ -8615,7 +8624,7 @@
           <a:p>
             <a:fld id="{F34E6425-0181-43F2-84FC-787E803FD2F8}" type="datetimeFigureOut">
               <a:rPr lang="en-US" dirty="0"/>
-              <a:t>1/11/2021</a:t>
+              <a:t>1/19/2021</a:t>
             </a:fld>
             <a:endParaRPr lang="en-US" dirty="0"/>
           </a:p>
@@ -8887,7 +8896,7 @@
           <a:p>
             <a:fld id="{3BDB8791-F1B0-41E7-B7FD-A781E65C4266}" type="datetimeFigureOut">
               <a:rPr lang="en-US" dirty="0"/>
-              <a:t>1/11/2021</a:t>
+              <a:t>1/19/2021</a:t>
             </a:fld>
             <a:endParaRPr lang="en-US" dirty="0"/>
           </a:p>
@@ -9297,7 +9306,7 @@
           <a:p>
             <a:fld id="{5FDD63B2-E120-4ED8-B27B-C685F510A5FE}" type="datetimeFigureOut">
               <a:rPr lang="en-US" dirty="0"/>
-              <a:t>1/11/2021</a:t>
+              <a:t>1/19/2021</a:t>
             </a:fld>
             <a:endParaRPr lang="en-US" dirty="0"/>
           </a:p>
@@ -9424,7 +9433,7 @@
           <a:p>
             <a:fld id="{7AA18ACC-A947-437B-A130-35BD54FDF1E9}" type="datetimeFigureOut">
               <a:rPr lang="en-US" dirty="0"/>
-              <a:t>1/11/2021</a:t>
+              <a:t>1/19/2021</a:t>
             </a:fld>
             <a:endParaRPr lang="en-US" dirty="0"/>
           </a:p>
@@ -9519,7 +9528,7 @@
           <a:p>
             <a:fld id="{7C8D7E02-BCB8-4D50-A234-369438C08659}" type="datetimeFigureOut">
               <a:rPr lang="en-US" dirty="0"/>
-              <a:t>1/11/2021</a:t>
+              <a:t>1/19/2021</a:t>
             </a:fld>
             <a:endParaRPr lang="en-US" dirty="0"/>
           </a:p>
@@ -10600,7 +10609,7 @@
           <a:p>
             <a:fld id="{76E86A4C-8E40-4F87-A4F0-01A0687C5742}" type="datetimeFigureOut">
               <a:rPr lang="en-US" dirty="0"/>
-              <a:t>1/11/2021</a:t>
+              <a:t>1/19/2021</a:t>
             </a:fld>
             <a:endParaRPr lang="en-US" dirty="0"/>
           </a:p>
@@ -11708,7 +11717,7 @@
           <a:p>
             <a:fld id="{35E72C73-2D91-4E12-BA25-F0AA0C03599B}" type="datetimeFigureOut">
               <a:rPr lang="en-US" dirty="0"/>
-              <a:t>1/11/2021</a:t>
+              <a:t>1/19/2021</a:t>
             </a:fld>
             <a:endParaRPr lang="en-US" dirty="0"/>
           </a:p>
@@ -12705,7 +12714,7 @@
           <a:p>
             <a:fld id="{2BE451C3-0FF4-47C4-B829-773ADF60F88C}" type="datetimeFigureOut">
               <a:rPr lang="en-US" dirty="0"/>
-              <a:t>1/11/2021</a:t>
+              <a:t>1/19/2021</a:t>
             </a:fld>
             <a:endParaRPr lang="en-US" dirty="0"/>
           </a:p>
@@ -13281,12 +13290,8 @@
           <a:lstStyle/>
           <a:p>
             <a:r>
-              <a:rPr lang="en-US" dirty="0" err="1" smtClean="0"/>
-              <a:t>Swaram</a:t>
-            </a:r>
-            <a:r>
               <a:rPr lang="en-US" dirty="0" smtClean="0"/>
-              <a:t> Part 3</a:t>
+              <a:t>Swaram Part 3 onwards</a:t>
             </a:r>
             <a:endParaRPr lang="en-US" dirty="0"/>
           </a:p>
@@ -13319,6 +13324,1269 @@
     <p:extLst>
       <p:ext uri="{BB962C8B-B14F-4D97-AF65-F5344CB8AC3E}">
         <p14:creationId xmlns:p14="http://schemas.microsoft.com/office/powerpoint/2010/main" val="1275597405"/>
+      </p:ext>
+    </p:extLst>
+  </p:cSld>
+  <p:clrMapOvr>
+    <a:masterClrMapping/>
+  </p:clrMapOvr>
+  <p:timing>
+    <p:tnLst>
+      <p:par>
+        <p:cTn id="1" dur="indefinite" restart="never" nodeType="tmRoot"/>
+      </p:par>
+    </p:tnLst>
+  </p:timing>
+</p:sld>
+</file>
+
+<file path=ppt/slides/slide10.xml><?xml version="1.0" encoding="utf-8"?>
+<p:sld xmlns:a="http://schemas.openxmlformats.org/drawingml/2006/main" xmlns:r="http://schemas.openxmlformats.org/officeDocument/2006/relationships" xmlns:p="http://schemas.openxmlformats.org/presentationml/2006/main">
+  <p:cSld>
+    <p:spTree>
+      <p:nvGrpSpPr>
+        <p:cNvPr id="1" name=""/>
+        <p:cNvGrpSpPr/>
+        <p:nvPr/>
+      </p:nvGrpSpPr>
+      <p:grpSpPr>
+        <a:xfrm>
+          <a:off x="0" y="0"/>
+          <a:ext cx="0" cy="0"/>
+          <a:chOff x="0" y="0"/>
+          <a:chExt cx="0" cy="0"/>
+        </a:xfrm>
+      </p:grpSpPr>
+      <p:sp>
+        <p:nvSpPr>
+          <p:cNvPr id="2" name="Title 1"/>
+          <p:cNvSpPr>
+            <a:spLocks noGrp="1"/>
+          </p:cNvSpPr>
+          <p:nvPr>
+            <p:ph type="title"/>
+          </p:nvPr>
+        </p:nvSpPr>
+        <p:spPr>
+          <a:xfrm>
+            <a:off x="1154954" y="973668"/>
+            <a:ext cx="8825659" cy="1072846"/>
+          </a:xfrm>
+        </p:spPr>
+        <p:txBody>
+          <a:bodyPr/>
+          <a:lstStyle/>
+          <a:p>
+            <a:r>
+              <a:rPr lang="en-US" dirty="0" smtClean="0"/>
+              <a:t>Special Padams/Words –Swaritam followed by anudAttam</a:t>
+            </a:r>
+            <a:endParaRPr lang="en-US" dirty="0"/>
+          </a:p>
+        </p:txBody>
+      </p:sp>
+      <p:sp>
+        <p:nvSpPr>
+          <p:cNvPr id="3" name="Content Placeholder 2"/>
+          <p:cNvSpPr>
+            <a:spLocks noGrp="1"/>
+          </p:cNvSpPr>
+          <p:nvPr>
+            <p:ph idx="1"/>
+          </p:nvPr>
+        </p:nvSpPr>
+        <p:spPr/>
+        <p:txBody>
+          <a:bodyPr>
+            <a:normAutofit fontScale="92500" lnSpcReduction="20000"/>
+          </a:bodyPr>
+          <a:lstStyle/>
+          <a:p>
+            <a:r>
+              <a:rPr lang="en-US" sz="2800" b="1" dirty="0" smtClean="0">
+                <a:latin typeface="Arial" panose="020B0604020202020204" pitchFamily="34" charset="0"/>
+                <a:cs typeface="Arial" panose="020B0604020202020204" pitchFamily="34" charset="0"/>
+              </a:rPr>
+              <a:t>Special padams</a:t>
+            </a:r>
+          </a:p>
+          <a:p>
+            <a:pPr lvl="1"/>
+            <a:r>
+              <a:rPr lang="en-US" sz="2600" b="1" dirty="0" err="1" smtClean="0">
+                <a:latin typeface="Arial" panose="020B0604020202020204" pitchFamily="34" charset="0"/>
+                <a:cs typeface="Arial" panose="020B0604020202020204" pitchFamily="34" charset="0"/>
+              </a:rPr>
+              <a:t>SaravyA</a:t>
+            </a:r>
+            <a:r>
+              <a:rPr lang="en-US" sz="2600" b="1" dirty="0" smtClean="0">
+                <a:latin typeface="Arial" panose="020B0604020202020204" pitchFamily="34" charset="0"/>
+                <a:cs typeface="Arial" panose="020B0604020202020204" pitchFamily="34" charset="0"/>
+              </a:rPr>
+              <a:t>, </a:t>
+            </a:r>
+            <a:r>
+              <a:rPr lang="en-US" sz="2600" b="1" dirty="0" err="1" smtClean="0">
+                <a:latin typeface="Arial" panose="020B0604020202020204" pitchFamily="34" charset="0"/>
+                <a:cs typeface="Arial" panose="020B0604020202020204" pitchFamily="34" charset="0"/>
+              </a:rPr>
+              <a:t>yAdudhAnya</a:t>
+            </a:r>
+            <a:r>
+              <a:rPr lang="en-US" sz="2600" b="1" dirty="0" smtClean="0">
+                <a:latin typeface="Arial" panose="020B0604020202020204" pitchFamily="34" charset="0"/>
+                <a:cs typeface="Arial" panose="020B0604020202020204" pitchFamily="34" charset="0"/>
+              </a:rPr>
+              <a:t>, </a:t>
+            </a:r>
+            <a:r>
+              <a:rPr lang="en-US" sz="2600" b="1" dirty="0" err="1" smtClean="0">
+                <a:latin typeface="Arial" panose="020B0604020202020204" pitchFamily="34" charset="0"/>
+                <a:cs typeface="Arial" panose="020B0604020202020204" pitchFamily="34" charset="0"/>
+              </a:rPr>
+              <a:t>manuShyA</a:t>
+            </a:r>
+            <a:endParaRPr lang="en-US" sz="2600" b="1" dirty="0" smtClean="0">
+              <a:latin typeface="Arial" panose="020B0604020202020204" pitchFamily="34" charset="0"/>
+              <a:cs typeface="Arial" panose="020B0604020202020204" pitchFamily="34" charset="0"/>
+            </a:endParaRPr>
+          </a:p>
+          <a:p>
+            <a:pPr lvl="1"/>
+            <a:r>
+              <a:rPr lang="en-US" sz="2600" b="1" dirty="0" smtClean="0">
+                <a:latin typeface="Arial" panose="020B0604020202020204" pitchFamily="34" charset="0"/>
+                <a:cs typeface="Arial" panose="020B0604020202020204" pitchFamily="34" charset="0"/>
+              </a:rPr>
+              <a:t>Does not give up its position – obstinate Swaram</a:t>
+            </a:r>
+          </a:p>
+          <a:p>
+            <a:pPr lvl="1"/>
+            <a:r>
+              <a:rPr lang="en-US" sz="2600" b="1" dirty="0" smtClean="0">
+                <a:latin typeface="Arial" panose="020B0604020202020204" pitchFamily="34" charset="0"/>
+                <a:cs typeface="Arial" panose="020B0604020202020204" pitchFamily="34" charset="0"/>
+              </a:rPr>
+              <a:t>Normally referred as “</a:t>
+            </a:r>
+            <a:r>
+              <a:rPr lang="en-US" sz="2600" b="1" dirty="0" err="1" smtClean="0">
+                <a:latin typeface="Arial" panose="020B0604020202020204" pitchFamily="34" charset="0"/>
+                <a:cs typeface="Arial" panose="020B0604020202020204" pitchFamily="34" charset="0"/>
+              </a:rPr>
+              <a:t>nitya</a:t>
+            </a:r>
+            <a:r>
+              <a:rPr lang="en-US" sz="2600" b="1" dirty="0" smtClean="0">
+                <a:latin typeface="Arial" panose="020B0604020202020204" pitchFamily="34" charset="0"/>
+                <a:cs typeface="Arial" panose="020B0604020202020204" pitchFamily="34" charset="0"/>
+              </a:rPr>
+              <a:t>” </a:t>
+            </a:r>
+            <a:r>
+              <a:rPr lang="en-US" sz="2600" b="1" dirty="0" err="1" smtClean="0">
+                <a:latin typeface="Arial" panose="020B0604020202020204" pitchFamily="34" charset="0"/>
+                <a:cs typeface="Arial" panose="020B0604020202020204" pitchFamily="34" charset="0"/>
+              </a:rPr>
+              <a:t>swaram</a:t>
+            </a:r>
+            <a:endParaRPr lang="en-US" sz="2600" b="1" dirty="0" smtClean="0">
+              <a:latin typeface="Arial" panose="020B0604020202020204" pitchFamily="34" charset="0"/>
+              <a:cs typeface="Arial" panose="020B0604020202020204" pitchFamily="34" charset="0"/>
+            </a:endParaRPr>
+          </a:p>
+          <a:p>
+            <a:r>
+              <a:rPr lang="en-US" sz="2800" b="1" dirty="0" smtClean="0">
+                <a:latin typeface="Arial" panose="020B0604020202020204" pitchFamily="34" charset="0"/>
+                <a:cs typeface="Arial" panose="020B0604020202020204" pitchFamily="34" charset="0"/>
+              </a:rPr>
+              <a:t>Occurs with conjunct consonants of y, v, l</a:t>
+            </a:r>
+          </a:p>
+          <a:p>
+            <a:r>
+              <a:rPr lang="en-US" sz="2800" b="1" dirty="0" smtClean="0">
+                <a:latin typeface="Arial" panose="020B0604020202020204" pitchFamily="34" charset="0"/>
+                <a:cs typeface="Arial" panose="020B0604020202020204" pitchFamily="34" charset="0"/>
+              </a:rPr>
+              <a:t>Also due to Sandhi while combining Padams</a:t>
+            </a:r>
+          </a:p>
+          <a:p>
+            <a:r>
+              <a:rPr lang="en-US" sz="2800" b="1" dirty="0" smtClean="0">
+                <a:latin typeface="Arial" panose="020B0604020202020204" pitchFamily="34" charset="0"/>
+                <a:cs typeface="Arial" panose="020B0604020202020204" pitchFamily="34" charset="0"/>
+              </a:rPr>
+              <a:t>Special Swaritams and formations will be handled in a later session</a:t>
+            </a:r>
+            <a:endParaRPr lang="en-US" sz="2800" b="1" dirty="0">
+              <a:latin typeface="Arial" panose="020B0604020202020204" pitchFamily="34" charset="0"/>
+              <a:cs typeface="Arial" panose="020B0604020202020204" pitchFamily="34" charset="0"/>
+            </a:endParaRPr>
+          </a:p>
+        </p:txBody>
+      </p:sp>
+    </p:spTree>
+    <p:extLst>
+      <p:ext uri="{BB962C8B-B14F-4D97-AF65-F5344CB8AC3E}">
+        <p14:creationId xmlns:p14="http://schemas.microsoft.com/office/powerpoint/2010/main" val="2019439943"/>
+      </p:ext>
+    </p:extLst>
+  </p:cSld>
+  <p:clrMapOvr>
+    <a:masterClrMapping/>
+  </p:clrMapOvr>
+  <p:timing>
+    <p:tnLst>
+      <p:par>
+        <p:cTn id="1" dur="indefinite" restart="never" nodeType="tmRoot"/>
+      </p:par>
+    </p:tnLst>
+  </p:timing>
+</p:sld>
+</file>
+
+<file path=ppt/slides/slide11.xml><?xml version="1.0" encoding="utf-8"?>
+<p:sld xmlns:a="http://schemas.openxmlformats.org/drawingml/2006/main" xmlns:r="http://schemas.openxmlformats.org/officeDocument/2006/relationships" xmlns:p="http://schemas.openxmlformats.org/presentationml/2006/main">
+  <p:cSld>
+    <p:spTree>
+      <p:nvGrpSpPr>
+        <p:cNvPr id="1" name=""/>
+        <p:cNvGrpSpPr/>
+        <p:nvPr/>
+      </p:nvGrpSpPr>
+      <p:grpSpPr>
+        <a:xfrm>
+          <a:off x="0" y="0"/>
+          <a:ext cx="0" cy="0"/>
+          <a:chOff x="0" y="0"/>
+          <a:chExt cx="0" cy="0"/>
+        </a:xfrm>
+      </p:grpSpPr>
+      <p:sp>
+        <p:nvSpPr>
+          <p:cNvPr id="2" name="Title 1"/>
+          <p:cNvSpPr>
+            <a:spLocks noGrp="1"/>
+          </p:cNvSpPr>
+          <p:nvPr>
+            <p:ph type="title"/>
+          </p:nvPr>
+        </p:nvSpPr>
+        <p:spPr>
+          <a:xfrm>
+            <a:off x="1154954" y="973668"/>
+            <a:ext cx="8825659" cy="1072846"/>
+          </a:xfrm>
+        </p:spPr>
+        <p:txBody>
+          <a:bodyPr/>
+          <a:lstStyle/>
+          <a:p>
+            <a:r>
+              <a:rPr lang="en-US" dirty="0" smtClean="0"/>
+              <a:t>Some key Swaram Rules</a:t>
+            </a:r>
+            <a:endParaRPr lang="en-US" dirty="0"/>
+          </a:p>
+        </p:txBody>
+      </p:sp>
+      <p:sp>
+        <p:nvSpPr>
+          <p:cNvPr id="3" name="Content Placeholder 2"/>
+          <p:cNvSpPr>
+            <a:spLocks noGrp="1"/>
+          </p:cNvSpPr>
+          <p:nvPr>
+            <p:ph idx="1"/>
+          </p:nvPr>
+        </p:nvSpPr>
+        <p:spPr/>
+        <p:txBody>
+          <a:bodyPr>
+            <a:normAutofit lnSpcReduction="10000"/>
+          </a:bodyPr>
+          <a:lstStyle/>
+          <a:p>
+            <a:r>
+              <a:rPr lang="en-US" sz="2800" b="1" dirty="0" smtClean="0">
+                <a:latin typeface="Arial" panose="020B0604020202020204" pitchFamily="34" charset="0"/>
+                <a:cs typeface="Arial" panose="020B0604020202020204" pitchFamily="34" charset="0"/>
+              </a:rPr>
+              <a:t>The first letter of a vAkyam can be a Swaritam if formed due to Swaritam rules or combining Padams</a:t>
+            </a:r>
+          </a:p>
+          <a:p>
+            <a:pPr lvl="1"/>
+            <a:r>
+              <a:rPr lang="en-US" sz="2600" b="1" dirty="0" err="1" smtClean="0">
+                <a:solidFill>
+                  <a:srgbClr val="FF0000"/>
+                </a:solidFill>
+                <a:latin typeface="Arial" panose="020B0604020202020204" pitchFamily="34" charset="0"/>
+                <a:cs typeface="Arial" panose="020B0604020202020204" pitchFamily="34" charset="0"/>
+              </a:rPr>
+              <a:t>Try</a:t>
+            </a:r>
+            <a:r>
+              <a:rPr lang="en-US" sz="2600" b="1" dirty="0" err="1" smtClean="0">
+                <a:latin typeface="Arial" panose="020B0604020202020204" pitchFamily="34" charset="0"/>
+                <a:cs typeface="Arial" panose="020B0604020202020204" pitchFamily="34" charset="0"/>
+              </a:rPr>
+              <a:t>mbakam</a:t>
+            </a:r>
+            <a:r>
+              <a:rPr lang="en-US" sz="2600" b="1" dirty="0" smtClean="0">
+                <a:latin typeface="Arial" panose="020B0604020202020204" pitchFamily="34" charset="0"/>
+                <a:cs typeface="Arial" panose="020B0604020202020204" pitchFamily="34" charset="0"/>
+              </a:rPr>
+              <a:t>, </a:t>
+            </a:r>
+            <a:r>
+              <a:rPr lang="en-US" sz="2600" b="1" dirty="0" err="1" smtClean="0">
+                <a:solidFill>
+                  <a:srgbClr val="FF0000"/>
+                </a:solidFill>
+                <a:latin typeface="Arial" panose="020B0604020202020204" pitchFamily="34" charset="0"/>
+                <a:cs typeface="Arial" panose="020B0604020202020204" pitchFamily="34" charset="0"/>
+              </a:rPr>
+              <a:t>svi</a:t>
+            </a:r>
+            <a:r>
+              <a:rPr lang="en-US" sz="2600" b="1" dirty="0" err="1" smtClean="0">
+                <a:latin typeface="Arial" panose="020B0604020202020204" pitchFamily="34" charset="0"/>
+                <a:cs typeface="Arial" panose="020B0604020202020204" pitchFamily="34" charset="0"/>
+              </a:rPr>
+              <a:t>Shtam</a:t>
+            </a:r>
+            <a:r>
+              <a:rPr lang="en-US" sz="2600" b="1" dirty="0" smtClean="0">
+                <a:latin typeface="Arial" panose="020B0604020202020204" pitchFamily="34" charset="0"/>
+                <a:cs typeface="Arial" panose="020B0604020202020204" pitchFamily="34" charset="0"/>
+              </a:rPr>
+              <a:t>, </a:t>
+            </a:r>
+            <a:r>
+              <a:rPr lang="en-US" sz="2600" b="1" dirty="0" err="1" smtClean="0">
+                <a:solidFill>
+                  <a:srgbClr val="FF0000"/>
+                </a:solidFill>
+                <a:latin typeface="Arial" panose="020B0604020202020204" pitchFamily="34" charset="0"/>
+                <a:cs typeface="Arial" panose="020B0604020202020204" pitchFamily="34" charset="0"/>
+              </a:rPr>
+              <a:t>nya</a:t>
+            </a:r>
+            <a:r>
+              <a:rPr lang="en-US" sz="2600" b="1" dirty="0" err="1" smtClean="0">
+                <a:latin typeface="Arial" panose="020B0604020202020204" pitchFamily="34" charset="0"/>
+                <a:cs typeface="Arial" panose="020B0604020202020204" pitchFamily="34" charset="0"/>
+              </a:rPr>
+              <a:t>ktam</a:t>
+            </a:r>
+            <a:r>
+              <a:rPr lang="en-US" sz="2600" b="1" dirty="0" smtClean="0">
+                <a:latin typeface="Arial" panose="020B0604020202020204" pitchFamily="34" charset="0"/>
+                <a:cs typeface="Arial" panose="020B0604020202020204" pitchFamily="34" charset="0"/>
+              </a:rPr>
+              <a:t>, </a:t>
+            </a:r>
+            <a:r>
+              <a:rPr lang="en-US" sz="2600" b="1" dirty="0" err="1" smtClean="0">
+                <a:solidFill>
+                  <a:srgbClr val="FF0000"/>
+                </a:solidFill>
+                <a:latin typeface="Arial" panose="020B0604020202020204" pitchFamily="34" charset="0"/>
+                <a:cs typeface="Arial" panose="020B0604020202020204" pitchFamily="34" charset="0"/>
+              </a:rPr>
+              <a:t>vyup</a:t>
+            </a:r>
+            <a:r>
+              <a:rPr lang="en-US" sz="2600" b="1" dirty="0" err="1" smtClean="0">
+                <a:latin typeface="Arial" panose="020B0604020202020204" pitchFamily="34" charset="0"/>
+                <a:cs typeface="Arial" panose="020B0604020202020204" pitchFamily="34" charset="0"/>
+              </a:rPr>
+              <a:t>takeSaya</a:t>
+            </a:r>
+            <a:endParaRPr lang="en-US" sz="2600" b="1" dirty="0" smtClean="0">
+              <a:latin typeface="Arial" panose="020B0604020202020204" pitchFamily="34" charset="0"/>
+              <a:cs typeface="Arial" panose="020B0604020202020204" pitchFamily="34" charset="0"/>
+            </a:endParaRPr>
+          </a:p>
+          <a:p>
+            <a:pPr lvl="2"/>
+            <a:r>
+              <a:rPr lang="en-US" sz="2400" b="1" dirty="0" smtClean="0">
+                <a:latin typeface="Arial" panose="020B0604020202020204" pitchFamily="34" charset="0"/>
+                <a:cs typeface="Arial" panose="020B0604020202020204" pitchFamily="34" charset="0"/>
+              </a:rPr>
+              <a:t>Referred as </a:t>
+            </a:r>
+            <a:r>
+              <a:rPr lang="en-US" sz="2400" b="1" dirty="0" err="1" smtClean="0">
+                <a:latin typeface="Arial" panose="020B0604020202020204" pitchFamily="34" charset="0"/>
+                <a:cs typeface="Arial" panose="020B0604020202020204" pitchFamily="34" charset="0"/>
+              </a:rPr>
+              <a:t>nitya</a:t>
+            </a:r>
+            <a:endParaRPr lang="en-US" sz="2400" b="1" dirty="0" smtClean="0">
+              <a:latin typeface="Arial" panose="020B0604020202020204" pitchFamily="34" charset="0"/>
+              <a:cs typeface="Arial" panose="020B0604020202020204" pitchFamily="34" charset="0"/>
+            </a:endParaRPr>
+          </a:p>
+          <a:p>
+            <a:pPr lvl="1"/>
+            <a:r>
+              <a:rPr lang="en-US" sz="2600" b="1" dirty="0" err="1" smtClean="0">
+                <a:latin typeface="Arial" panose="020B0604020202020204" pitchFamily="34" charset="0"/>
+                <a:cs typeface="Arial" panose="020B0604020202020204" pitchFamily="34" charset="0"/>
+              </a:rPr>
+              <a:t>Yo</a:t>
+            </a:r>
+            <a:r>
+              <a:rPr lang="en-US" sz="2600" b="1" dirty="0" smtClean="0">
+                <a:latin typeface="Arial" panose="020B0604020202020204" pitchFamily="34" charset="0"/>
+                <a:cs typeface="Arial" panose="020B0604020202020204" pitchFamily="34" charset="0"/>
+              </a:rPr>
+              <a:t>&amp;*</a:t>
+            </a:r>
+            <a:r>
+              <a:rPr lang="en-US" sz="2600" b="1" dirty="0" err="1" smtClean="0">
+                <a:latin typeface="Arial" panose="020B0604020202020204" pitchFamily="34" charset="0"/>
+                <a:cs typeface="Arial" panose="020B0604020202020204" pitchFamily="34" charset="0"/>
+              </a:rPr>
+              <a:t>sman</a:t>
+            </a:r>
+            <a:r>
+              <a:rPr lang="en-US" sz="2600" b="1" dirty="0" smtClean="0">
+                <a:latin typeface="Arial" panose="020B0604020202020204" pitchFamily="34" charset="0"/>
+                <a:cs typeface="Arial" panose="020B0604020202020204" pitchFamily="34" charset="0"/>
+              </a:rPr>
+              <a:t> </a:t>
+            </a:r>
+            <a:r>
+              <a:rPr lang="en-US" sz="2600" b="1" dirty="0" err="1" smtClean="0">
+                <a:latin typeface="Arial" panose="020B0604020202020204" pitchFamily="34" charset="0"/>
+                <a:cs typeface="Arial" panose="020B0604020202020204" pitchFamily="34" charset="0"/>
+              </a:rPr>
+              <a:t>dveShti</a:t>
+            </a:r>
+            <a:r>
+              <a:rPr lang="en-US" sz="2600" b="1" dirty="0" smtClean="0">
+                <a:latin typeface="Arial" panose="020B0604020202020204" pitchFamily="34" charset="0"/>
+                <a:cs typeface="Arial" panose="020B0604020202020204" pitchFamily="34" charset="0"/>
+              </a:rPr>
+              <a:t>, </a:t>
+            </a:r>
+            <a:r>
+              <a:rPr lang="en-US" sz="2600" b="1" dirty="0" err="1" smtClean="0">
+                <a:latin typeface="Arial" panose="020B0604020202020204" pitchFamily="34" charset="0"/>
+                <a:cs typeface="Arial" panose="020B0604020202020204" pitchFamily="34" charset="0"/>
+              </a:rPr>
+              <a:t>yo</a:t>
+            </a:r>
+            <a:r>
+              <a:rPr lang="en-US" sz="2600" b="1" dirty="0" smtClean="0">
+                <a:latin typeface="Arial" panose="020B0604020202020204" pitchFamily="34" charset="0"/>
+                <a:cs typeface="Arial" panose="020B0604020202020204" pitchFamily="34" charset="0"/>
+              </a:rPr>
+              <a:t>&amp;*</a:t>
+            </a:r>
+            <a:r>
+              <a:rPr lang="en-US" sz="2600" b="1" dirty="0" err="1" smtClean="0">
+                <a:latin typeface="Arial" panose="020B0604020202020204" pitchFamily="34" charset="0"/>
+                <a:cs typeface="Arial" panose="020B0604020202020204" pitchFamily="34" charset="0"/>
+              </a:rPr>
+              <a:t>apam</a:t>
+            </a:r>
+            <a:r>
+              <a:rPr lang="en-US" sz="2600" b="1" dirty="0" smtClean="0">
+                <a:latin typeface="Arial" panose="020B0604020202020204" pitchFamily="34" charset="0"/>
+                <a:cs typeface="Arial" panose="020B0604020202020204" pitchFamily="34" charset="0"/>
+              </a:rPr>
+              <a:t> with </a:t>
+            </a:r>
+            <a:r>
+              <a:rPr lang="en-US" sz="2600" b="1" dirty="0" err="1" smtClean="0">
+                <a:latin typeface="Arial" panose="020B0604020202020204" pitchFamily="34" charset="0"/>
+                <a:cs typeface="Arial" panose="020B0604020202020204" pitchFamily="34" charset="0"/>
+              </a:rPr>
+              <a:t>avagraha</a:t>
+            </a:r>
+            <a:endParaRPr lang="en-US" sz="2600" b="1" dirty="0" smtClean="0">
+              <a:latin typeface="Arial" panose="020B0604020202020204" pitchFamily="34" charset="0"/>
+              <a:cs typeface="Arial" panose="020B0604020202020204" pitchFamily="34" charset="0"/>
+            </a:endParaRPr>
+          </a:p>
+          <a:p>
+            <a:r>
+              <a:rPr lang="en-US" sz="2800" b="1" dirty="0" smtClean="0">
+                <a:latin typeface="Arial" panose="020B0604020202020204" pitchFamily="34" charset="0"/>
+                <a:cs typeface="Arial" panose="020B0604020202020204" pitchFamily="34" charset="0"/>
+              </a:rPr>
+              <a:t>To be rendered firmly </a:t>
+            </a:r>
+          </a:p>
+          <a:p>
+            <a:pPr marL="0" indent="0">
+              <a:buNone/>
+            </a:pPr>
+            <a:endParaRPr lang="en-US" sz="2800" b="1" dirty="0">
+              <a:latin typeface="Arial" panose="020B0604020202020204" pitchFamily="34" charset="0"/>
+              <a:cs typeface="Arial" panose="020B0604020202020204" pitchFamily="34" charset="0"/>
+            </a:endParaRPr>
+          </a:p>
+        </p:txBody>
+      </p:sp>
+    </p:spTree>
+    <p:extLst>
+      <p:ext uri="{BB962C8B-B14F-4D97-AF65-F5344CB8AC3E}">
+        <p14:creationId xmlns:p14="http://schemas.microsoft.com/office/powerpoint/2010/main" val="4109273382"/>
+      </p:ext>
+    </p:extLst>
+  </p:cSld>
+  <p:clrMapOvr>
+    <a:masterClrMapping/>
+  </p:clrMapOvr>
+  <p:timing>
+    <p:tnLst>
+      <p:par>
+        <p:cTn id="1" dur="indefinite" restart="never" nodeType="tmRoot"/>
+      </p:par>
+    </p:tnLst>
+  </p:timing>
+</p:sld>
+</file>
+
+<file path=ppt/slides/slide12.xml><?xml version="1.0" encoding="utf-8"?>
+<p:sld xmlns:a="http://schemas.openxmlformats.org/drawingml/2006/main" xmlns:r="http://schemas.openxmlformats.org/officeDocument/2006/relationships" xmlns:p="http://schemas.openxmlformats.org/presentationml/2006/main">
+  <p:cSld>
+    <p:spTree>
+      <p:nvGrpSpPr>
+        <p:cNvPr id="1" name=""/>
+        <p:cNvGrpSpPr/>
+        <p:nvPr/>
+      </p:nvGrpSpPr>
+      <p:grpSpPr>
+        <a:xfrm>
+          <a:off x="0" y="0"/>
+          <a:ext cx="0" cy="0"/>
+          <a:chOff x="0" y="0"/>
+          <a:chExt cx="0" cy="0"/>
+        </a:xfrm>
+      </p:grpSpPr>
+      <p:sp>
+        <p:nvSpPr>
+          <p:cNvPr id="2" name="Title 1"/>
+          <p:cNvSpPr>
+            <a:spLocks noGrp="1"/>
+          </p:cNvSpPr>
+          <p:nvPr>
+            <p:ph type="title"/>
+          </p:nvPr>
+        </p:nvSpPr>
+        <p:spPr>
+          <a:xfrm>
+            <a:off x="1154954" y="973668"/>
+            <a:ext cx="8825659" cy="1072846"/>
+          </a:xfrm>
+        </p:spPr>
+        <p:txBody>
+          <a:bodyPr/>
+          <a:lstStyle/>
+          <a:p>
+            <a:r>
+              <a:rPr lang="en-US" dirty="0" smtClean="0"/>
+              <a:t>Some key Swaram Rules</a:t>
+            </a:r>
+            <a:endParaRPr lang="en-US" dirty="0"/>
+          </a:p>
+        </p:txBody>
+      </p:sp>
+      <p:sp>
+        <p:nvSpPr>
+          <p:cNvPr id="3" name="Content Placeholder 2"/>
+          <p:cNvSpPr>
+            <a:spLocks noGrp="1"/>
+          </p:cNvSpPr>
+          <p:nvPr>
+            <p:ph idx="1"/>
+          </p:nvPr>
+        </p:nvSpPr>
+        <p:spPr/>
+        <p:txBody>
+          <a:bodyPr>
+            <a:normAutofit lnSpcReduction="10000"/>
+          </a:bodyPr>
+          <a:lstStyle/>
+          <a:p>
+            <a:r>
+              <a:rPr lang="en-US" sz="2800" b="1" dirty="0" smtClean="0">
+                <a:latin typeface="Arial" panose="020B0604020202020204" pitchFamily="34" charset="0"/>
+                <a:cs typeface="Arial" panose="020B0604020202020204" pitchFamily="34" charset="0"/>
+              </a:rPr>
+              <a:t>Some exception are noticed in Vedic texts</a:t>
+            </a:r>
+          </a:p>
+          <a:p>
+            <a:pPr lvl="1"/>
+            <a:r>
+              <a:rPr lang="en-US" sz="2600" b="1" dirty="0" err="1" smtClean="0">
+                <a:latin typeface="Arial" panose="020B0604020202020204" pitchFamily="34" charset="0"/>
+                <a:cs typeface="Arial" panose="020B0604020202020204" pitchFamily="34" charset="0"/>
+              </a:rPr>
+              <a:t>bAhvorindra</a:t>
+            </a:r>
+            <a:r>
+              <a:rPr lang="en-US" sz="2600" b="1" dirty="0" smtClean="0">
+                <a:latin typeface="Arial" panose="020B0604020202020204" pitchFamily="34" charset="0"/>
+                <a:cs typeface="Arial" panose="020B0604020202020204" pitchFamily="34" charset="0"/>
+              </a:rPr>
+              <a:t> </a:t>
+            </a:r>
+            <a:r>
+              <a:rPr lang="en-US" sz="2600" b="1" dirty="0" err="1" smtClean="0">
+                <a:latin typeface="Arial" panose="020B0604020202020204" pitchFamily="34" charset="0"/>
+                <a:cs typeface="Arial" panose="020B0604020202020204" pitchFamily="34" charset="0"/>
+              </a:rPr>
+              <a:t>tiShThatu</a:t>
+            </a:r>
+            <a:r>
+              <a:rPr lang="en-US" sz="2600" b="1" dirty="0" smtClean="0">
+                <a:latin typeface="Arial" panose="020B0604020202020204" pitchFamily="34" charset="0"/>
+                <a:cs typeface="Arial" panose="020B0604020202020204" pitchFamily="34" charset="0"/>
+              </a:rPr>
+              <a:t>, </a:t>
+            </a:r>
+            <a:r>
+              <a:rPr lang="en-US" sz="2600" b="1" dirty="0" err="1" smtClean="0">
+                <a:latin typeface="Arial" panose="020B0604020202020204" pitchFamily="34" charset="0"/>
+                <a:cs typeface="Arial" panose="020B0604020202020204" pitchFamily="34" charset="0"/>
+              </a:rPr>
+              <a:t>dhenur</a:t>
+            </a:r>
+            <a:r>
+              <a:rPr lang="en-US" sz="2600" b="1" dirty="0" smtClean="0">
+                <a:latin typeface="Arial" panose="020B0604020202020204" pitchFamily="34" charset="0"/>
+                <a:cs typeface="Arial" panose="020B0604020202020204" pitchFamily="34" charset="0"/>
+              </a:rPr>
+              <a:t> </a:t>
+            </a:r>
+            <a:r>
+              <a:rPr lang="en-US" sz="2600" b="1" dirty="0" err="1" smtClean="0">
+                <a:latin typeface="Arial" panose="020B0604020202020204" pitchFamily="34" charset="0"/>
+                <a:cs typeface="Arial" panose="020B0604020202020204" pitchFamily="34" charset="0"/>
+              </a:rPr>
+              <a:t>dakshiNa</a:t>
+            </a:r>
+            <a:endParaRPr lang="en-US" sz="2600" b="1" dirty="0" smtClean="0">
+              <a:latin typeface="Arial" panose="020B0604020202020204" pitchFamily="34" charset="0"/>
+              <a:cs typeface="Arial" panose="020B0604020202020204" pitchFamily="34" charset="0"/>
+            </a:endParaRPr>
+          </a:p>
+          <a:p>
+            <a:r>
+              <a:rPr lang="en-US" sz="2800" b="1" dirty="0" smtClean="0">
+                <a:latin typeface="Arial" panose="020B0604020202020204" pitchFamily="34" charset="0"/>
+                <a:cs typeface="Arial" panose="020B0604020202020204" pitchFamily="34" charset="0"/>
+              </a:rPr>
+              <a:t>The last letter of a vAkyam cannot be anudAttam</a:t>
+            </a:r>
+          </a:p>
+          <a:p>
+            <a:r>
+              <a:rPr lang="en-US" sz="2800" b="1" dirty="0" smtClean="0">
+                <a:latin typeface="Arial" panose="020B0604020202020204" pitchFamily="34" charset="0"/>
+                <a:cs typeface="Arial" panose="020B0604020202020204" pitchFamily="34" charset="0"/>
+              </a:rPr>
+              <a:t>Padam can have all letters as anudAttam</a:t>
+            </a:r>
+          </a:p>
+          <a:p>
+            <a:pPr lvl="1"/>
+            <a:r>
+              <a:rPr lang="en-US" sz="2600" b="1" dirty="0" smtClean="0">
+                <a:latin typeface="Arial" panose="020B0604020202020204" pitchFamily="34" charset="0"/>
+                <a:cs typeface="Arial" panose="020B0604020202020204" pitchFamily="34" charset="0"/>
+              </a:rPr>
+              <a:t>Rendered as pracaya in </a:t>
+            </a:r>
+            <a:r>
+              <a:rPr lang="en-US" sz="2600" b="1" dirty="0" err="1" smtClean="0">
+                <a:latin typeface="Arial" panose="020B0604020202020204" pitchFamily="34" charset="0"/>
+                <a:cs typeface="Arial" panose="020B0604020202020204" pitchFamily="34" charset="0"/>
+              </a:rPr>
+              <a:t>Krama</a:t>
+            </a:r>
+            <a:r>
+              <a:rPr lang="en-US" sz="2600" b="1" dirty="0" smtClean="0">
+                <a:latin typeface="Arial" panose="020B0604020202020204" pitchFamily="34" charset="0"/>
+                <a:cs typeface="Arial" panose="020B0604020202020204" pitchFamily="34" charset="0"/>
+              </a:rPr>
+              <a:t>, </a:t>
+            </a:r>
+            <a:r>
+              <a:rPr lang="en-US" sz="2600" b="1" dirty="0" err="1" smtClean="0">
+                <a:latin typeface="Arial" panose="020B0604020202020204" pitchFamily="34" charset="0"/>
+                <a:cs typeface="Arial" panose="020B0604020202020204" pitchFamily="34" charset="0"/>
+              </a:rPr>
+              <a:t>Jata</a:t>
+            </a:r>
+            <a:r>
+              <a:rPr lang="en-US" sz="2600" b="1" dirty="0" smtClean="0">
+                <a:latin typeface="Arial" panose="020B0604020202020204" pitchFamily="34" charset="0"/>
+                <a:cs typeface="Arial" panose="020B0604020202020204" pitchFamily="34" charset="0"/>
+              </a:rPr>
+              <a:t> and Ghana </a:t>
+            </a:r>
+            <a:r>
+              <a:rPr lang="en-US" sz="2600" b="1" dirty="0" err="1" smtClean="0">
+                <a:latin typeface="Arial" panose="020B0604020202020204" pitchFamily="34" charset="0"/>
+                <a:cs typeface="Arial" panose="020B0604020202020204" pitchFamily="34" charset="0"/>
+              </a:rPr>
+              <a:t>vAkyams</a:t>
+            </a:r>
+            <a:r>
+              <a:rPr lang="en-US" sz="2600" b="1" dirty="0" smtClean="0">
+                <a:latin typeface="Arial" panose="020B0604020202020204" pitchFamily="34" charset="0"/>
+                <a:cs typeface="Arial" panose="020B0604020202020204" pitchFamily="34" charset="0"/>
+              </a:rPr>
+              <a:t>.</a:t>
+            </a:r>
+          </a:p>
+          <a:p>
+            <a:pPr lvl="1"/>
+            <a:r>
+              <a:rPr lang="en-US" sz="2600" b="1" dirty="0" smtClean="0">
+                <a:latin typeface="Arial" panose="020B0604020202020204" pitchFamily="34" charset="0"/>
+                <a:cs typeface="Arial" panose="020B0604020202020204" pitchFamily="34" charset="0"/>
+              </a:rPr>
+              <a:t>More coverage in </a:t>
+            </a:r>
+            <a:r>
+              <a:rPr lang="en-US" sz="2600" b="1" dirty="0" err="1" smtClean="0">
+                <a:latin typeface="Arial" panose="020B0604020202020204" pitchFamily="34" charset="0"/>
+                <a:cs typeface="Arial" panose="020B0604020202020204" pitchFamily="34" charset="0"/>
+              </a:rPr>
+              <a:t>Pada</a:t>
+            </a:r>
+            <a:r>
+              <a:rPr lang="en-US" sz="2600" b="1" dirty="0" smtClean="0">
+                <a:latin typeface="Arial" panose="020B0604020202020204" pitchFamily="34" charset="0"/>
+                <a:cs typeface="Arial" panose="020B0604020202020204" pitchFamily="34" charset="0"/>
+              </a:rPr>
+              <a:t> </a:t>
+            </a:r>
+            <a:r>
+              <a:rPr lang="en-US" sz="2600" b="1" dirty="0" err="1" smtClean="0">
+                <a:latin typeface="Arial" panose="020B0604020202020204" pitchFamily="34" charset="0"/>
+                <a:cs typeface="Arial" panose="020B0604020202020204" pitchFamily="34" charset="0"/>
+              </a:rPr>
+              <a:t>Paatam</a:t>
+            </a:r>
+            <a:r>
+              <a:rPr lang="en-US" sz="2600" b="1" dirty="0" smtClean="0">
+                <a:latin typeface="Arial" panose="020B0604020202020204" pitchFamily="34" charset="0"/>
+                <a:cs typeface="Arial" panose="020B0604020202020204" pitchFamily="34" charset="0"/>
+              </a:rPr>
+              <a:t> later.</a:t>
+            </a:r>
+            <a:endParaRPr lang="en-US" sz="2600" b="1" dirty="0">
+              <a:latin typeface="Arial" panose="020B0604020202020204" pitchFamily="34" charset="0"/>
+              <a:cs typeface="Arial" panose="020B0604020202020204" pitchFamily="34" charset="0"/>
+            </a:endParaRPr>
+          </a:p>
+        </p:txBody>
+      </p:sp>
+    </p:spTree>
+    <p:extLst>
+      <p:ext uri="{BB962C8B-B14F-4D97-AF65-F5344CB8AC3E}">
+        <p14:creationId xmlns:p14="http://schemas.microsoft.com/office/powerpoint/2010/main" val="847990004"/>
+      </p:ext>
+    </p:extLst>
+  </p:cSld>
+  <p:clrMapOvr>
+    <a:masterClrMapping/>
+  </p:clrMapOvr>
+  <p:timing>
+    <p:tnLst>
+      <p:par>
+        <p:cTn id="1" dur="indefinite" restart="never" nodeType="tmRoot"/>
+      </p:par>
+    </p:tnLst>
+  </p:timing>
+</p:sld>
+</file>
+
+<file path=ppt/slides/slide13.xml><?xml version="1.0" encoding="utf-8"?>
+<p:sld xmlns:a="http://schemas.openxmlformats.org/drawingml/2006/main" xmlns:r="http://schemas.openxmlformats.org/officeDocument/2006/relationships" xmlns:p="http://schemas.openxmlformats.org/presentationml/2006/main">
+  <p:cSld>
+    <p:spTree>
+      <p:nvGrpSpPr>
+        <p:cNvPr id="1" name=""/>
+        <p:cNvGrpSpPr/>
+        <p:nvPr/>
+      </p:nvGrpSpPr>
+      <p:grpSpPr>
+        <a:xfrm>
+          <a:off x="0" y="0"/>
+          <a:ext cx="0" cy="0"/>
+          <a:chOff x="0" y="0"/>
+          <a:chExt cx="0" cy="0"/>
+        </a:xfrm>
+      </p:grpSpPr>
+      <p:sp>
+        <p:nvSpPr>
+          <p:cNvPr id="2" name="Title 1"/>
+          <p:cNvSpPr>
+            <a:spLocks noGrp="1"/>
+          </p:cNvSpPr>
+          <p:nvPr>
+            <p:ph type="title"/>
+          </p:nvPr>
+        </p:nvSpPr>
+        <p:spPr>
+          <a:xfrm>
+            <a:off x="1154954" y="973668"/>
+            <a:ext cx="8825659" cy="1072846"/>
+          </a:xfrm>
+        </p:spPr>
+        <p:txBody>
+          <a:bodyPr/>
+          <a:lstStyle/>
+          <a:p>
+            <a:r>
+              <a:rPr lang="en-US" dirty="0" smtClean="0"/>
+              <a:t>Importance of </a:t>
+            </a:r>
+            <a:r>
+              <a:rPr lang="en-US" dirty="0" err="1" smtClean="0"/>
+              <a:t>udAtta</a:t>
+            </a:r>
+            <a:endParaRPr lang="en-US" dirty="0"/>
+          </a:p>
+        </p:txBody>
+      </p:sp>
+      <p:sp>
+        <p:nvSpPr>
+          <p:cNvPr id="3" name="Content Placeholder 2"/>
+          <p:cNvSpPr>
+            <a:spLocks noGrp="1"/>
+          </p:cNvSpPr>
+          <p:nvPr>
+            <p:ph idx="1"/>
+          </p:nvPr>
+        </p:nvSpPr>
+        <p:spPr/>
+        <p:txBody>
+          <a:bodyPr>
+            <a:normAutofit/>
+          </a:bodyPr>
+          <a:lstStyle/>
+          <a:p>
+            <a:r>
+              <a:rPr lang="en-US" sz="2600" b="1" dirty="0" err="1" smtClean="0">
+                <a:latin typeface="Arial" panose="020B0604020202020204" pitchFamily="34" charset="0"/>
+                <a:cs typeface="Arial" panose="020B0604020202020204" pitchFamily="34" charset="0"/>
+              </a:rPr>
+              <a:t>udAtta</a:t>
+            </a:r>
+            <a:r>
+              <a:rPr lang="en-US" sz="2600" b="1" dirty="0" smtClean="0">
+                <a:latin typeface="Arial" panose="020B0604020202020204" pitchFamily="34" charset="0"/>
+                <a:cs typeface="Arial" panose="020B0604020202020204" pitchFamily="34" charset="0"/>
+              </a:rPr>
+              <a:t> is the </a:t>
+            </a:r>
+            <a:r>
+              <a:rPr lang="en-US" sz="2600" b="1" dirty="0" err="1" smtClean="0">
+                <a:latin typeface="Arial" panose="020B0604020202020204" pitchFamily="34" charset="0"/>
+                <a:cs typeface="Arial" panose="020B0604020202020204" pitchFamily="34" charset="0"/>
+              </a:rPr>
+              <a:t>acyuta</a:t>
+            </a:r>
+            <a:r>
+              <a:rPr lang="en-US" sz="2600" b="1" dirty="0" smtClean="0">
+                <a:latin typeface="Arial" panose="020B0604020202020204" pitchFamily="34" charset="0"/>
+                <a:cs typeface="Arial" panose="020B0604020202020204" pitchFamily="34" charset="0"/>
+              </a:rPr>
+              <a:t> of Vedic Swarams</a:t>
+            </a:r>
+          </a:p>
+          <a:p>
+            <a:pPr lvl="1"/>
+            <a:r>
+              <a:rPr lang="en-US" sz="2400" b="1" dirty="0" smtClean="0">
+                <a:latin typeface="Arial" panose="020B0604020202020204" pitchFamily="34" charset="0"/>
+                <a:cs typeface="Arial" panose="020B0604020202020204" pitchFamily="34" charset="0"/>
+              </a:rPr>
+              <a:t>Like all revolve around </a:t>
+            </a:r>
+            <a:r>
+              <a:rPr lang="en-US" sz="2400" b="1" dirty="0" err="1" smtClean="0">
+                <a:latin typeface="Arial" panose="020B0604020202020204" pitchFamily="34" charset="0"/>
+                <a:cs typeface="Arial" panose="020B0604020202020204" pitchFamily="34" charset="0"/>
+              </a:rPr>
+              <a:t>VishNu</a:t>
+            </a:r>
+            <a:endParaRPr lang="en-US" sz="2400" b="1" dirty="0" smtClean="0">
+              <a:latin typeface="Arial" panose="020B0604020202020204" pitchFamily="34" charset="0"/>
+              <a:cs typeface="Arial" panose="020B0604020202020204" pitchFamily="34" charset="0"/>
+            </a:endParaRPr>
+          </a:p>
+          <a:p>
+            <a:r>
+              <a:rPr lang="en-US" sz="2600" b="1" dirty="0" smtClean="0">
+                <a:latin typeface="Arial" panose="020B0604020202020204" pitchFamily="34" charset="0"/>
+                <a:cs typeface="Arial" panose="020B0604020202020204" pitchFamily="34" charset="0"/>
+              </a:rPr>
+              <a:t>Sets the </a:t>
+            </a:r>
+            <a:r>
+              <a:rPr lang="en-US" sz="2600" b="1" dirty="0" smtClean="0">
+                <a:solidFill>
+                  <a:srgbClr val="FF0000"/>
+                </a:solidFill>
+                <a:latin typeface="Arial" panose="020B0604020202020204" pitchFamily="34" charset="0"/>
+                <a:cs typeface="Arial" panose="020B0604020202020204" pitchFamily="34" charset="0"/>
+              </a:rPr>
+              <a:t>entire tone </a:t>
+            </a:r>
+            <a:r>
+              <a:rPr lang="en-US" sz="2600" b="1" dirty="0" smtClean="0">
+                <a:latin typeface="Arial" panose="020B0604020202020204" pitchFamily="34" charset="0"/>
+                <a:cs typeface="Arial" panose="020B0604020202020204" pitchFamily="34" charset="0"/>
+              </a:rPr>
+              <a:t>of your recital</a:t>
+            </a:r>
+          </a:p>
+          <a:p>
+            <a:r>
+              <a:rPr lang="en-US" sz="2600" b="1" dirty="0" smtClean="0">
+                <a:latin typeface="Arial" panose="020B0604020202020204" pitchFamily="34" charset="0"/>
+                <a:cs typeface="Arial" panose="020B0604020202020204" pitchFamily="34" charset="0"/>
+              </a:rPr>
+              <a:t>Various level of Swara Reach – Show table</a:t>
+            </a:r>
+          </a:p>
+          <a:p>
+            <a:r>
+              <a:rPr lang="en-US" sz="2600" b="1" dirty="0" err="1" smtClean="0">
+                <a:latin typeface="Arial" panose="020B0604020202020204" pitchFamily="34" charset="0"/>
+                <a:cs typeface="Arial" panose="020B0604020202020204" pitchFamily="34" charset="0"/>
+              </a:rPr>
+              <a:t>Plutams</a:t>
+            </a:r>
+            <a:r>
+              <a:rPr lang="en-US" sz="2600" b="1" dirty="0" smtClean="0">
+                <a:latin typeface="Arial" panose="020B0604020202020204" pitchFamily="34" charset="0"/>
+                <a:cs typeface="Arial" panose="020B0604020202020204" pitchFamily="34" charset="0"/>
+              </a:rPr>
+              <a:t> are normally udAttam only</a:t>
+            </a:r>
+            <a:endParaRPr lang="en-US" sz="2600" b="1" dirty="0">
+              <a:latin typeface="Arial" panose="020B0604020202020204" pitchFamily="34" charset="0"/>
+              <a:cs typeface="Arial" panose="020B0604020202020204" pitchFamily="34" charset="0"/>
+            </a:endParaRPr>
+          </a:p>
+        </p:txBody>
+      </p:sp>
+    </p:spTree>
+    <p:extLst>
+      <p:ext uri="{BB962C8B-B14F-4D97-AF65-F5344CB8AC3E}">
+        <p14:creationId xmlns:p14="http://schemas.microsoft.com/office/powerpoint/2010/main" val="2560387084"/>
+      </p:ext>
+    </p:extLst>
+  </p:cSld>
+  <p:clrMapOvr>
+    <a:masterClrMapping/>
+  </p:clrMapOvr>
+  <p:timing>
+    <p:tnLst>
+      <p:par>
+        <p:cTn id="1" dur="indefinite" restart="never" nodeType="tmRoot"/>
+      </p:par>
+    </p:tnLst>
+  </p:timing>
+</p:sld>
+</file>
+
+<file path=ppt/slides/slide14.xml><?xml version="1.0" encoding="utf-8"?>
+<p:sld xmlns:a="http://schemas.openxmlformats.org/drawingml/2006/main" xmlns:r="http://schemas.openxmlformats.org/officeDocument/2006/relationships" xmlns:p="http://schemas.openxmlformats.org/presentationml/2006/main">
+  <p:cSld>
+    <p:spTree>
+      <p:nvGrpSpPr>
+        <p:cNvPr id="1" name=""/>
+        <p:cNvGrpSpPr/>
+        <p:nvPr/>
+      </p:nvGrpSpPr>
+      <p:grpSpPr>
+        <a:xfrm>
+          <a:off x="0" y="0"/>
+          <a:ext cx="0" cy="0"/>
+          <a:chOff x="0" y="0"/>
+          <a:chExt cx="0" cy="0"/>
+        </a:xfrm>
+      </p:grpSpPr>
+      <p:sp>
+        <p:nvSpPr>
+          <p:cNvPr id="2" name="Title 1"/>
+          <p:cNvSpPr>
+            <a:spLocks noGrp="1"/>
+          </p:cNvSpPr>
+          <p:nvPr>
+            <p:ph type="title"/>
+          </p:nvPr>
+        </p:nvSpPr>
+        <p:spPr/>
+        <p:txBody>
+          <a:bodyPr/>
+          <a:lstStyle/>
+          <a:p>
+            <a:r>
+              <a:rPr lang="en-US" dirty="0" smtClean="0"/>
+              <a:t>Vikrama Concept</a:t>
+            </a:r>
+            <a:endParaRPr lang="en-US" dirty="0"/>
+          </a:p>
+        </p:txBody>
+      </p:sp>
+      <p:sp>
+        <p:nvSpPr>
+          <p:cNvPr id="3" name="Content Placeholder 2"/>
+          <p:cNvSpPr>
+            <a:spLocks noGrp="1"/>
+          </p:cNvSpPr>
+          <p:nvPr>
+            <p:ph idx="1"/>
+          </p:nvPr>
+        </p:nvSpPr>
+        <p:spPr/>
+        <p:txBody>
+          <a:bodyPr>
+            <a:normAutofit lnSpcReduction="10000"/>
+          </a:bodyPr>
+          <a:lstStyle/>
+          <a:p>
+            <a:r>
+              <a:rPr lang="en-US" sz="2800" b="1" dirty="0">
+                <a:latin typeface="Arial" panose="020B0604020202020204" pitchFamily="34" charset="0"/>
+                <a:cs typeface="Arial" panose="020B0604020202020204" pitchFamily="34" charset="0"/>
+              </a:rPr>
+              <a:t>PS 19-1 says – “ Where a syllable of low tone (anudAttam) occurs  between two </a:t>
+            </a:r>
+            <a:r>
+              <a:rPr lang="en-US" sz="2800" b="1" dirty="0" smtClean="0">
+                <a:latin typeface="Arial" panose="020B0604020202020204" pitchFamily="34" charset="0"/>
+                <a:cs typeface="Arial" panose="020B0604020202020204" pitchFamily="34" charset="0"/>
+              </a:rPr>
+              <a:t>circumflex</a:t>
+            </a:r>
+            <a:br>
+              <a:rPr lang="en-US" sz="2800" b="1" dirty="0" smtClean="0">
+                <a:latin typeface="Arial" panose="020B0604020202020204" pitchFamily="34" charset="0"/>
+                <a:cs typeface="Arial" panose="020B0604020202020204" pitchFamily="34" charset="0"/>
+              </a:rPr>
+            </a:br>
+            <a:r>
+              <a:rPr lang="en-US" sz="2800" b="1" dirty="0" smtClean="0">
+                <a:latin typeface="Arial" panose="020B0604020202020204" pitchFamily="34" charset="0"/>
+                <a:cs typeface="Arial" panose="020B0604020202020204" pitchFamily="34" charset="0"/>
+              </a:rPr>
+              <a:t>(</a:t>
+            </a:r>
+            <a:r>
+              <a:rPr lang="en-US" sz="2800" b="1" dirty="0">
+                <a:latin typeface="Arial" panose="020B0604020202020204" pitchFamily="34" charset="0"/>
+                <a:cs typeface="Arial" panose="020B0604020202020204" pitchFamily="34" charset="0"/>
+              </a:rPr>
+              <a:t>Swaritam) syllables, or two acute(</a:t>
+            </a:r>
+            <a:r>
+              <a:rPr lang="en-US" sz="2800" b="1" dirty="0" err="1">
+                <a:latin typeface="Arial" panose="020B0604020202020204" pitchFamily="34" charset="0"/>
+                <a:cs typeface="Arial" panose="020B0604020202020204" pitchFamily="34" charset="0"/>
+              </a:rPr>
+              <a:t>udAttA</a:t>
+            </a:r>
+            <a:r>
+              <a:rPr lang="en-US" sz="2800" b="1" dirty="0">
+                <a:latin typeface="Arial" panose="020B0604020202020204" pitchFamily="34" charset="0"/>
+                <a:cs typeface="Arial" panose="020B0604020202020204" pitchFamily="34" charset="0"/>
+              </a:rPr>
+              <a:t>),  or two of which either one is acute(</a:t>
+            </a:r>
+            <a:r>
+              <a:rPr lang="en-US" sz="2800" b="1" dirty="0" err="1">
+                <a:latin typeface="Arial" panose="020B0604020202020204" pitchFamily="34" charset="0"/>
+                <a:cs typeface="Arial" panose="020B0604020202020204" pitchFamily="34" charset="0"/>
+              </a:rPr>
+              <a:t>udAtta</a:t>
+            </a:r>
+            <a:r>
+              <a:rPr lang="en-US" sz="2800" b="1" dirty="0">
+                <a:latin typeface="Arial" panose="020B0604020202020204" pitchFamily="34" charset="0"/>
+                <a:cs typeface="Arial" panose="020B0604020202020204" pitchFamily="34" charset="0"/>
+              </a:rPr>
+              <a:t>) </a:t>
+            </a:r>
+            <a:r>
+              <a:rPr lang="en-US" sz="2800" b="1" dirty="0" smtClean="0">
+                <a:latin typeface="Arial" panose="020B0604020202020204" pitchFamily="34" charset="0"/>
+                <a:cs typeface="Arial" panose="020B0604020202020204" pitchFamily="34" charset="0"/>
+              </a:rPr>
+              <a:t>and </a:t>
+            </a:r>
+            <a:r>
+              <a:rPr lang="en-US" sz="2800" b="1" dirty="0">
+                <a:latin typeface="Arial" panose="020B0604020202020204" pitchFamily="34" charset="0"/>
+                <a:cs typeface="Arial" panose="020B0604020202020204" pitchFamily="34" charset="0"/>
+              </a:rPr>
+              <a:t> the other </a:t>
+            </a:r>
+            <a:r>
+              <a:rPr lang="en-US" sz="2800" b="1" dirty="0" smtClean="0">
+                <a:latin typeface="Arial" panose="020B0604020202020204" pitchFamily="34" charset="0"/>
+                <a:cs typeface="Arial" panose="020B0604020202020204" pitchFamily="34" charset="0"/>
+              </a:rPr>
+              <a:t> circumflex(</a:t>
+            </a:r>
+            <a:r>
+              <a:rPr lang="en-US" sz="2800" b="1" dirty="0" err="1" smtClean="0">
+                <a:latin typeface="Arial" panose="020B0604020202020204" pitchFamily="34" charset="0"/>
+                <a:cs typeface="Arial" panose="020B0604020202020204" pitchFamily="34" charset="0"/>
+              </a:rPr>
+              <a:t>Swarita</a:t>
+            </a:r>
+            <a:r>
+              <a:rPr lang="en-US" sz="2800" b="1" dirty="0">
+                <a:latin typeface="Arial" panose="020B0604020202020204" pitchFamily="34" charset="0"/>
+                <a:cs typeface="Arial" panose="020B0604020202020204" pitchFamily="34" charset="0"/>
+              </a:rPr>
+              <a:t>),  </a:t>
+            </a:r>
+            <a:r>
+              <a:rPr lang="en-US" sz="2800" b="1" dirty="0" smtClean="0">
+                <a:latin typeface="Arial" panose="020B0604020202020204" pitchFamily="34" charset="0"/>
+                <a:cs typeface="Arial" panose="020B0604020202020204" pitchFamily="34" charset="0"/>
+              </a:rPr>
+              <a:t> </a:t>
+            </a:r>
+            <a:br>
+              <a:rPr lang="en-US" sz="2800" b="1" dirty="0" smtClean="0">
+                <a:latin typeface="Arial" panose="020B0604020202020204" pitchFamily="34" charset="0"/>
+                <a:cs typeface="Arial" panose="020B0604020202020204" pitchFamily="34" charset="0"/>
+              </a:rPr>
+            </a:br>
+            <a:r>
+              <a:rPr lang="en-US" sz="2800" b="1" dirty="0" smtClean="0">
+                <a:latin typeface="Arial" panose="020B0604020202020204" pitchFamily="34" charset="0"/>
+                <a:cs typeface="Arial" panose="020B0604020202020204" pitchFamily="34" charset="0"/>
+              </a:rPr>
+              <a:t>that</a:t>
+            </a:r>
+            <a:r>
+              <a:rPr lang="en-US" sz="2800" b="1" dirty="0">
+                <a:latin typeface="Arial" panose="020B0604020202020204" pitchFamily="34" charset="0"/>
+                <a:cs typeface="Arial" panose="020B0604020202020204" pitchFamily="34" charset="0"/>
+              </a:rPr>
+              <a:t> is </a:t>
+            </a:r>
+            <a:r>
+              <a:rPr lang="en-US" sz="2800" b="1" dirty="0" smtClean="0">
+                <a:latin typeface="Arial" panose="020B0604020202020204" pitchFamily="34" charset="0"/>
+                <a:cs typeface="Arial" panose="020B0604020202020204" pitchFamily="34" charset="0"/>
+              </a:rPr>
+              <a:t>”</a:t>
+            </a:r>
+            <a:r>
+              <a:rPr lang="en-US" sz="3200" b="1" dirty="0" err="1" smtClean="0">
+                <a:latin typeface="Arial" panose="020B0604020202020204" pitchFamily="34" charset="0"/>
+                <a:cs typeface="Arial" panose="020B0604020202020204" pitchFamily="34" charset="0"/>
+              </a:rPr>
+              <a:t>vikrama</a:t>
+            </a:r>
+            <a:r>
+              <a:rPr lang="en-US" sz="2800" b="1" dirty="0" smtClean="0">
+                <a:latin typeface="Arial" panose="020B0604020202020204" pitchFamily="34" charset="0"/>
+                <a:cs typeface="Arial" panose="020B0604020202020204" pitchFamily="34" charset="0"/>
+              </a:rPr>
+              <a:t>.”</a:t>
+            </a:r>
+          </a:p>
+          <a:p>
+            <a:r>
+              <a:rPr lang="en-US" sz="2800" b="1" dirty="0">
+                <a:latin typeface="Arial" panose="020B0604020202020204" pitchFamily="34" charset="0"/>
+                <a:cs typeface="Arial" panose="020B0604020202020204" pitchFamily="34" charset="0"/>
+              </a:rPr>
+              <a:t>PS </a:t>
+            </a:r>
+            <a:r>
+              <a:rPr lang="en-US" sz="2800" b="1" dirty="0" smtClean="0">
+                <a:latin typeface="Arial" panose="020B0604020202020204" pitchFamily="34" charset="0"/>
+                <a:cs typeface="Arial" panose="020B0604020202020204" pitchFamily="34" charset="0"/>
+              </a:rPr>
+              <a:t>19-2 -  As</a:t>
+            </a:r>
+            <a:r>
+              <a:rPr lang="en-US" sz="2800" b="1" dirty="0">
+                <a:latin typeface="Arial" panose="020B0604020202020204" pitchFamily="34" charset="0"/>
+                <a:cs typeface="Arial" panose="020B0604020202020204" pitchFamily="34" charset="0"/>
+              </a:rPr>
+              <a:t> also, according to </a:t>
+            </a:r>
+            <a:r>
+              <a:rPr lang="en-US" sz="2800" b="1" dirty="0" smtClean="0">
+                <a:latin typeface="Arial" panose="020B0604020202020204" pitchFamily="34" charset="0"/>
+                <a:cs typeface="Arial" panose="020B0604020202020204" pitchFamily="34" charset="0"/>
+              </a:rPr>
+              <a:t>Kauṇḍinya</a:t>
+            </a:r>
+            <a:r>
+              <a:rPr lang="en-US" sz="2800" b="1" dirty="0">
+                <a:latin typeface="Arial" panose="020B0604020202020204" pitchFamily="34" charset="0"/>
+                <a:cs typeface="Arial" panose="020B0604020202020204" pitchFamily="34" charset="0"/>
+              </a:rPr>
+              <a:t>, </a:t>
+            </a:r>
+            <a:r>
+              <a:rPr lang="en-US" sz="2800" b="1" dirty="0" smtClean="0">
+                <a:latin typeface="Arial" panose="020B0604020202020204" pitchFamily="34" charset="0"/>
+                <a:cs typeface="Arial" panose="020B0604020202020204" pitchFamily="34" charset="0"/>
+              </a:rPr>
+              <a:t/>
+            </a:r>
+            <a:br>
+              <a:rPr lang="en-US" sz="2800" b="1" dirty="0" smtClean="0">
+                <a:latin typeface="Arial" panose="020B0604020202020204" pitchFamily="34" charset="0"/>
+                <a:cs typeface="Arial" panose="020B0604020202020204" pitchFamily="34" charset="0"/>
+              </a:rPr>
+            </a:br>
+            <a:r>
+              <a:rPr lang="en-US" sz="2800" b="1" dirty="0" smtClean="0">
+                <a:latin typeface="Arial" panose="020B0604020202020204" pitchFamily="34" charset="0"/>
+                <a:cs typeface="Arial" panose="020B0604020202020204" pitchFamily="34" charset="0"/>
+              </a:rPr>
+              <a:t>when</a:t>
+            </a:r>
+            <a:r>
+              <a:rPr lang="en-US" sz="2800" b="1" dirty="0">
+                <a:latin typeface="Arial" panose="020B0604020202020204" pitchFamily="34" charset="0"/>
+                <a:cs typeface="Arial" panose="020B0604020202020204" pitchFamily="34" charset="0"/>
+              </a:rPr>
+              <a:t> a pracaya precedes</a:t>
+            </a:r>
+          </a:p>
+        </p:txBody>
+      </p:sp>
+    </p:spTree>
+    <p:extLst>
+      <p:ext uri="{BB962C8B-B14F-4D97-AF65-F5344CB8AC3E}">
+        <p14:creationId xmlns:p14="http://schemas.microsoft.com/office/powerpoint/2010/main" val="4131985034"/>
       </p:ext>
     </p:extLst>
   </p:cSld>
@@ -13369,15 +14637,7 @@
           <a:p>
             <a:r>
               <a:rPr lang="en-US" dirty="0" smtClean="0"/>
-              <a:t>Summary of </a:t>
-            </a:r>
-            <a:r>
-              <a:rPr lang="en-US" dirty="0" err="1" smtClean="0"/>
-              <a:t>Swaram</a:t>
-            </a:r>
-            <a:r>
-              <a:rPr lang="en-US" dirty="0" smtClean="0"/>
-              <a:t> Part 1 and 2</a:t>
+              <a:t>Summary of Swaram Part 1 and 2</a:t>
             </a:r>
             <a:endParaRPr lang="en-US" dirty="0"/>
           </a:p>
@@ -14001,7 +15261,7 @@
           <a:p>
             <a:r>
               <a:rPr lang="en-US" dirty="0" smtClean="0"/>
-              <a:t>Definition Pracaya </a:t>
+              <a:t>Definition Pracaya – Swaram 4 </a:t>
             </a:r>
             <a:endParaRPr lang="en-US" dirty="0"/>
           </a:p>
@@ -14025,7 +15285,7 @@
         </p:spPr>
         <p:txBody>
           <a:bodyPr>
-            <a:normAutofit lnSpcReduction="10000"/>
+            <a:normAutofit/>
           </a:bodyPr>
           <a:lstStyle/>
           <a:p>
@@ -14034,22 +15294,19 @@
                 <a:latin typeface="Arial" panose="020B0604020202020204" pitchFamily="34" charset="0"/>
                 <a:cs typeface="Arial" panose="020B0604020202020204" pitchFamily="34" charset="0"/>
               </a:rPr>
-              <a:t>Pracaya is a collection or accumulation of letters that get a same </a:t>
-            </a:r>
-            <a:r>
-              <a:rPr lang="en-US" sz="2800" b="1" dirty="0" err="1">
-                <a:latin typeface="Arial" panose="020B0604020202020204" pitchFamily="34" charset="0"/>
-                <a:cs typeface="Arial" panose="020B0604020202020204" pitchFamily="34" charset="0"/>
-              </a:rPr>
-              <a:t>Swara</a:t>
-            </a:r>
-            <a:r>
-              <a:rPr lang="en-US" sz="2800" b="1" dirty="0">
-                <a:latin typeface="Arial" panose="020B0604020202020204" pitchFamily="34" charset="0"/>
-                <a:cs typeface="Arial" panose="020B0604020202020204" pitchFamily="34" charset="0"/>
-              </a:rPr>
-              <a:t> </a:t>
-            </a:r>
+              <a:t>Pracaya is a collection or accumulation of letters that get a same Swara </a:t>
+            </a:r>
+            <a:r>
+              <a:rPr lang="en-US" sz="2800" b="1" dirty="0" smtClean="0">
+                <a:latin typeface="Arial" panose="020B0604020202020204" pitchFamily="34" charset="0"/>
+                <a:cs typeface="Arial" panose="020B0604020202020204" pitchFamily="34" charset="0"/>
+              </a:rPr>
+              <a:t>tone</a:t>
+            </a:r>
+            <a:endParaRPr lang="en-US" sz="2800" b="1" dirty="0">
+              <a:latin typeface="Arial" panose="020B0604020202020204" pitchFamily="34" charset="0"/>
+              <a:cs typeface="Arial" panose="020B0604020202020204" pitchFamily="34" charset="0"/>
+            </a:endParaRPr>
           </a:p>
           <a:p>
             <a:pPr lvl="1"/>
@@ -14220,32 +15477,6 @@
               <a:latin typeface="Arial" panose="020B0604020202020204" pitchFamily="34" charset="0"/>
               <a:cs typeface="Arial" panose="020B0604020202020204" pitchFamily="34" charset="0"/>
             </a:endParaRPr>
-          </a:p>
-          <a:p>
-            <a:r>
-              <a:rPr lang="en-US" sz="2800" b="1" dirty="0" smtClean="0">
-                <a:solidFill>
-                  <a:schemeClr val="accent2"/>
-                </a:solidFill>
-                <a:latin typeface="Arial" panose="020B0604020202020204" pitchFamily="34" charset="0"/>
-                <a:cs typeface="Arial" panose="020B0604020202020204" pitchFamily="34" charset="0"/>
-              </a:rPr>
-              <a:t>Suresh this has not been started</a:t>
-            </a:r>
-            <a:r>
-              <a:rPr lang="en-US" sz="2800" b="1" dirty="0" smtClean="0">
-                <a:latin typeface="Arial" panose="020B0604020202020204" pitchFamily="34" charset="0"/>
-                <a:cs typeface="Arial" panose="020B0604020202020204" pitchFamily="34" charset="0"/>
-              </a:rPr>
-              <a:t> </a:t>
-            </a:r>
-            <a:endParaRPr lang="en-US" sz="2800" b="1" dirty="0">
-              <a:latin typeface="Arial" panose="020B0604020202020204" pitchFamily="34" charset="0"/>
-              <a:cs typeface="Arial" panose="020B0604020202020204" pitchFamily="34" charset="0"/>
-            </a:endParaRPr>
-          </a:p>
-          <a:p>
-            <a:endParaRPr lang="en-US" dirty="0"/>
           </a:p>
         </p:txBody>
       </p:sp>
@@ -14253,6 +15484,730 @@
     <p:extLst>
       <p:ext uri="{BB962C8B-B14F-4D97-AF65-F5344CB8AC3E}">
         <p14:creationId xmlns:p14="http://schemas.microsoft.com/office/powerpoint/2010/main" val="583919645"/>
+      </p:ext>
+    </p:extLst>
+  </p:cSld>
+  <p:clrMapOvr>
+    <a:masterClrMapping/>
+  </p:clrMapOvr>
+  <p:timing>
+    <p:tnLst>
+      <p:par>
+        <p:cTn id="1" dur="indefinite" restart="never" nodeType="tmRoot"/>
+      </p:par>
+    </p:tnLst>
+  </p:timing>
+</p:sld>
+</file>
+
+<file path=ppt/slides/slide6.xml><?xml version="1.0" encoding="utf-8"?>
+<p:sld xmlns:a="http://schemas.openxmlformats.org/drawingml/2006/main" xmlns:r="http://schemas.openxmlformats.org/officeDocument/2006/relationships" xmlns:p="http://schemas.openxmlformats.org/presentationml/2006/main">
+  <p:cSld>
+    <p:spTree>
+      <p:nvGrpSpPr>
+        <p:cNvPr id="1" name=""/>
+        <p:cNvGrpSpPr/>
+        <p:nvPr/>
+      </p:nvGrpSpPr>
+      <p:grpSpPr>
+        <a:xfrm>
+          <a:off x="0" y="0"/>
+          <a:ext cx="0" cy="0"/>
+          <a:chOff x="0" y="0"/>
+          <a:chExt cx="0" cy="0"/>
+        </a:xfrm>
+      </p:grpSpPr>
+      <p:sp>
+        <p:nvSpPr>
+          <p:cNvPr id="2" name="Title 1"/>
+          <p:cNvSpPr>
+            <a:spLocks noGrp="1"/>
+          </p:cNvSpPr>
+          <p:nvPr>
+            <p:ph type="title"/>
+          </p:nvPr>
+        </p:nvSpPr>
+        <p:spPr>
+          <a:xfrm>
+            <a:off x="1154955" y="508000"/>
+            <a:ext cx="8598646" cy="1172632"/>
+          </a:xfrm>
+        </p:spPr>
+        <p:txBody>
+          <a:bodyPr/>
+          <a:lstStyle/>
+          <a:p>
+            <a:r>
+              <a:rPr lang="en-US" dirty="0" smtClean="0"/>
+              <a:t>Flow Order of Swarams in Vedic Statements</a:t>
+            </a:r>
+            <a:endParaRPr lang="en-US" dirty="0"/>
+          </a:p>
+        </p:txBody>
+      </p:sp>
+      <p:sp>
+        <p:nvSpPr>
+          <p:cNvPr id="3" name="Content Placeholder 2"/>
+          <p:cNvSpPr>
+            <a:spLocks noGrp="1"/>
+          </p:cNvSpPr>
+          <p:nvPr>
+            <p:ph idx="1"/>
+          </p:nvPr>
+        </p:nvSpPr>
+        <p:spPr>
+          <a:xfrm>
+            <a:off x="1090708" y="2255157"/>
+            <a:ext cx="9170892" cy="4102100"/>
+          </a:xfrm>
+        </p:spPr>
+        <p:txBody>
+          <a:bodyPr>
+            <a:normAutofit lnSpcReduction="10000"/>
+          </a:bodyPr>
+          <a:lstStyle/>
+          <a:p>
+            <a:r>
+              <a:rPr lang="en-US" sz="2800" b="1" dirty="0" smtClean="0">
+                <a:latin typeface="Arial" panose="020B0604020202020204" pitchFamily="34" charset="0"/>
+                <a:cs typeface="Arial" panose="020B0604020202020204" pitchFamily="34" charset="0"/>
+              </a:rPr>
+              <a:t>Starting letters can be pracaya/</a:t>
+            </a:r>
+            <a:r>
+              <a:rPr lang="en-US" sz="2800" b="1" dirty="0" err="1" smtClean="0">
+                <a:latin typeface="Arial" panose="020B0604020202020204" pitchFamily="34" charset="0"/>
+                <a:cs typeface="Arial" panose="020B0604020202020204" pitchFamily="34" charset="0"/>
+              </a:rPr>
+              <a:t>sannatara</a:t>
+            </a:r>
+            <a:endParaRPr lang="en-US" sz="2800" b="1" dirty="0" smtClean="0">
+              <a:latin typeface="Arial" panose="020B0604020202020204" pitchFamily="34" charset="0"/>
+              <a:cs typeface="Arial" panose="020B0604020202020204" pitchFamily="34" charset="0"/>
+            </a:endParaRPr>
+          </a:p>
+          <a:p>
+            <a:pPr lvl="1"/>
+            <a:r>
+              <a:rPr lang="en-US" sz="2600" b="1" dirty="0" smtClean="0">
+                <a:latin typeface="Arial" panose="020B0604020202020204" pitchFamily="34" charset="0"/>
+                <a:cs typeface="Arial" panose="020B0604020202020204" pitchFamily="34" charset="0"/>
+              </a:rPr>
+              <a:t>Ending in a udAttam/Swaritam combine</a:t>
+            </a:r>
+          </a:p>
+          <a:p>
+            <a:pPr lvl="1"/>
+            <a:r>
+              <a:rPr lang="en-US" sz="2400" b="1" dirty="0" smtClean="0">
+                <a:latin typeface="Arial" panose="020B0604020202020204" pitchFamily="34" charset="0"/>
+                <a:cs typeface="Arial" panose="020B0604020202020204" pitchFamily="34" charset="0"/>
+              </a:rPr>
+              <a:t>pracaya/</a:t>
+            </a:r>
+            <a:r>
+              <a:rPr lang="en-US" sz="2400" b="1" dirty="0" err="1" smtClean="0">
+                <a:latin typeface="Arial" panose="020B0604020202020204" pitchFamily="34" charset="0"/>
+                <a:cs typeface="Arial" panose="020B0604020202020204" pitchFamily="34" charset="0"/>
+              </a:rPr>
+              <a:t>sannatara</a:t>
+            </a:r>
+            <a:r>
+              <a:rPr lang="en-US" sz="2400" b="1" dirty="0" smtClean="0">
+                <a:latin typeface="Arial" panose="020B0604020202020204" pitchFamily="34" charset="0"/>
+                <a:cs typeface="Arial" panose="020B0604020202020204" pitchFamily="34" charset="0"/>
+              </a:rPr>
+              <a:t> , udAttam Swaritam</a:t>
+            </a:r>
+            <a:endParaRPr lang="en-US" sz="2400" b="1" dirty="0">
+              <a:latin typeface="Arial" panose="020B0604020202020204" pitchFamily="34" charset="0"/>
+              <a:cs typeface="Arial" panose="020B0604020202020204" pitchFamily="34" charset="0"/>
+            </a:endParaRPr>
+          </a:p>
+          <a:p>
+            <a:r>
+              <a:rPr lang="en-US" sz="2800" b="1" dirty="0" smtClean="0">
+                <a:latin typeface="Arial" panose="020B0604020202020204" pitchFamily="34" charset="0"/>
+                <a:cs typeface="Arial" panose="020B0604020202020204" pitchFamily="34" charset="0"/>
+              </a:rPr>
+              <a:t>Starting letter is anudAttam (because of next udAttam </a:t>
+            </a:r>
+          </a:p>
+          <a:p>
+            <a:pPr lvl="1"/>
+            <a:r>
+              <a:rPr lang="en-US" sz="2600" b="1" dirty="0" smtClean="0">
+                <a:latin typeface="Arial" panose="020B0604020202020204" pitchFamily="34" charset="0"/>
+                <a:cs typeface="Arial" panose="020B0604020202020204" pitchFamily="34" charset="0"/>
+              </a:rPr>
+              <a:t>anudAttam, </a:t>
+            </a:r>
+            <a:r>
+              <a:rPr lang="en-US" sz="2600" b="1" dirty="0" err="1" smtClean="0">
+                <a:latin typeface="Arial" panose="020B0604020202020204" pitchFamily="34" charset="0"/>
+                <a:cs typeface="Arial" panose="020B0604020202020204" pitchFamily="34" charset="0"/>
+              </a:rPr>
+              <a:t>udAttam,Swaritam</a:t>
+            </a:r>
+            <a:r>
+              <a:rPr lang="en-US" sz="2600" b="1" dirty="0" smtClean="0">
+                <a:latin typeface="Arial" panose="020B0604020202020204" pitchFamily="34" charset="0"/>
+                <a:cs typeface="Arial" panose="020B0604020202020204" pitchFamily="34" charset="0"/>
+              </a:rPr>
+              <a:t>, </a:t>
+            </a:r>
+            <a:r>
+              <a:rPr lang="en-US" sz="2600" b="1" dirty="0" err="1" smtClean="0">
+                <a:latin typeface="Arial" panose="020B0604020202020204" pitchFamily="34" charset="0"/>
+                <a:cs typeface="Arial" panose="020B0604020202020204" pitchFamily="34" charset="0"/>
+              </a:rPr>
+              <a:t>EkaSruti</a:t>
+            </a:r>
+            <a:endParaRPr lang="en-US" sz="2600" b="1" dirty="0" smtClean="0">
+              <a:latin typeface="Arial" panose="020B0604020202020204" pitchFamily="34" charset="0"/>
+              <a:cs typeface="Arial" panose="020B0604020202020204" pitchFamily="34" charset="0"/>
+            </a:endParaRPr>
+          </a:p>
+          <a:p>
+            <a:r>
+              <a:rPr lang="en-US" sz="2800" b="1" dirty="0" smtClean="0">
+                <a:latin typeface="Arial" panose="020B0604020202020204" pitchFamily="34" charset="0"/>
+                <a:cs typeface="Arial" panose="020B0604020202020204" pitchFamily="34" charset="0"/>
+              </a:rPr>
+              <a:t>Starting letter is udAttam</a:t>
+            </a:r>
+          </a:p>
+          <a:p>
+            <a:pPr lvl="1"/>
+            <a:r>
+              <a:rPr lang="en-US" sz="2600" b="1" dirty="0" err="1" smtClean="0">
+                <a:latin typeface="Arial" panose="020B0604020202020204" pitchFamily="34" charset="0"/>
+                <a:cs typeface="Arial" panose="020B0604020202020204" pitchFamily="34" charset="0"/>
+              </a:rPr>
+              <a:t>udAttam,Swaritam</a:t>
+            </a:r>
+            <a:r>
+              <a:rPr lang="en-US" sz="2600" b="1" dirty="0" smtClean="0">
+                <a:latin typeface="Arial" panose="020B0604020202020204" pitchFamily="34" charset="0"/>
+                <a:cs typeface="Arial" panose="020B0604020202020204" pitchFamily="34" charset="0"/>
+              </a:rPr>
+              <a:t>, </a:t>
+            </a:r>
+            <a:r>
+              <a:rPr lang="en-US" sz="2600" b="1" dirty="0" err="1" smtClean="0">
+                <a:latin typeface="Arial" panose="020B0604020202020204" pitchFamily="34" charset="0"/>
+                <a:cs typeface="Arial" panose="020B0604020202020204" pitchFamily="34" charset="0"/>
+              </a:rPr>
+              <a:t>EkaSruti</a:t>
+            </a:r>
+            <a:endParaRPr lang="en-US" sz="2600" b="1" dirty="0" smtClean="0">
+              <a:latin typeface="Arial" panose="020B0604020202020204" pitchFamily="34" charset="0"/>
+              <a:cs typeface="Arial" panose="020B0604020202020204" pitchFamily="34" charset="0"/>
+            </a:endParaRPr>
+          </a:p>
+          <a:p>
+            <a:pPr lvl="1"/>
+            <a:endParaRPr lang="en-US" sz="2600" b="1" dirty="0" smtClean="0">
+              <a:latin typeface="Arial" panose="020B0604020202020204" pitchFamily="34" charset="0"/>
+              <a:cs typeface="Arial" panose="020B0604020202020204" pitchFamily="34" charset="0"/>
+            </a:endParaRPr>
+          </a:p>
+        </p:txBody>
+      </p:sp>
+    </p:spTree>
+    <p:extLst>
+      <p:ext uri="{BB962C8B-B14F-4D97-AF65-F5344CB8AC3E}">
+        <p14:creationId xmlns:p14="http://schemas.microsoft.com/office/powerpoint/2010/main" val="224323866"/>
+      </p:ext>
+    </p:extLst>
+  </p:cSld>
+  <p:clrMapOvr>
+    <a:masterClrMapping/>
+  </p:clrMapOvr>
+  <p:timing>
+    <p:tnLst>
+      <p:par>
+        <p:cTn id="1" dur="indefinite" restart="never" nodeType="tmRoot"/>
+      </p:par>
+    </p:tnLst>
+  </p:timing>
+</p:sld>
+</file>
+
+<file path=ppt/slides/slide7.xml><?xml version="1.0" encoding="utf-8"?>
+<p:sld xmlns:a="http://schemas.openxmlformats.org/drawingml/2006/main" xmlns:r="http://schemas.openxmlformats.org/officeDocument/2006/relationships" xmlns:p="http://schemas.openxmlformats.org/presentationml/2006/main">
+  <p:cSld>
+    <p:spTree>
+      <p:nvGrpSpPr>
+        <p:cNvPr id="1" name=""/>
+        <p:cNvGrpSpPr/>
+        <p:nvPr/>
+      </p:nvGrpSpPr>
+      <p:grpSpPr>
+        <a:xfrm>
+          <a:off x="0" y="0"/>
+          <a:ext cx="0" cy="0"/>
+          <a:chOff x="0" y="0"/>
+          <a:chExt cx="0" cy="0"/>
+        </a:xfrm>
+      </p:grpSpPr>
+      <p:sp>
+        <p:nvSpPr>
+          <p:cNvPr id="2" name="Title 1"/>
+          <p:cNvSpPr>
+            <a:spLocks noGrp="1"/>
+          </p:cNvSpPr>
+          <p:nvPr>
+            <p:ph type="title"/>
+          </p:nvPr>
+        </p:nvSpPr>
+        <p:spPr/>
+        <p:txBody>
+          <a:bodyPr/>
+          <a:lstStyle/>
+          <a:p>
+            <a:r>
+              <a:rPr lang="en-US" dirty="0"/>
+              <a:t>Flow Order of Swarams in Vedic Statements</a:t>
+            </a:r>
+          </a:p>
+        </p:txBody>
+      </p:sp>
+      <p:sp>
+        <p:nvSpPr>
+          <p:cNvPr id="3" name="Content Placeholder 2"/>
+          <p:cNvSpPr>
+            <a:spLocks noGrp="1"/>
+          </p:cNvSpPr>
+          <p:nvPr>
+            <p:ph idx="1"/>
+          </p:nvPr>
+        </p:nvSpPr>
+        <p:spPr>
+          <a:xfrm>
+            <a:off x="679092" y="2356756"/>
+            <a:ext cx="9237275" cy="3811814"/>
+          </a:xfrm>
+        </p:spPr>
+        <p:txBody>
+          <a:bodyPr>
+            <a:normAutofit lnSpcReduction="10000"/>
+          </a:bodyPr>
+          <a:lstStyle/>
+          <a:p>
+            <a:r>
+              <a:rPr lang="en-US" sz="2800" b="1" dirty="0" smtClean="0">
+                <a:latin typeface="Arial" panose="020B0604020202020204" pitchFamily="34" charset="0"/>
+                <a:cs typeface="Arial" panose="020B0604020202020204" pitchFamily="34" charset="0"/>
+              </a:rPr>
+              <a:t>Variation after udAttam</a:t>
+            </a:r>
+          </a:p>
+          <a:p>
+            <a:pPr lvl="1"/>
+            <a:r>
+              <a:rPr lang="en-US" sz="2600" b="1" dirty="0">
+                <a:latin typeface="Arial" panose="020B0604020202020204" pitchFamily="34" charset="0"/>
+                <a:cs typeface="Arial" panose="020B0604020202020204" pitchFamily="34" charset="0"/>
+              </a:rPr>
+              <a:t>u</a:t>
+            </a:r>
+            <a:r>
+              <a:rPr lang="en-US" sz="2600" b="1" dirty="0" smtClean="0">
+                <a:latin typeface="Arial" panose="020B0604020202020204" pitchFamily="34" charset="0"/>
+                <a:cs typeface="Arial" panose="020B0604020202020204" pitchFamily="34" charset="0"/>
+              </a:rPr>
+              <a:t>dAttam, udAttam</a:t>
+            </a:r>
+          </a:p>
+          <a:p>
+            <a:pPr lvl="1"/>
+            <a:r>
+              <a:rPr lang="en-US" sz="2600" b="1" dirty="0" smtClean="0">
+                <a:latin typeface="Arial" panose="020B0604020202020204" pitchFamily="34" charset="0"/>
+                <a:cs typeface="Arial" panose="020B0604020202020204" pitchFamily="34" charset="0"/>
+              </a:rPr>
+              <a:t>udAttam, anudAttam</a:t>
+            </a:r>
+          </a:p>
+          <a:p>
+            <a:pPr lvl="1"/>
+            <a:r>
+              <a:rPr lang="en-US" sz="2600" b="1" dirty="0" smtClean="0">
+                <a:latin typeface="Arial" panose="020B0604020202020204" pitchFamily="34" charset="0"/>
+                <a:cs typeface="Arial" panose="020B0604020202020204" pitchFamily="34" charset="0"/>
+              </a:rPr>
+              <a:t>udAttam can follow udAttam </a:t>
+            </a:r>
+          </a:p>
+          <a:p>
+            <a:pPr lvl="1"/>
+            <a:r>
+              <a:rPr lang="en-US" sz="2600" b="1" dirty="0" smtClean="0">
+                <a:latin typeface="Arial" panose="020B0604020202020204" pitchFamily="34" charset="0"/>
+                <a:cs typeface="Arial" panose="020B0604020202020204" pitchFamily="34" charset="0"/>
+              </a:rPr>
+              <a:t>udAttam which follows another udAttam does not acquire Swaritam</a:t>
+            </a:r>
+          </a:p>
+          <a:p>
+            <a:r>
+              <a:rPr lang="en-US" sz="2800" b="1" dirty="0" smtClean="0">
+                <a:latin typeface="Arial" panose="020B0604020202020204" pitchFamily="34" charset="0"/>
+                <a:cs typeface="Arial" panose="020B0604020202020204" pitchFamily="34" charset="0"/>
+              </a:rPr>
+              <a:t>udAttam, anudAttam, udAttam, Swaritam</a:t>
+            </a:r>
+          </a:p>
+          <a:p>
+            <a:r>
+              <a:rPr lang="en-US" sz="2800" b="1" dirty="0" smtClean="0">
+                <a:latin typeface="Arial" panose="020B0604020202020204" pitchFamily="34" charset="0"/>
+                <a:cs typeface="Arial" panose="020B0604020202020204" pitchFamily="34" charset="0"/>
+              </a:rPr>
+              <a:t>udAttam, anudAttam, udAttam, anudAttam</a:t>
+            </a:r>
+            <a:endParaRPr lang="en-US" sz="2800" b="1" dirty="0">
+              <a:latin typeface="Arial" panose="020B0604020202020204" pitchFamily="34" charset="0"/>
+              <a:cs typeface="Arial" panose="020B0604020202020204" pitchFamily="34" charset="0"/>
+            </a:endParaRPr>
+          </a:p>
+        </p:txBody>
+      </p:sp>
+    </p:spTree>
+    <p:extLst>
+      <p:ext uri="{BB962C8B-B14F-4D97-AF65-F5344CB8AC3E}">
+        <p14:creationId xmlns:p14="http://schemas.microsoft.com/office/powerpoint/2010/main" val="2048900159"/>
+      </p:ext>
+    </p:extLst>
+  </p:cSld>
+  <p:clrMapOvr>
+    <a:masterClrMapping/>
+  </p:clrMapOvr>
+  <p:timing>
+    <p:tnLst>
+      <p:par>
+        <p:cTn id="1" dur="indefinite" restart="never" nodeType="tmRoot"/>
+      </p:par>
+    </p:tnLst>
+  </p:timing>
+</p:sld>
+</file>
+
+<file path=ppt/slides/slide8.xml><?xml version="1.0" encoding="utf-8"?>
+<p:sld xmlns:a="http://schemas.openxmlformats.org/drawingml/2006/main" xmlns:r="http://schemas.openxmlformats.org/officeDocument/2006/relationships" xmlns:p="http://schemas.openxmlformats.org/presentationml/2006/main">
+  <p:cSld>
+    <p:spTree>
+      <p:nvGrpSpPr>
+        <p:cNvPr id="1" name=""/>
+        <p:cNvGrpSpPr/>
+        <p:nvPr/>
+      </p:nvGrpSpPr>
+      <p:grpSpPr>
+        <a:xfrm>
+          <a:off x="0" y="0"/>
+          <a:ext cx="0" cy="0"/>
+          <a:chOff x="0" y="0"/>
+          <a:chExt cx="0" cy="0"/>
+        </a:xfrm>
+      </p:grpSpPr>
+      <p:sp>
+        <p:nvSpPr>
+          <p:cNvPr id="2" name="Title 1"/>
+          <p:cNvSpPr>
+            <a:spLocks noGrp="1"/>
+          </p:cNvSpPr>
+          <p:nvPr>
+            <p:ph type="title"/>
+          </p:nvPr>
+        </p:nvSpPr>
+        <p:spPr>
+          <a:xfrm>
+            <a:off x="1154954" y="973667"/>
+            <a:ext cx="8825659" cy="1029303"/>
+          </a:xfrm>
+        </p:spPr>
+        <p:txBody>
+          <a:bodyPr/>
+          <a:lstStyle/>
+          <a:p>
+            <a:r>
+              <a:rPr lang="en-US" dirty="0"/>
+              <a:t>Flow Order of Swarams in Vedic Statements</a:t>
+            </a:r>
+          </a:p>
+        </p:txBody>
+      </p:sp>
+      <p:sp>
+        <p:nvSpPr>
+          <p:cNvPr id="3" name="Content Placeholder 2"/>
+          <p:cNvSpPr>
+            <a:spLocks noGrp="1"/>
+          </p:cNvSpPr>
+          <p:nvPr>
+            <p:ph idx="1"/>
+          </p:nvPr>
+        </p:nvSpPr>
+        <p:spPr/>
+        <p:txBody>
+          <a:bodyPr/>
+          <a:lstStyle/>
+          <a:p>
+            <a:r>
+              <a:rPr lang="en-US" sz="2800" b="1" dirty="0" smtClean="0">
+                <a:latin typeface="Arial" panose="020B0604020202020204" pitchFamily="34" charset="0"/>
+                <a:cs typeface="Arial" panose="020B0604020202020204" pitchFamily="34" charset="0"/>
+              </a:rPr>
+              <a:t>udAttam has to be preceded by anudAttam </a:t>
+            </a:r>
+            <a:br>
+              <a:rPr lang="en-US" sz="2800" b="1" dirty="0" smtClean="0">
+                <a:latin typeface="Arial" panose="020B0604020202020204" pitchFamily="34" charset="0"/>
+                <a:cs typeface="Arial" panose="020B0604020202020204" pitchFamily="34" charset="0"/>
+              </a:rPr>
+            </a:br>
+            <a:r>
+              <a:rPr lang="en-US" sz="2800" b="1" dirty="0" smtClean="0">
+                <a:latin typeface="Arial" panose="020B0604020202020204" pitchFamily="34" charset="0"/>
+                <a:cs typeface="Arial" panose="020B0604020202020204" pitchFamily="34" charset="0"/>
+              </a:rPr>
+              <a:t>as a rule</a:t>
+            </a:r>
+          </a:p>
+          <a:p>
+            <a:r>
+              <a:rPr lang="en-US" sz="2800" b="1" dirty="0" smtClean="0">
+                <a:latin typeface="Arial" panose="020B0604020202020204" pitchFamily="34" charset="0"/>
+                <a:cs typeface="Arial" panose="020B0604020202020204" pitchFamily="34" charset="0"/>
+              </a:rPr>
+              <a:t>Many </a:t>
+            </a:r>
+            <a:r>
+              <a:rPr lang="en-US" sz="2800" b="1" dirty="0" err="1" smtClean="0">
+                <a:latin typeface="Arial" panose="020B0604020202020204" pitchFamily="34" charset="0"/>
+                <a:cs typeface="Arial" panose="020B0604020202020204" pitchFamily="34" charset="0"/>
+              </a:rPr>
+              <a:t>udAttams</a:t>
+            </a:r>
+            <a:r>
+              <a:rPr lang="en-US" sz="2800" b="1" dirty="0" smtClean="0">
+                <a:latin typeface="Arial" panose="020B0604020202020204" pitchFamily="34" charset="0"/>
+                <a:cs typeface="Arial" panose="020B0604020202020204" pitchFamily="34" charset="0"/>
+              </a:rPr>
+              <a:t> can be formed due to Sandhi</a:t>
+            </a:r>
+          </a:p>
+          <a:p>
+            <a:r>
+              <a:rPr lang="en-US" sz="2800" b="1" dirty="0" smtClean="0">
+                <a:latin typeface="Arial" panose="020B0604020202020204" pitchFamily="34" charset="0"/>
+                <a:cs typeface="Arial" panose="020B0604020202020204" pitchFamily="34" charset="0"/>
+              </a:rPr>
+              <a:t>There are special Sandhi rules where udAttam and anudAttam combination creates Swaritam</a:t>
+            </a:r>
+          </a:p>
+          <a:p>
+            <a:endParaRPr lang="en-US" dirty="0"/>
+          </a:p>
+        </p:txBody>
+      </p:sp>
+    </p:spTree>
+    <p:extLst>
+      <p:ext uri="{BB962C8B-B14F-4D97-AF65-F5344CB8AC3E}">
+        <p14:creationId xmlns:p14="http://schemas.microsoft.com/office/powerpoint/2010/main" val="3739041424"/>
+      </p:ext>
+    </p:extLst>
+  </p:cSld>
+  <p:clrMapOvr>
+    <a:masterClrMapping/>
+  </p:clrMapOvr>
+  <p:timing>
+    <p:tnLst>
+      <p:par>
+        <p:cTn id="1" dur="indefinite" restart="never" nodeType="tmRoot"/>
+      </p:par>
+    </p:tnLst>
+  </p:timing>
+</p:sld>
+</file>
+
+<file path=ppt/slides/slide9.xml><?xml version="1.0" encoding="utf-8"?>
+<p:sld xmlns:a="http://schemas.openxmlformats.org/drawingml/2006/main" xmlns:r="http://schemas.openxmlformats.org/officeDocument/2006/relationships" xmlns:p="http://schemas.openxmlformats.org/presentationml/2006/main">
+  <p:cSld>
+    <p:spTree>
+      <p:nvGrpSpPr>
+        <p:cNvPr id="1" name=""/>
+        <p:cNvGrpSpPr/>
+        <p:nvPr/>
+      </p:nvGrpSpPr>
+      <p:grpSpPr>
+        <a:xfrm>
+          <a:off x="0" y="0"/>
+          <a:ext cx="0" cy="0"/>
+          <a:chOff x="0" y="0"/>
+          <a:chExt cx="0" cy="0"/>
+        </a:xfrm>
+      </p:grpSpPr>
+      <p:sp>
+        <p:nvSpPr>
+          <p:cNvPr id="2" name="Title 1"/>
+          <p:cNvSpPr>
+            <a:spLocks noGrp="1"/>
+          </p:cNvSpPr>
+          <p:nvPr>
+            <p:ph type="title"/>
+          </p:nvPr>
+        </p:nvSpPr>
+        <p:spPr>
+          <a:xfrm>
+            <a:off x="1154954" y="973667"/>
+            <a:ext cx="8825659" cy="1029303"/>
+          </a:xfrm>
+        </p:spPr>
+        <p:txBody>
+          <a:bodyPr/>
+          <a:lstStyle/>
+          <a:p>
+            <a:r>
+              <a:rPr lang="en-US" dirty="0"/>
+              <a:t>Flow Order of Swarams in Vedic Statements</a:t>
+            </a:r>
+          </a:p>
+        </p:txBody>
+      </p:sp>
+      <p:sp>
+        <p:nvSpPr>
+          <p:cNvPr id="3" name="Content Placeholder 2"/>
+          <p:cNvSpPr>
+            <a:spLocks noGrp="1"/>
+          </p:cNvSpPr>
+          <p:nvPr>
+            <p:ph idx="1"/>
+          </p:nvPr>
+        </p:nvSpPr>
+        <p:spPr/>
+        <p:txBody>
+          <a:bodyPr/>
+          <a:lstStyle/>
+          <a:p>
+            <a:r>
+              <a:rPr lang="en-US" sz="2800" b="1" dirty="0" smtClean="0">
+                <a:latin typeface="Arial" panose="020B0604020202020204" pitchFamily="34" charset="0"/>
+                <a:cs typeface="Arial" panose="020B0604020202020204" pitchFamily="34" charset="0"/>
+              </a:rPr>
+              <a:t>If Swaritam is formed it can be followed by</a:t>
+            </a:r>
+          </a:p>
+          <a:p>
+            <a:pPr lvl="1"/>
+            <a:r>
+              <a:rPr lang="en-US" sz="2600" b="1" dirty="0" err="1" smtClean="0">
+                <a:latin typeface="Arial" panose="020B0604020202020204" pitchFamily="34" charset="0"/>
+                <a:cs typeface="Arial" panose="020B0604020202020204" pitchFamily="34" charset="0"/>
+              </a:rPr>
+              <a:t>EkaSruti</a:t>
+            </a:r>
+            <a:r>
+              <a:rPr lang="en-US" sz="2600" b="1" dirty="0" smtClean="0">
+                <a:latin typeface="Arial" panose="020B0604020202020204" pitchFamily="34" charset="0"/>
+                <a:cs typeface="Arial" panose="020B0604020202020204" pitchFamily="34" charset="0"/>
+              </a:rPr>
+              <a:t>, Pracaya/</a:t>
+            </a:r>
+            <a:r>
+              <a:rPr lang="en-US" sz="2600" b="1" dirty="0" err="1" smtClean="0">
+                <a:latin typeface="Arial" panose="020B0604020202020204" pitchFamily="34" charset="0"/>
+                <a:cs typeface="Arial" panose="020B0604020202020204" pitchFamily="34" charset="0"/>
+              </a:rPr>
+              <a:t>Sannatara</a:t>
+            </a:r>
+            <a:endParaRPr lang="en-US" sz="2600" b="1" dirty="0" smtClean="0">
+              <a:latin typeface="Arial" panose="020B0604020202020204" pitchFamily="34" charset="0"/>
+              <a:cs typeface="Arial" panose="020B0604020202020204" pitchFamily="34" charset="0"/>
+            </a:endParaRPr>
+          </a:p>
+          <a:p>
+            <a:pPr lvl="1"/>
+            <a:r>
+              <a:rPr lang="en-US" sz="2600" b="1" dirty="0" err="1" smtClean="0">
+                <a:latin typeface="Arial" panose="020B0604020202020204" pitchFamily="34" charset="0"/>
+                <a:cs typeface="Arial" panose="020B0604020202020204" pitchFamily="34" charset="0"/>
+              </a:rPr>
+              <a:t>EkaSruti</a:t>
+            </a:r>
+            <a:r>
+              <a:rPr lang="en-US" sz="2600" b="1" dirty="0" smtClean="0">
+                <a:latin typeface="Arial" panose="020B0604020202020204" pitchFamily="34" charset="0"/>
+                <a:cs typeface="Arial" panose="020B0604020202020204" pitchFamily="34" charset="0"/>
+              </a:rPr>
+              <a:t>, </a:t>
+            </a:r>
+            <a:r>
+              <a:rPr lang="en-US" sz="2600" b="1" dirty="0" err="1" smtClean="0">
+                <a:latin typeface="Arial" panose="020B0604020202020204" pitchFamily="34" charset="0"/>
+                <a:cs typeface="Arial" panose="020B0604020202020204" pitchFamily="34" charset="0"/>
+              </a:rPr>
+              <a:t>anudAttam,udAttam</a:t>
+            </a:r>
+            <a:endParaRPr lang="en-US" sz="2600" b="1" dirty="0" smtClean="0">
+              <a:latin typeface="Arial" panose="020B0604020202020204" pitchFamily="34" charset="0"/>
+              <a:cs typeface="Arial" panose="020B0604020202020204" pitchFamily="34" charset="0"/>
+            </a:endParaRPr>
+          </a:p>
+          <a:p>
+            <a:pPr lvl="1"/>
+            <a:r>
+              <a:rPr lang="en-US" sz="2600" b="1" dirty="0" err="1" smtClean="0">
+                <a:latin typeface="Arial" panose="020B0604020202020204" pitchFamily="34" charset="0"/>
+                <a:cs typeface="Arial" panose="020B0604020202020204" pitchFamily="34" charset="0"/>
+              </a:rPr>
+              <a:t>anudAttam,udAttam,Swaritam</a:t>
+            </a:r>
+            <a:endParaRPr lang="en-US" sz="2600" b="1" dirty="0" smtClean="0">
+              <a:latin typeface="Arial" panose="020B0604020202020204" pitchFamily="34" charset="0"/>
+              <a:cs typeface="Arial" panose="020B0604020202020204" pitchFamily="34" charset="0"/>
+            </a:endParaRPr>
+          </a:p>
+          <a:p>
+            <a:pPr lvl="1"/>
+            <a:r>
+              <a:rPr lang="en-US" sz="2600" b="1" dirty="0" err="1" smtClean="0">
+                <a:latin typeface="Arial" panose="020B0604020202020204" pitchFamily="34" charset="0"/>
+                <a:cs typeface="Arial" panose="020B0604020202020204" pitchFamily="34" charset="0"/>
+              </a:rPr>
+              <a:t>udAttam,Swaritam</a:t>
+            </a:r>
+            <a:r>
+              <a:rPr lang="en-US" sz="2600" b="1" dirty="0" smtClean="0">
+                <a:latin typeface="Arial" panose="020B0604020202020204" pitchFamily="34" charset="0"/>
+                <a:cs typeface="Arial" panose="020B0604020202020204" pitchFamily="34" charset="0"/>
+              </a:rPr>
+              <a:t> – due to </a:t>
+            </a:r>
+            <a:r>
+              <a:rPr lang="en-US" sz="2600" b="1" dirty="0">
+                <a:latin typeface="Arial" panose="020B0604020202020204" pitchFamily="34" charset="0"/>
+                <a:cs typeface="Arial" panose="020B0604020202020204" pitchFamily="34" charset="0"/>
+              </a:rPr>
+              <a:t>S</a:t>
+            </a:r>
+            <a:r>
+              <a:rPr lang="en-US" sz="2600" b="1" dirty="0" smtClean="0">
+                <a:latin typeface="Arial" panose="020B0604020202020204" pitchFamily="34" charset="0"/>
+                <a:cs typeface="Arial" panose="020B0604020202020204" pitchFamily="34" charset="0"/>
+              </a:rPr>
+              <a:t>andhi rules</a:t>
+            </a:r>
+          </a:p>
+          <a:p>
+            <a:endParaRPr lang="en-US" dirty="0"/>
+          </a:p>
+        </p:txBody>
+      </p:sp>
+    </p:spTree>
+    <p:extLst>
+      <p:ext uri="{BB962C8B-B14F-4D97-AF65-F5344CB8AC3E}">
+        <p14:creationId xmlns:p14="http://schemas.microsoft.com/office/powerpoint/2010/main" val="2682314255"/>
       </p:ext>
     </p:extLst>
   </p:cSld>

</xml_diff>

<commit_message>
GS, Lecture PPT, Rudra Ghanam Pushed 24/01/2021
</commit_message>
<xml_diff>
--- a/Veda Lectures/Swaram Part 3.pptx
+++ b/Veda Lectures/Swaram Part 3.pptx
@@ -461,7 +461,7 @@
             <a:fld id="{5923F103-BC34-4FE4-A40E-EDDEECFDA5D0}" type="datetimeFigureOut">
               <a:rPr lang="en-US" dirty="0"/>
               <a:pPr/>
-              <a:t>1/19/2021</a:t>
+              <a:t>1/24/2021</a:t>
             </a:fld>
             <a:endParaRPr lang="en-US" dirty="0"/>
           </a:p>
@@ -1549,7 +1549,7 @@
           <a:p>
             <a:fld id="{923A1CC3-2375-41D4-9E03-427CAF2A4C1A}" type="datetimeFigureOut">
               <a:rPr lang="en-US" dirty="0"/>
-              <a:t>1/19/2021</a:t>
+              <a:t>1/24/2021</a:t>
             </a:fld>
             <a:endParaRPr lang="en-US" dirty="0"/>
           </a:p>
@@ -2529,7 +2529,7 @@
           <a:p>
             <a:fld id="{AFF16868-8199-4C2C-A5B1-63AEE139F88E}" type="datetimeFigureOut">
               <a:rPr lang="en-US" dirty="0"/>
-              <a:t>1/19/2021</a:t>
+              <a:t>1/24/2021</a:t>
             </a:fld>
             <a:endParaRPr lang="en-US" dirty="0"/>
           </a:p>
@@ -3663,7 +3663,7 @@
           <a:p>
             <a:fld id="{AAD9FF7F-6988-44CC-821B-644E70CD2F73}" type="datetimeFigureOut">
               <a:rPr lang="en-US" dirty="0"/>
-              <a:t>1/19/2021</a:t>
+              <a:t>1/24/2021</a:t>
             </a:fld>
             <a:endParaRPr lang="en-US" dirty="0"/>
           </a:p>
@@ -4696,7 +4696,7 @@
           <a:p>
             <a:fld id="{5C12C299-16B2-4475-990D-751901EACC14}" type="datetimeFigureOut">
               <a:rPr lang="en-US" dirty="0"/>
-              <a:t>1/19/2021</a:t>
+              <a:t>1/24/2021</a:t>
             </a:fld>
             <a:endParaRPr lang="en-US" dirty="0"/>
           </a:p>
@@ -5356,7 +5356,7 @@
           <a:p>
             <a:fld id="{9FE86839-B9D8-4651-8783-F325ECE74E65}" type="datetimeFigureOut">
               <a:rPr lang="en-US" dirty="0"/>
-              <a:t>1/19/2021</a:t>
+              <a:t>1/24/2021</a:t>
             </a:fld>
             <a:endParaRPr lang="en-US" dirty="0"/>
           </a:p>
@@ -6217,7 +6217,7 @@
           <a:p>
             <a:fld id="{FD484F64-32F6-45C5-931F-ADC1662401D0}" type="datetimeFigureOut">
               <a:rPr lang="en-US" dirty="0"/>
-              <a:t>1/19/2021</a:t>
+              <a:t>1/24/2021</a:t>
             </a:fld>
             <a:endParaRPr lang="en-US" dirty="0"/>
           </a:p>
@@ -6407,7 +6407,7 @@
           <a:p>
             <a:fld id="{53086D93-FCAC-47E0-A2EE-787E62CA814C}" type="datetimeFigureOut">
               <a:rPr lang="en-US" dirty="0"/>
-              <a:t>1/19/2021</a:t>
+              <a:t>1/24/2021</a:t>
             </a:fld>
             <a:endParaRPr lang="en-US" dirty="0"/>
           </a:p>
@@ -7379,7 +7379,7 @@
           <a:p>
             <a:fld id="{CDA879A6-0FD0-4734-A311-86BFCA472E6E}" type="datetimeFigureOut">
               <a:rPr lang="en-US" dirty="0"/>
-              <a:t>1/19/2021</a:t>
+              <a:t>1/24/2021</a:t>
             </a:fld>
             <a:endParaRPr lang="en-US" dirty="0"/>
           </a:p>
@@ -7590,7 +7590,7 @@
           <a:p>
             <a:fld id="{19C9CA7B-DFD4-44B5-8C60-D14B8CD1FB59}" type="datetimeFigureOut">
               <a:rPr lang="en-US" dirty="0"/>
-              <a:t>1/19/2021</a:t>
+              <a:t>1/24/2021</a:t>
             </a:fld>
             <a:endParaRPr lang="en-US" dirty="0"/>
           </a:p>
@@ -8624,7 +8624,7 @@
           <a:p>
             <a:fld id="{F34E6425-0181-43F2-84FC-787E803FD2F8}" type="datetimeFigureOut">
               <a:rPr lang="en-US" dirty="0"/>
-              <a:t>1/19/2021</a:t>
+              <a:t>1/24/2021</a:t>
             </a:fld>
             <a:endParaRPr lang="en-US" dirty="0"/>
           </a:p>
@@ -8896,7 +8896,7 @@
           <a:p>
             <a:fld id="{3BDB8791-F1B0-41E7-B7FD-A781E65C4266}" type="datetimeFigureOut">
               <a:rPr lang="en-US" dirty="0"/>
-              <a:t>1/19/2021</a:t>
+              <a:t>1/24/2021</a:t>
             </a:fld>
             <a:endParaRPr lang="en-US" dirty="0"/>
           </a:p>
@@ -9306,7 +9306,7 @@
           <a:p>
             <a:fld id="{5FDD63B2-E120-4ED8-B27B-C685F510A5FE}" type="datetimeFigureOut">
               <a:rPr lang="en-US" dirty="0"/>
-              <a:t>1/19/2021</a:t>
+              <a:t>1/24/2021</a:t>
             </a:fld>
             <a:endParaRPr lang="en-US" dirty="0"/>
           </a:p>
@@ -9433,7 +9433,7 @@
           <a:p>
             <a:fld id="{7AA18ACC-A947-437B-A130-35BD54FDF1E9}" type="datetimeFigureOut">
               <a:rPr lang="en-US" dirty="0"/>
-              <a:t>1/19/2021</a:t>
+              <a:t>1/24/2021</a:t>
             </a:fld>
             <a:endParaRPr lang="en-US" dirty="0"/>
           </a:p>
@@ -9528,7 +9528,7 @@
           <a:p>
             <a:fld id="{7C8D7E02-BCB8-4D50-A234-369438C08659}" type="datetimeFigureOut">
               <a:rPr lang="en-US" dirty="0"/>
-              <a:t>1/19/2021</a:t>
+              <a:t>1/24/2021</a:t>
             </a:fld>
             <a:endParaRPr lang="en-US" dirty="0"/>
           </a:p>
@@ -10609,7 +10609,7 @@
           <a:p>
             <a:fld id="{76E86A4C-8E40-4F87-A4F0-01A0687C5742}" type="datetimeFigureOut">
               <a:rPr lang="en-US" dirty="0"/>
-              <a:t>1/19/2021</a:t>
+              <a:t>1/24/2021</a:t>
             </a:fld>
             <a:endParaRPr lang="en-US" dirty="0"/>
           </a:p>
@@ -11717,7 +11717,7 @@
           <a:p>
             <a:fld id="{35E72C73-2D91-4E12-BA25-F0AA0C03599B}" type="datetimeFigureOut">
               <a:rPr lang="en-US" dirty="0"/>
-              <a:t>1/19/2021</a:t>
+              <a:t>1/24/2021</a:t>
             </a:fld>
             <a:endParaRPr lang="en-US" dirty="0"/>
           </a:p>
@@ -12714,7 +12714,7 @@
           <a:p>
             <a:fld id="{2BE451C3-0FF4-47C4-B829-773ADF60F88C}" type="datetimeFigureOut">
               <a:rPr lang="en-US" dirty="0"/>
-              <a:t>1/19/2021</a:t>
+              <a:t>1/24/2021</a:t>
             </a:fld>
             <a:endParaRPr lang="en-US" dirty="0"/>
           </a:p>
@@ -13919,7 +13919,7 @@
         <p:spPr/>
         <p:txBody>
           <a:bodyPr>
-            <a:normAutofit lnSpcReduction="10000"/>
+            <a:normAutofit fontScale="77500" lnSpcReduction="20000"/>
           </a:bodyPr>
           <a:lstStyle/>
           <a:p>
@@ -13981,6 +13981,43 @@
                 <a:cs typeface="Arial" panose="020B0604020202020204" pitchFamily="34" charset="0"/>
               </a:rPr>
               <a:t>dakshiNa</a:t>
+            </a:r>
+            <a:endParaRPr lang="en-US" sz="2600" b="1" dirty="0" smtClean="0">
+              <a:latin typeface="Arial" panose="020B0604020202020204" pitchFamily="34" charset="0"/>
+              <a:cs typeface="Arial" panose="020B0604020202020204" pitchFamily="34" charset="0"/>
+            </a:endParaRPr>
+          </a:p>
+          <a:p>
+            <a:r>
+              <a:rPr lang="en-US" sz="2800" b="1" dirty="0" smtClean="0">
+                <a:latin typeface="Arial" panose="020B0604020202020204" pitchFamily="34" charset="0"/>
+                <a:cs typeface="Arial" panose="020B0604020202020204" pitchFamily="34" charset="0"/>
+              </a:rPr>
+              <a:t>Special Padams with udAttam as first letter and anudAttam as second</a:t>
+            </a:r>
+          </a:p>
+          <a:p>
+            <a:pPr lvl="1"/>
+            <a:r>
+              <a:rPr lang="en-US" sz="2600" b="1" dirty="0" err="1" smtClean="0">
+                <a:latin typeface="Arial" panose="020B0604020202020204" pitchFamily="34" charset="0"/>
+                <a:cs typeface="Arial" panose="020B0604020202020204" pitchFamily="34" charset="0"/>
+              </a:rPr>
+              <a:t>Vanaspate</a:t>
+            </a:r>
+            <a:r>
+              <a:rPr lang="en-US" sz="2600" b="1" dirty="0" smtClean="0">
+                <a:latin typeface="Arial" panose="020B0604020202020204" pitchFamily="34" charset="0"/>
+                <a:cs typeface="Arial" panose="020B0604020202020204" pitchFamily="34" charset="0"/>
+              </a:rPr>
+              <a:t>, </a:t>
+            </a:r>
+            <a:r>
+              <a:rPr lang="en-US" sz="2600" b="1" dirty="0" err="1" smtClean="0">
+                <a:latin typeface="Arial" panose="020B0604020202020204" pitchFamily="34" charset="0"/>
+                <a:cs typeface="Arial" panose="020B0604020202020204" pitchFamily="34" charset="0"/>
+              </a:rPr>
+              <a:t>bRuhaspate</a:t>
             </a:r>
             <a:endParaRPr lang="en-US" sz="2600" b="1" dirty="0" smtClean="0">
               <a:latin typeface="Arial" panose="020B0604020202020204" pitchFamily="34" charset="0"/>
@@ -14260,34 +14297,55 @@
                 <a:latin typeface="Arial" panose="020B0604020202020204" pitchFamily="34" charset="0"/>
                 <a:cs typeface="Arial" panose="020B0604020202020204" pitchFamily="34" charset="0"/>
               </a:rPr>
-              <a:t>of your recital</a:t>
-            </a:r>
-          </a:p>
-          <a:p>
+              <a:t>of your </a:t>
+            </a:r>
             <a:r>
               <a:rPr lang="en-US" sz="2600" b="1" dirty="0" smtClean="0">
                 <a:latin typeface="Arial" panose="020B0604020202020204" pitchFamily="34" charset="0"/>
                 <a:cs typeface="Arial" panose="020B0604020202020204" pitchFamily="34" charset="0"/>
               </a:rPr>
-              <a:t>Various level of Swara Reach – Show table</a:t>
-            </a:r>
-          </a:p>
-          <a:p>
-            <a:r>
-              <a:rPr lang="en-US" sz="2600" b="1" dirty="0" err="1" smtClean="0">
+              <a:t>recital</a:t>
+            </a:r>
+          </a:p>
+          <a:p>
+            <a:r>
+              <a:rPr lang="en-US" sz="2600" b="1" dirty="0" err="1">
                 <a:latin typeface="Arial" panose="020B0604020202020204" pitchFamily="34" charset="0"/>
                 <a:cs typeface="Arial" panose="020B0604020202020204" pitchFamily="34" charset="0"/>
               </a:rPr>
               <a:t>Plutams</a:t>
             </a:r>
             <a:r>
+              <a:rPr lang="en-US" sz="2600" b="1" dirty="0">
+                <a:latin typeface="Arial" panose="020B0604020202020204" pitchFamily="34" charset="0"/>
+                <a:cs typeface="Arial" panose="020B0604020202020204" pitchFamily="34" charset="0"/>
+              </a:rPr>
+              <a:t> are normally udAttam only</a:t>
+            </a:r>
+          </a:p>
+          <a:p>
+            <a:r>
               <a:rPr lang="en-US" sz="2600" b="1" dirty="0" smtClean="0">
                 <a:latin typeface="Arial" panose="020B0604020202020204" pitchFamily="34" charset="0"/>
                 <a:cs typeface="Arial" panose="020B0604020202020204" pitchFamily="34" charset="0"/>
               </a:rPr>
-              <a:t> are normally udAttam only</a:t>
-            </a:r>
-            <a:endParaRPr lang="en-US" sz="2600" b="1" dirty="0">
+              <a:t>Various </a:t>
+            </a:r>
+            <a:r>
+              <a:rPr lang="en-US" sz="2600" b="1" dirty="0" smtClean="0">
+                <a:latin typeface="Arial" panose="020B0604020202020204" pitchFamily="34" charset="0"/>
+                <a:cs typeface="Arial" panose="020B0604020202020204" pitchFamily="34" charset="0"/>
+              </a:rPr>
+              <a:t>level of Swara Reach – Show </a:t>
+            </a:r>
+            <a:r>
+              <a:rPr lang="en-US" sz="2600" b="1" dirty="0" smtClean="0">
+                <a:latin typeface="Arial" panose="020B0604020202020204" pitchFamily="34" charset="0"/>
+                <a:cs typeface="Arial" panose="020B0604020202020204" pitchFamily="34" charset="0"/>
+              </a:rPr>
+              <a:t>table</a:t>
+            </a:r>
+            <a:endParaRPr lang="en-US" sz="2600" b="1" dirty="0" smtClean="0">
               <a:latin typeface="Arial" panose="020B0604020202020204" pitchFamily="34" charset="0"/>
               <a:cs typeface="Arial" panose="020B0604020202020204" pitchFamily="34" charset="0"/>
             </a:endParaRPr>

</xml_diff>

<commit_message>
TS 4.5 Temp,Raja files and Swaram ppt 25/01/2021
</commit_message>
<xml_diff>
--- a/Veda Lectures/Swaram Part 3.pptx
+++ b/Veda Lectures/Swaram Part 3.pptx
@@ -14297,58 +14297,33 @@
                 <a:latin typeface="Arial" panose="020B0604020202020204" pitchFamily="34" charset="0"/>
                 <a:cs typeface="Arial" panose="020B0604020202020204" pitchFamily="34" charset="0"/>
               </a:rPr>
-              <a:t>of your </a:t>
-            </a:r>
+              <a:t>of your recital</a:t>
+            </a:r>
+          </a:p>
+          <a:p>
+            <a:r>
+              <a:rPr lang="en-US" sz="2600" b="1" dirty="0" err="1">
+                <a:latin typeface="Arial" panose="020B0604020202020204" pitchFamily="34" charset="0"/>
+                <a:cs typeface="Arial" panose="020B0604020202020204" pitchFamily="34" charset="0"/>
+              </a:rPr>
+              <a:t>Plutams</a:t>
+            </a:r>
+            <a:r>
+              <a:rPr lang="en-US" sz="2600" b="1" dirty="0">
+                <a:latin typeface="Arial" panose="020B0604020202020204" pitchFamily="34" charset="0"/>
+                <a:cs typeface="Arial" panose="020B0604020202020204" pitchFamily="34" charset="0"/>
+              </a:rPr>
+              <a:t> are normally udAttam only</a:t>
+            </a:r>
+          </a:p>
+          <a:p>
             <a:r>
               <a:rPr lang="en-US" sz="2600" b="1" dirty="0" smtClean="0">
                 <a:latin typeface="Arial" panose="020B0604020202020204" pitchFamily="34" charset="0"/>
                 <a:cs typeface="Arial" panose="020B0604020202020204" pitchFamily="34" charset="0"/>
               </a:rPr>
-              <a:t>recital</a:t>
-            </a:r>
-          </a:p>
-          <a:p>
-            <a:r>
-              <a:rPr lang="en-US" sz="2600" b="1" dirty="0" err="1">
-                <a:latin typeface="Arial" panose="020B0604020202020204" pitchFamily="34" charset="0"/>
-                <a:cs typeface="Arial" panose="020B0604020202020204" pitchFamily="34" charset="0"/>
-              </a:rPr>
-              <a:t>Plutams</a:t>
-            </a:r>
-            <a:r>
-              <a:rPr lang="en-US" sz="2600" b="1" dirty="0">
-                <a:latin typeface="Arial" panose="020B0604020202020204" pitchFamily="34" charset="0"/>
-                <a:cs typeface="Arial" panose="020B0604020202020204" pitchFamily="34" charset="0"/>
-              </a:rPr>
-              <a:t> are normally udAttam only</a:t>
-            </a:r>
-          </a:p>
-          <a:p>
-            <a:r>
-              <a:rPr lang="en-US" sz="2600" b="1" dirty="0" smtClean="0">
-                <a:latin typeface="Arial" panose="020B0604020202020204" pitchFamily="34" charset="0"/>
-                <a:cs typeface="Arial" panose="020B0604020202020204" pitchFamily="34" charset="0"/>
-              </a:rPr>
-              <a:t>Various </a:t>
-            </a:r>
-            <a:r>
-              <a:rPr lang="en-US" sz="2600" b="1" dirty="0" smtClean="0">
-                <a:latin typeface="Arial" panose="020B0604020202020204" pitchFamily="34" charset="0"/>
-                <a:cs typeface="Arial" panose="020B0604020202020204" pitchFamily="34" charset="0"/>
-              </a:rPr>
-              <a:t>level of Swara Reach – Show </a:t>
-            </a:r>
-            <a:r>
-              <a:rPr lang="en-US" sz="2600" b="1" dirty="0" smtClean="0">
-                <a:latin typeface="Arial" panose="020B0604020202020204" pitchFamily="34" charset="0"/>
-                <a:cs typeface="Arial" panose="020B0604020202020204" pitchFamily="34" charset="0"/>
-              </a:rPr>
-              <a:t>table</a:t>
-            </a:r>
-            <a:endParaRPr lang="en-US" sz="2600" b="1" dirty="0" smtClean="0">
-              <a:latin typeface="Arial" panose="020B0604020202020204" pitchFamily="34" charset="0"/>
-              <a:cs typeface="Arial" panose="020B0604020202020204" pitchFamily="34" charset="0"/>
-            </a:endParaRPr>
+              <a:t>Various level of Swara Reach – Show table</a:t>
+            </a:r>
           </a:p>
         </p:txBody>
       </p:sp>
@@ -14475,7 +14450,34 @@
                 <a:latin typeface="Arial" panose="020B0604020202020204" pitchFamily="34" charset="0"/>
                 <a:cs typeface="Arial" panose="020B0604020202020204" pitchFamily="34" charset="0"/>
               </a:rPr>
-              <a:t>),  or two of which either one is acute(</a:t>
+              <a:t>),  </a:t>
+            </a:r>
+            <a:r>
+              <a:rPr lang="en-US" sz="2800" b="1" dirty="0" smtClean="0">
+                <a:latin typeface="Arial" panose="020B0604020202020204" pitchFamily="34" charset="0"/>
+                <a:cs typeface="Arial" panose="020B0604020202020204" pitchFamily="34" charset="0"/>
+              </a:rPr>
+              <a:t/>
+            </a:r>
+            <a:br>
+              <a:rPr lang="en-US" sz="2800" b="1" dirty="0" smtClean="0">
+                <a:latin typeface="Arial" panose="020B0604020202020204" pitchFamily="34" charset="0"/>
+                <a:cs typeface="Arial" panose="020B0604020202020204" pitchFamily="34" charset="0"/>
+              </a:rPr>
+            </a:br>
+            <a:r>
+              <a:rPr lang="en-US" sz="2800" b="1" dirty="0" smtClean="0">
+                <a:latin typeface="Arial" panose="020B0604020202020204" pitchFamily="34" charset="0"/>
+                <a:cs typeface="Arial" panose="020B0604020202020204" pitchFamily="34" charset="0"/>
+              </a:rPr>
+              <a:t>or</a:t>
+            </a:r>
+            <a:r>
+              <a:rPr lang="en-US" sz="2800" b="1" dirty="0">
+                <a:latin typeface="Arial" panose="020B0604020202020204" pitchFamily="34" charset="0"/>
+                <a:cs typeface="Arial" panose="020B0604020202020204" pitchFamily="34" charset="0"/>
+              </a:rPr>
+              <a:t> two of which either one is acute(</a:t>
             </a:r>
             <a:r>
               <a:rPr lang="en-US" sz="2800" b="1" dirty="0" err="1">

</xml_diff>

<commit_message>
TS 4.5 Template and other padam,kramam corr 28/01/2021
</commit_message>
<xml_diff>
--- a/Veda Lectures/Swaram Part 3.pptx
+++ b/Veda Lectures/Swaram Part 3.pptx
@@ -17,8 +17,8 @@
     <p:sldId id="265" r:id="rId11"/>
     <p:sldId id="266" r:id="rId12"/>
     <p:sldId id="267" r:id="rId13"/>
-    <p:sldId id="268" r:id="rId14"/>
-    <p:sldId id="269" r:id="rId15"/>
+    <p:sldId id="269" r:id="rId14"/>
+    <p:sldId id="268" r:id="rId15"/>
   </p:sldIdLst>
   <p:sldSz cx="12192000" cy="6858000"/>
   <p:notesSz cx="6858000" cy="9144000"/>
@@ -461,7 +461,7 @@
             <a:fld id="{5923F103-BC34-4FE4-A40E-EDDEECFDA5D0}" type="datetimeFigureOut">
               <a:rPr lang="en-US" dirty="0"/>
               <a:pPr/>
-              <a:t>1/24/2021</a:t>
+              <a:t>1/28/2021</a:t>
             </a:fld>
             <a:endParaRPr lang="en-US" dirty="0"/>
           </a:p>
@@ -1549,7 +1549,7 @@
           <a:p>
             <a:fld id="{923A1CC3-2375-41D4-9E03-427CAF2A4C1A}" type="datetimeFigureOut">
               <a:rPr lang="en-US" dirty="0"/>
-              <a:t>1/24/2021</a:t>
+              <a:t>1/28/2021</a:t>
             </a:fld>
             <a:endParaRPr lang="en-US" dirty="0"/>
           </a:p>
@@ -2529,7 +2529,7 @@
           <a:p>
             <a:fld id="{AFF16868-8199-4C2C-A5B1-63AEE139F88E}" type="datetimeFigureOut">
               <a:rPr lang="en-US" dirty="0"/>
-              <a:t>1/24/2021</a:t>
+              <a:t>1/28/2021</a:t>
             </a:fld>
             <a:endParaRPr lang="en-US" dirty="0"/>
           </a:p>
@@ -3663,7 +3663,7 @@
           <a:p>
             <a:fld id="{AAD9FF7F-6988-44CC-821B-644E70CD2F73}" type="datetimeFigureOut">
               <a:rPr lang="en-US" dirty="0"/>
-              <a:t>1/24/2021</a:t>
+              <a:t>1/28/2021</a:t>
             </a:fld>
             <a:endParaRPr lang="en-US" dirty="0"/>
           </a:p>
@@ -4696,7 +4696,7 @@
           <a:p>
             <a:fld id="{5C12C299-16B2-4475-990D-751901EACC14}" type="datetimeFigureOut">
               <a:rPr lang="en-US" dirty="0"/>
-              <a:t>1/24/2021</a:t>
+              <a:t>1/28/2021</a:t>
             </a:fld>
             <a:endParaRPr lang="en-US" dirty="0"/>
           </a:p>
@@ -5356,7 +5356,7 @@
           <a:p>
             <a:fld id="{9FE86839-B9D8-4651-8783-F325ECE74E65}" type="datetimeFigureOut">
               <a:rPr lang="en-US" dirty="0"/>
-              <a:t>1/24/2021</a:t>
+              <a:t>1/28/2021</a:t>
             </a:fld>
             <a:endParaRPr lang="en-US" dirty="0"/>
           </a:p>
@@ -6217,7 +6217,7 @@
           <a:p>
             <a:fld id="{FD484F64-32F6-45C5-931F-ADC1662401D0}" type="datetimeFigureOut">
               <a:rPr lang="en-US" dirty="0"/>
-              <a:t>1/24/2021</a:t>
+              <a:t>1/28/2021</a:t>
             </a:fld>
             <a:endParaRPr lang="en-US" dirty="0"/>
           </a:p>
@@ -6407,7 +6407,7 @@
           <a:p>
             <a:fld id="{53086D93-FCAC-47E0-A2EE-787E62CA814C}" type="datetimeFigureOut">
               <a:rPr lang="en-US" dirty="0"/>
-              <a:t>1/24/2021</a:t>
+              <a:t>1/28/2021</a:t>
             </a:fld>
             <a:endParaRPr lang="en-US" dirty="0"/>
           </a:p>
@@ -7379,7 +7379,7 @@
           <a:p>
             <a:fld id="{CDA879A6-0FD0-4734-A311-86BFCA472E6E}" type="datetimeFigureOut">
               <a:rPr lang="en-US" dirty="0"/>
-              <a:t>1/24/2021</a:t>
+              <a:t>1/28/2021</a:t>
             </a:fld>
             <a:endParaRPr lang="en-US" dirty="0"/>
           </a:p>
@@ -7590,7 +7590,7 @@
           <a:p>
             <a:fld id="{19C9CA7B-DFD4-44B5-8C60-D14B8CD1FB59}" type="datetimeFigureOut">
               <a:rPr lang="en-US" dirty="0"/>
-              <a:t>1/24/2021</a:t>
+              <a:t>1/28/2021</a:t>
             </a:fld>
             <a:endParaRPr lang="en-US" dirty="0"/>
           </a:p>
@@ -8624,7 +8624,7 @@
           <a:p>
             <a:fld id="{F34E6425-0181-43F2-84FC-787E803FD2F8}" type="datetimeFigureOut">
               <a:rPr lang="en-US" dirty="0"/>
-              <a:t>1/24/2021</a:t>
+              <a:t>1/28/2021</a:t>
             </a:fld>
             <a:endParaRPr lang="en-US" dirty="0"/>
           </a:p>
@@ -8896,7 +8896,7 @@
           <a:p>
             <a:fld id="{3BDB8791-F1B0-41E7-B7FD-A781E65C4266}" type="datetimeFigureOut">
               <a:rPr lang="en-US" dirty="0"/>
-              <a:t>1/24/2021</a:t>
+              <a:t>1/28/2021</a:t>
             </a:fld>
             <a:endParaRPr lang="en-US" dirty="0"/>
           </a:p>
@@ -9306,7 +9306,7 @@
           <a:p>
             <a:fld id="{5FDD63B2-E120-4ED8-B27B-C685F510A5FE}" type="datetimeFigureOut">
               <a:rPr lang="en-US" dirty="0"/>
-              <a:t>1/24/2021</a:t>
+              <a:t>1/28/2021</a:t>
             </a:fld>
             <a:endParaRPr lang="en-US" dirty="0"/>
           </a:p>
@@ -9433,7 +9433,7 @@
           <a:p>
             <a:fld id="{7AA18ACC-A947-437B-A130-35BD54FDF1E9}" type="datetimeFigureOut">
               <a:rPr lang="en-US" dirty="0"/>
-              <a:t>1/24/2021</a:t>
+              <a:t>1/28/2021</a:t>
             </a:fld>
             <a:endParaRPr lang="en-US" dirty="0"/>
           </a:p>
@@ -9528,7 +9528,7 @@
           <a:p>
             <a:fld id="{7C8D7E02-BCB8-4D50-A234-369438C08659}" type="datetimeFigureOut">
               <a:rPr lang="en-US" dirty="0"/>
-              <a:t>1/24/2021</a:t>
+              <a:t>1/28/2021</a:t>
             </a:fld>
             <a:endParaRPr lang="en-US" dirty="0"/>
           </a:p>
@@ -10609,7 +10609,7 @@
           <a:p>
             <a:fld id="{76E86A4C-8E40-4F87-A4F0-01A0687C5742}" type="datetimeFigureOut">
               <a:rPr lang="en-US" dirty="0"/>
-              <a:t>1/24/2021</a:t>
+              <a:t>1/28/2021</a:t>
             </a:fld>
             <a:endParaRPr lang="en-US" dirty="0"/>
           </a:p>
@@ -11717,7 +11717,7 @@
           <a:p>
             <a:fld id="{35E72C73-2D91-4E12-BA25-F0AA0C03599B}" type="datetimeFigureOut">
               <a:rPr lang="en-US" dirty="0"/>
-              <a:t>1/24/2021</a:t>
+              <a:t>1/28/2021</a:t>
             </a:fld>
             <a:endParaRPr lang="en-US" dirty="0"/>
           </a:p>
@@ -12714,7 +12714,7 @@
           <a:p>
             <a:fld id="{2BE451C3-0FF4-47C4-B829-773ADF60F88C}" type="datetimeFigureOut">
               <a:rPr lang="en-US" dirty="0"/>
-              <a:t>1/24/2021</a:t>
+              <a:t>1/28/2021</a:t>
             </a:fld>
             <a:endParaRPr lang="en-US" dirty="0"/>
           </a:p>
@@ -14185,23 +14185,14 @@
             <p:ph type="title"/>
           </p:nvPr>
         </p:nvSpPr>
-        <p:spPr>
-          <a:xfrm>
-            <a:off x="1154954" y="973668"/>
-            <a:ext cx="8825659" cy="1072846"/>
-          </a:xfrm>
-        </p:spPr>
+        <p:spPr/>
         <p:txBody>
           <a:bodyPr/>
           <a:lstStyle/>
           <a:p>
             <a:r>
               <a:rPr lang="en-US" dirty="0" smtClean="0"/>
-              <a:t>Importance of </a:t>
-            </a:r>
-            <a:r>
-              <a:rPr lang="en-US" dirty="0" err="1" smtClean="0"/>
-              <a:t>udAtta</a:t>
+              <a:t>Vikrama Concept</a:t>
             </a:r>
             <a:endParaRPr lang="en-US" dirty="0"/>
           </a:p>
@@ -14220,109 +14211,245 @@
         <p:spPr/>
         <p:txBody>
           <a:bodyPr>
-            <a:normAutofit/>
+            <a:normAutofit lnSpcReduction="10000"/>
           </a:bodyPr>
           <a:lstStyle/>
           <a:p>
             <a:r>
-              <a:rPr lang="en-US" sz="2600" b="1" dirty="0" err="1" smtClean="0">
+              <a:rPr lang="en-US" sz="2800" b="1" dirty="0">
+                <a:latin typeface="Arial" panose="020B0604020202020204" pitchFamily="34" charset="0"/>
+                <a:cs typeface="Arial" panose="020B0604020202020204" pitchFamily="34" charset="0"/>
+              </a:rPr>
+              <a:t>PS 19-1 says – “ Where a syllable of low tone (anudAttam) occurs  between two </a:t>
+            </a:r>
+            <a:r>
+              <a:rPr lang="en-US" sz="2800" b="1" dirty="0" smtClean="0">
+                <a:latin typeface="Arial" panose="020B0604020202020204" pitchFamily="34" charset="0"/>
+                <a:cs typeface="Arial" panose="020B0604020202020204" pitchFamily="34" charset="0"/>
+              </a:rPr>
+              <a:t>circumflex</a:t>
+            </a:r>
+            <a:br>
+              <a:rPr lang="en-US" sz="2800" b="1" dirty="0" smtClean="0">
+                <a:latin typeface="Arial" panose="020B0604020202020204" pitchFamily="34" charset="0"/>
+                <a:cs typeface="Arial" panose="020B0604020202020204" pitchFamily="34" charset="0"/>
+              </a:rPr>
+            </a:br>
+            <a:r>
+              <a:rPr lang="en-US" sz="2800" b="1" dirty="0" smtClean="0">
+                <a:latin typeface="Arial" panose="020B0604020202020204" pitchFamily="34" charset="0"/>
+                <a:cs typeface="Arial" panose="020B0604020202020204" pitchFamily="34" charset="0"/>
+              </a:rPr>
+              <a:t>(</a:t>
+            </a:r>
+            <a:r>
+              <a:rPr lang="en-US" sz="2800" b="1" dirty="0">
+                <a:latin typeface="Arial" panose="020B0604020202020204" pitchFamily="34" charset="0"/>
+                <a:cs typeface="Arial" panose="020B0604020202020204" pitchFamily="34" charset="0"/>
+              </a:rPr>
+              <a:t>Swaritam) syllables, or two acute(</a:t>
+            </a:r>
+            <a:r>
+              <a:rPr lang="en-US" sz="2800" b="1" dirty="0" err="1">
+                <a:latin typeface="Arial" panose="020B0604020202020204" pitchFamily="34" charset="0"/>
+                <a:cs typeface="Arial" panose="020B0604020202020204" pitchFamily="34" charset="0"/>
+              </a:rPr>
+              <a:t>udAttA</a:t>
+            </a:r>
+            <a:r>
+              <a:rPr lang="en-US" sz="2800" b="1" dirty="0">
+                <a:latin typeface="Arial" panose="020B0604020202020204" pitchFamily="34" charset="0"/>
+                <a:cs typeface="Arial" panose="020B0604020202020204" pitchFamily="34" charset="0"/>
+              </a:rPr>
+              <a:t>),  </a:t>
+            </a:r>
+            <a:r>
+              <a:rPr lang="en-US" sz="2800" b="1" dirty="0" smtClean="0">
+                <a:latin typeface="Arial" panose="020B0604020202020204" pitchFamily="34" charset="0"/>
+                <a:cs typeface="Arial" panose="020B0604020202020204" pitchFamily="34" charset="0"/>
+              </a:rPr>
+              <a:t/>
+            </a:r>
+            <a:br>
+              <a:rPr lang="en-US" sz="2800" b="1" dirty="0" smtClean="0">
+                <a:latin typeface="Arial" panose="020B0604020202020204" pitchFamily="34" charset="0"/>
+                <a:cs typeface="Arial" panose="020B0604020202020204" pitchFamily="34" charset="0"/>
+              </a:rPr>
+            </a:br>
+            <a:r>
+              <a:rPr lang="en-US" sz="2800" b="1" dirty="0" smtClean="0">
+                <a:latin typeface="Arial" panose="020B0604020202020204" pitchFamily="34" charset="0"/>
+                <a:cs typeface="Arial" panose="020B0604020202020204" pitchFamily="34" charset="0"/>
+              </a:rPr>
+              <a:t>or</a:t>
+            </a:r>
+            <a:r>
+              <a:rPr lang="en-US" sz="2800" b="1" dirty="0">
+                <a:latin typeface="Arial" panose="020B0604020202020204" pitchFamily="34" charset="0"/>
+                <a:cs typeface="Arial" panose="020B0604020202020204" pitchFamily="34" charset="0"/>
+              </a:rPr>
+              <a:t> two of which either one is acute(</a:t>
+            </a:r>
+            <a:r>
+              <a:rPr lang="en-US" sz="2800" b="1" dirty="0" err="1">
                 <a:latin typeface="Arial" panose="020B0604020202020204" pitchFamily="34" charset="0"/>
                 <a:cs typeface="Arial" panose="020B0604020202020204" pitchFamily="34" charset="0"/>
               </a:rPr>
               <a:t>udAtta</a:t>
             </a:r>
             <a:r>
-              <a:rPr lang="en-US" sz="2600" b="1" dirty="0" smtClean="0">
-                <a:latin typeface="Arial" panose="020B0604020202020204" pitchFamily="34" charset="0"/>
-                <a:cs typeface="Arial" panose="020B0604020202020204" pitchFamily="34" charset="0"/>
-              </a:rPr>
-              <a:t> is the </a:t>
-            </a:r>
-            <a:r>
-              <a:rPr lang="en-US" sz="2600" b="1" dirty="0" err="1" smtClean="0">
-                <a:latin typeface="Arial" panose="020B0604020202020204" pitchFamily="34" charset="0"/>
-                <a:cs typeface="Arial" panose="020B0604020202020204" pitchFamily="34" charset="0"/>
-              </a:rPr>
-              <a:t>acyuta</a:t>
-            </a:r>
-            <a:r>
-              <a:rPr lang="en-US" sz="2600" b="1" dirty="0" smtClean="0">
-                <a:latin typeface="Arial" panose="020B0604020202020204" pitchFamily="34" charset="0"/>
-                <a:cs typeface="Arial" panose="020B0604020202020204" pitchFamily="34" charset="0"/>
-              </a:rPr>
-              <a:t> of Vedic Swarams</a:t>
-            </a:r>
-          </a:p>
-          <a:p>
-            <a:pPr lvl="1"/>
-            <a:r>
-              <a:rPr lang="en-US" sz="2400" b="1" dirty="0" smtClean="0">
-                <a:latin typeface="Arial" panose="020B0604020202020204" pitchFamily="34" charset="0"/>
-                <a:cs typeface="Arial" panose="020B0604020202020204" pitchFamily="34" charset="0"/>
-              </a:rPr>
-              <a:t>Like all revolve around </a:t>
-            </a:r>
-            <a:r>
-              <a:rPr lang="en-US" sz="2400" b="1" dirty="0" err="1" smtClean="0">
-                <a:latin typeface="Arial" panose="020B0604020202020204" pitchFamily="34" charset="0"/>
-                <a:cs typeface="Arial" panose="020B0604020202020204" pitchFamily="34" charset="0"/>
-              </a:rPr>
-              <a:t>VishNu</a:t>
-            </a:r>
-            <a:endParaRPr lang="en-US" sz="2400" b="1" dirty="0" smtClean="0">
-              <a:latin typeface="Arial" panose="020B0604020202020204" pitchFamily="34" charset="0"/>
-              <a:cs typeface="Arial" panose="020B0604020202020204" pitchFamily="34" charset="0"/>
-            </a:endParaRPr>
-          </a:p>
-          <a:p>
-            <a:r>
-              <a:rPr lang="en-US" sz="2600" b="1" dirty="0" smtClean="0">
-                <a:latin typeface="Arial" panose="020B0604020202020204" pitchFamily="34" charset="0"/>
-                <a:cs typeface="Arial" panose="020B0604020202020204" pitchFamily="34" charset="0"/>
-              </a:rPr>
-              <a:t>Sets the </a:t>
-            </a:r>
-            <a:r>
-              <a:rPr lang="en-US" sz="2600" b="1" dirty="0" smtClean="0">
-                <a:solidFill>
-                  <a:srgbClr val="FF0000"/>
-                </a:solidFill>
-                <a:latin typeface="Arial" panose="020B0604020202020204" pitchFamily="34" charset="0"/>
-                <a:cs typeface="Arial" panose="020B0604020202020204" pitchFamily="34" charset="0"/>
-              </a:rPr>
-              <a:t>entire tone </a:t>
-            </a:r>
-            <a:r>
-              <a:rPr lang="en-US" sz="2600" b="1" dirty="0" smtClean="0">
-                <a:latin typeface="Arial" panose="020B0604020202020204" pitchFamily="34" charset="0"/>
-                <a:cs typeface="Arial" panose="020B0604020202020204" pitchFamily="34" charset="0"/>
-              </a:rPr>
-              <a:t>of your recital</a:t>
-            </a:r>
-          </a:p>
-          <a:p>
-            <a:r>
-              <a:rPr lang="en-US" sz="2600" b="1" dirty="0" err="1">
-                <a:latin typeface="Arial" panose="020B0604020202020204" pitchFamily="34" charset="0"/>
-                <a:cs typeface="Arial" panose="020B0604020202020204" pitchFamily="34" charset="0"/>
-              </a:rPr>
-              <a:t>Plutams</a:t>
-            </a:r>
-            <a:r>
-              <a:rPr lang="en-US" sz="2600" b="1" dirty="0">
-                <a:latin typeface="Arial" panose="020B0604020202020204" pitchFamily="34" charset="0"/>
-                <a:cs typeface="Arial" panose="020B0604020202020204" pitchFamily="34" charset="0"/>
-              </a:rPr>
-              <a:t> are normally udAttam only</a:t>
-            </a:r>
-          </a:p>
-          <a:p>
-            <a:r>
-              <a:rPr lang="en-US" sz="2600" b="1" dirty="0" smtClean="0">
-                <a:latin typeface="Arial" panose="020B0604020202020204" pitchFamily="34" charset="0"/>
-                <a:cs typeface="Arial" panose="020B0604020202020204" pitchFamily="34" charset="0"/>
-              </a:rPr>
-              <a:t>Various level of Swara Reach – Show table</a:t>
+              <a:rPr lang="en-US" sz="2800" b="1" dirty="0">
+                <a:latin typeface="Arial" panose="020B0604020202020204" pitchFamily="34" charset="0"/>
+                <a:cs typeface="Arial" panose="020B0604020202020204" pitchFamily="34" charset="0"/>
+              </a:rPr>
+              <a:t>) </a:t>
+            </a:r>
+            <a:r>
+              <a:rPr lang="en-US" sz="2800" b="1" dirty="0" smtClean="0">
+                <a:latin typeface="Arial" panose="020B0604020202020204" pitchFamily="34" charset="0"/>
+                <a:cs typeface="Arial" panose="020B0604020202020204" pitchFamily="34" charset="0"/>
+              </a:rPr>
+              <a:t>and </a:t>
+            </a:r>
+            <a:r>
+              <a:rPr lang="en-US" sz="2800" b="1" dirty="0">
+                <a:latin typeface="Arial" panose="020B0604020202020204" pitchFamily="34" charset="0"/>
+                <a:cs typeface="Arial" panose="020B0604020202020204" pitchFamily="34" charset="0"/>
+              </a:rPr>
+              <a:t> the other </a:t>
+            </a:r>
+            <a:r>
+              <a:rPr lang="en-US" sz="2800" b="1" dirty="0" smtClean="0">
+                <a:latin typeface="Arial" panose="020B0604020202020204" pitchFamily="34" charset="0"/>
+                <a:cs typeface="Arial" panose="020B0604020202020204" pitchFamily="34" charset="0"/>
+              </a:rPr>
+              <a:t> circumflex(</a:t>
+            </a:r>
+            <a:r>
+              <a:rPr lang="en-US" sz="2800" b="1" dirty="0" err="1" smtClean="0">
+                <a:latin typeface="Arial" panose="020B0604020202020204" pitchFamily="34" charset="0"/>
+                <a:cs typeface="Arial" panose="020B0604020202020204" pitchFamily="34" charset="0"/>
+              </a:rPr>
+              <a:t>Swarita</a:t>
+            </a:r>
+            <a:r>
+              <a:rPr lang="en-US" sz="2800" b="1" dirty="0">
+                <a:latin typeface="Arial" panose="020B0604020202020204" pitchFamily="34" charset="0"/>
+                <a:cs typeface="Arial" panose="020B0604020202020204" pitchFamily="34" charset="0"/>
+              </a:rPr>
+              <a:t>),  </a:t>
+            </a:r>
+            <a:r>
+              <a:rPr lang="en-US" sz="2800" b="1" dirty="0" smtClean="0">
+                <a:latin typeface="Arial" panose="020B0604020202020204" pitchFamily="34" charset="0"/>
+                <a:cs typeface="Arial" panose="020B0604020202020204" pitchFamily="34" charset="0"/>
+              </a:rPr>
+              <a:t> </a:t>
+            </a:r>
+            <a:br>
+              <a:rPr lang="en-US" sz="2800" b="1" dirty="0" smtClean="0">
+                <a:latin typeface="Arial" panose="020B0604020202020204" pitchFamily="34" charset="0"/>
+                <a:cs typeface="Arial" panose="020B0604020202020204" pitchFamily="34" charset="0"/>
+              </a:rPr>
+            </a:br>
+            <a:r>
+              <a:rPr lang="en-US" sz="2800" b="1" dirty="0" smtClean="0">
+                <a:latin typeface="Arial" panose="020B0604020202020204" pitchFamily="34" charset="0"/>
+                <a:cs typeface="Arial" panose="020B0604020202020204" pitchFamily="34" charset="0"/>
+              </a:rPr>
+              <a:t>that</a:t>
+            </a:r>
+            <a:r>
+              <a:rPr lang="en-US" sz="2800" b="1" dirty="0">
+                <a:latin typeface="Arial" panose="020B0604020202020204" pitchFamily="34" charset="0"/>
+                <a:cs typeface="Arial" panose="020B0604020202020204" pitchFamily="34" charset="0"/>
+              </a:rPr>
+              <a:t> is </a:t>
+            </a:r>
+            <a:r>
+              <a:rPr lang="en-US" sz="2800" b="1" dirty="0" smtClean="0">
+                <a:latin typeface="Arial" panose="020B0604020202020204" pitchFamily="34" charset="0"/>
+                <a:cs typeface="Arial" panose="020B0604020202020204" pitchFamily="34" charset="0"/>
+              </a:rPr>
+              <a:t>”</a:t>
+            </a:r>
+            <a:r>
+              <a:rPr lang="en-US" sz="3200" b="1" dirty="0" err="1" smtClean="0">
+                <a:latin typeface="Arial" panose="020B0604020202020204" pitchFamily="34" charset="0"/>
+                <a:cs typeface="Arial" panose="020B0604020202020204" pitchFamily="34" charset="0"/>
+              </a:rPr>
+              <a:t>vikrama</a:t>
+            </a:r>
+            <a:r>
+              <a:rPr lang="en-US" sz="2800" b="1" dirty="0" smtClean="0">
+                <a:latin typeface="Arial" panose="020B0604020202020204" pitchFamily="34" charset="0"/>
+                <a:cs typeface="Arial" panose="020B0604020202020204" pitchFamily="34" charset="0"/>
+              </a:rPr>
+              <a:t>.”</a:t>
+            </a:r>
+          </a:p>
+          <a:p>
+            <a:r>
+              <a:rPr lang="en-US" sz="2800" b="1" dirty="0">
+                <a:latin typeface="Arial" panose="020B0604020202020204" pitchFamily="34" charset="0"/>
+                <a:cs typeface="Arial" panose="020B0604020202020204" pitchFamily="34" charset="0"/>
+              </a:rPr>
+              <a:t>PS </a:t>
+            </a:r>
+            <a:r>
+              <a:rPr lang="en-US" sz="2800" b="1" dirty="0" smtClean="0">
+                <a:latin typeface="Arial" panose="020B0604020202020204" pitchFamily="34" charset="0"/>
+                <a:cs typeface="Arial" panose="020B0604020202020204" pitchFamily="34" charset="0"/>
+              </a:rPr>
+              <a:t>19-2 -  As</a:t>
+            </a:r>
+            <a:r>
+              <a:rPr lang="en-US" sz="2800" b="1" dirty="0">
+                <a:latin typeface="Arial" panose="020B0604020202020204" pitchFamily="34" charset="0"/>
+                <a:cs typeface="Arial" panose="020B0604020202020204" pitchFamily="34" charset="0"/>
+              </a:rPr>
+              <a:t> also, according to </a:t>
+            </a:r>
+            <a:r>
+              <a:rPr lang="en-US" sz="2800" b="1" dirty="0" smtClean="0">
+                <a:latin typeface="Arial" panose="020B0604020202020204" pitchFamily="34" charset="0"/>
+                <a:cs typeface="Arial" panose="020B0604020202020204" pitchFamily="34" charset="0"/>
+              </a:rPr>
+              <a:t>Kauṇḍinya</a:t>
+            </a:r>
+            <a:r>
+              <a:rPr lang="en-US" sz="2800" b="1" dirty="0">
+                <a:latin typeface="Arial" panose="020B0604020202020204" pitchFamily="34" charset="0"/>
+                <a:cs typeface="Arial" panose="020B0604020202020204" pitchFamily="34" charset="0"/>
+              </a:rPr>
+              <a:t>, </a:t>
+            </a:r>
+            <a:r>
+              <a:rPr lang="en-US" sz="2800" b="1" dirty="0" smtClean="0">
+                <a:latin typeface="Arial" panose="020B0604020202020204" pitchFamily="34" charset="0"/>
+                <a:cs typeface="Arial" panose="020B0604020202020204" pitchFamily="34" charset="0"/>
+              </a:rPr>
+              <a:t/>
+            </a:r>
+            <a:br>
+              <a:rPr lang="en-US" sz="2800" b="1" dirty="0" smtClean="0">
+                <a:latin typeface="Arial" panose="020B0604020202020204" pitchFamily="34" charset="0"/>
+                <a:cs typeface="Arial" panose="020B0604020202020204" pitchFamily="34" charset="0"/>
+              </a:rPr>
+            </a:br>
+            <a:r>
+              <a:rPr lang="en-US" sz="2800" b="1" dirty="0" smtClean="0">
+                <a:latin typeface="Arial" panose="020B0604020202020204" pitchFamily="34" charset="0"/>
+                <a:cs typeface="Arial" panose="020B0604020202020204" pitchFamily="34" charset="0"/>
+              </a:rPr>
+              <a:t>when</a:t>
+            </a:r>
+            <a:r>
+              <a:rPr lang="en-US" sz="2800" b="1" dirty="0">
+                <a:latin typeface="Arial" panose="020B0604020202020204" pitchFamily="34" charset="0"/>
+                <a:cs typeface="Arial" panose="020B0604020202020204" pitchFamily="34" charset="0"/>
+              </a:rPr>
+              <a:t> a pracaya precedes</a:t>
             </a:r>
           </a:p>
         </p:txBody>
@@ -14330,7 +14457,7 @@
     </p:spTree>
     <p:extLst>
       <p:ext uri="{BB962C8B-B14F-4D97-AF65-F5344CB8AC3E}">
-        <p14:creationId xmlns:p14="http://schemas.microsoft.com/office/powerpoint/2010/main" val="2560387084"/>
+        <p14:creationId xmlns:p14="http://schemas.microsoft.com/office/powerpoint/2010/main" val="4131985034"/>
       </p:ext>
     </p:extLst>
   </p:cSld>
@@ -14374,14 +14501,23 @@
             <p:ph type="title"/>
           </p:nvPr>
         </p:nvSpPr>
-        <p:spPr/>
+        <p:spPr>
+          <a:xfrm>
+            <a:off x="1154954" y="973668"/>
+            <a:ext cx="8825659" cy="1072846"/>
+          </a:xfrm>
+        </p:spPr>
         <p:txBody>
           <a:bodyPr/>
           <a:lstStyle/>
           <a:p>
             <a:r>
               <a:rPr lang="en-US" dirty="0" smtClean="0"/>
-              <a:t>Vikrama Concept</a:t>
+              <a:t>Importance of </a:t>
+            </a:r>
+            <a:r>
+              <a:rPr lang="en-US" dirty="0" err="1" smtClean="0"/>
+              <a:t>udAtta</a:t>
             </a:r>
             <a:endParaRPr lang="en-US" dirty="0"/>
           </a:p>
@@ -14400,253 +14536,137 @@
         <p:spPr/>
         <p:txBody>
           <a:bodyPr>
-            <a:normAutofit lnSpcReduction="10000"/>
+            <a:normAutofit/>
           </a:bodyPr>
           <a:lstStyle/>
           <a:p>
             <a:r>
-              <a:rPr lang="en-US" sz="2800" b="1" dirty="0">
-                <a:latin typeface="Arial" panose="020B0604020202020204" pitchFamily="34" charset="0"/>
-                <a:cs typeface="Arial" panose="020B0604020202020204" pitchFamily="34" charset="0"/>
-              </a:rPr>
-              <a:t>PS 19-1 says – “ Where a syllable of low tone (anudAttam) occurs  between two </a:t>
-            </a:r>
-            <a:r>
-              <a:rPr lang="en-US" sz="2800" b="1" dirty="0" smtClean="0">
-                <a:latin typeface="Arial" panose="020B0604020202020204" pitchFamily="34" charset="0"/>
-                <a:cs typeface="Arial" panose="020B0604020202020204" pitchFamily="34" charset="0"/>
-              </a:rPr>
-              <a:t>circumflex</a:t>
-            </a:r>
-            <a:br>
-              <a:rPr lang="en-US" sz="2800" b="1" dirty="0" smtClean="0">
-                <a:latin typeface="Arial" panose="020B0604020202020204" pitchFamily="34" charset="0"/>
-                <a:cs typeface="Arial" panose="020B0604020202020204" pitchFamily="34" charset="0"/>
-              </a:rPr>
-            </a:br>
-            <a:r>
-              <a:rPr lang="en-US" sz="2800" b="1" dirty="0" smtClean="0">
-                <a:latin typeface="Arial" panose="020B0604020202020204" pitchFamily="34" charset="0"/>
-                <a:cs typeface="Arial" panose="020B0604020202020204" pitchFamily="34" charset="0"/>
-              </a:rPr>
-              <a:t>(</a:t>
-            </a:r>
-            <a:r>
-              <a:rPr lang="en-US" sz="2800" b="1" dirty="0">
-                <a:latin typeface="Arial" panose="020B0604020202020204" pitchFamily="34" charset="0"/>
-                <a:cs typeface="Arial" panose="020B0604020202020204" pitchFamily="34" charset="0"/>
-              </a:rPr>
-              <a:t>Swaritam) syllables, or two acute(</a:t>
-            </a:r>
-            <a:r>
-              <a:rPr lang="en-US" sz="2800" b="1" dirty="0" err="1">
-                <a:latin typeface="Arial" panose="020B0604020202020204" pitchFamily="34" charset="0"/>
-                <a:cs typeface="Arial" panose="020B0604020202020204" pitchFamily="34" charset="0"/>
-              </a:rPr>
-              <a:t>udAttA</a:t>
-            </a:r>
-            <a:r>
-              <a:rPr lang="en-US" sz="2800" b="1" dirty="0">
-                <a:latin typeface="Arial" panose="020B0604020202020204" pitchFamily="34" charset="0"/>
-                <a:cs typeface="Arial" panose="020B0604020202020204" pitchFamily="34" charset="0"/>
-              </a:rPr>
-              <a:t>),  </a:t>
-            </a:r>
-            <a:r>
-              <a:rPr lang="en-US" sz="2800" b="1" dirty="0" smtClean="0">
-                <a:latin typeface="Arial" panose="020B0604020202020204" pitchFamily="34" charset="0"/>
-                <a:cs typeface="Arial" panose="020B0604020202020204" pitchFamily="34" charset="0"/>
-              </a:rPr>
-              <a:t/>
-            </a:r>
-            <a:br>
-              <a:rPr lang="en-US" sz="2800" b="1" dirty="0" smtClean="0">
-                <a:latin typeface="Arial" panose="020B0604020202020204" pitchFamily="34" charset="0"/>
-                <a:cs typeface="Arial" panose="020B0604020202020204" pitchFamily="34" charset="0"/>
-              </a:rPr>
-            </a:br>
-            <a:r>
-              <a:rPr lang="en-US" sz="2800" b="1" dirty="0" smtClean="0">
-                <a:latin typeface="Arial" panose="020B0604020202020204" pitchFamily="34" charset="0"/>
-                <a:cs typeface="Arial" panose="020B0604020202020204" pitchFamily="34" charset="0"/>
-              </a:rPr>
-              <a:t>or</a:t>
-            </a:r>
-            <a:r>
-              <a:rPr lang="en-US" sz="2800" b="1" dirty="0">
-                <a:latin typeface="Arial" panose="020B0604020202020204" pitchFamily="34" charset="0"/>
-                <a:cs typeface="Arial" panose="020B0604020202020204" pitchFamily="34" charset="0"/>
-              </a:rPr>
-              <a:t> two of which either one is acute(</a:t>
-            </a:r>
-            <a:r>
-              <a:rPr lang="en-US" sz="2800" b="1" dirty="0" err="1">
+              <a:rPr lang="en-US" sz="2600" b="1" dirty="0" err="1" smtClean="0">
                 <a:latin typeface="Arial" panose="020B0604020202020204" pitchFamily="34" charset="0"/>
                 <a:cs typeface="Arial" panose="020B0604020202020204" pitchFamily="34" charset="0"/>
               </a:rPr>
               <a:t>udAtta</a:t>
             </a:r>
             <a:r>
-              <a:rPr lang="en-US" sz="2800" b="1" dirty="0">
-                <a:latin typeface="Arial" panose="020B0604020202020204" pitchFamily="34" charset="0"/>
-                <a:cs typeface="Arial" panose="020B0604020202020204" pitchFamily="34" charset="0"/>
-              </a:rPr>
-              <a:t>) </a:t>
-            </a:r>
-            <a:r>
-              <a:rPr lang="en-US" sz="2800" b="1" dirty="0" smtClean="0">
-                <a:latin typeface="Arial" panose="020B0604020202020204" pitchFamily="34" charset="0"/>
-                <a:cs typeface="Arial" panose="020B0604020202020204" pitchFamily="34" charset="0"/>
-              </a:rPr>
-              <a:t>and </a:t>
-            </a:r>
-            <a:r>
-              <a:rPr lang="en-US" sz="2800" b="1" dirty="0">
-                <a:latin typeface="Arial" panose="020B0604020202020204" pitchFamily="34" charset="0"/>
-                <a:cs typeface="Arial" panose="020B0604020202020204" pitchFamily="34" charset="0"/>
-              </a:rPr>
-              <a:t> the other </a:t>
-            </a:r>
-            <a:r>
-              <a:rPr lang="en-US" sz="2800" b="1" dirty="0" smtClean="0">
-                <a:latin typeface="Arial" panose="020B0604020202020204" pitchFamily="34" charset="0"/>
-                <a:cs typeface="Arial" panose="020B0604020202020204" pitchFamily="34" charset="0"/>
-              </a:rPr>
-              <a:t> circumflex(</a:t>
-            </a:r>
-            <a:r>
-              <a:rPr lang="en-US" sz="2800" b="1" dirty="0" err="1" smtClean="0">
-                <a:latin typeface="Arial" panose="020B0604020202020204" pitchFamily="34" charset="0"/>
-                <a:cs typeface="Arial" panose="020B0604020202020204" pitchFamily="34" charset="0"/>
-              </a:rPr>
-              <a:t>Swarita</a:t>
-            </a:r>
-            <a:r>
-              <a:rPr lang="en-US" sz="2800" b="1" dirty="0">
-                <a:latin typeface="Arial" panose="020B0604020202020204" pitchFamily="34" charset="0"/>
-                <a:cs typeface="Arial" panose="020B0604020202020204" pitchFamily="34" charset="0"/>
-              </a:rPr>
-              <a:t>),  </a:t>
-            </a:r>
-            <a:r>
-              <a:rPr lang="en-US" sz="2800" b="1" dirty="0" smtClean="0">
-                <a:latin typeface="Arial" panose="020B0604020202020204" pitchFamily="34" charset="0"/>
-                <a:cs typeface="Arial" panose="020B0604020202020204" pitchFamily="34" charset="0"/>
-              </a:rPr>
-              <a:t> </a:t>
-            </a:r>
-            <a:br>
-              <a:rPr lang="en-US" sz="2800" b="1" dirty="0" smtClean="0">
-                <a:latin typeface="Arial" panose="020B0604020202020204" pitchFamily="34" charset="0"/>
-                <a:cs typeface="Arial" panose="020B0604020202020204" pitchFamily="34" charset="0"/>
-              </a:rPr>
-            </a:br>
-            <a:r>
-              <a:rPr lang="en-US" sz="2800" b="1" dirty="0" smtClean="0">
-                <a:latin typeface="Arial" panose="020B0604020202020204" pitchFamily="34" charset="0"/>
-                <a:cs typeface="Arial" panose="020B0604020202020204" pitchFamily="34" charset="0"/>
-              </a:rPr>
-              <a:t>that</a:t>
-            </a:r>
-            <a:r>
-              <a:rPr lang="en-US" sz="2800" b="1" dirty="0">
-                <a:latin typeface="Arial" panose="020B0604020202020204" pitchFamily="34" charset="0"/>
-                <a:cs typeface="Arial" panose="020B0604020202020204" pitchFamily="34" charset="0"/>
-              </a:rPr>
-              <a:t> is </a:t>
-            </a:r>
-            <a:r>
-              <a:rPr lang="en-US" sz="2800" b="1" dirty="0" smtClean="0">
-                <a:latin typeface="Arial" panose="020B0604020202020204" pitchFamily="34" charset="0"/>
-                <a:cs typeface="Arial" panose="020B0604020202020204" pitchFamily="34" charset="0"/>
-              </a:rPr>
-              <a:t>”</a:t>
-            </a:r>
-            <a:r>
-              <a:rPr lang="en-US" sz="3200" b="1" dirty="0" err="1" smtClean="0">
-                <a:latin typeface="Arial" panose="020B0604020202020204" pitchFamily="34" charset="0"/>
-                <a:cs typeface="Arial" panose="020B0604020202020204" pitchFamily="34" charset="0"/>
-              </a:rPr>
-              <a:t>vikrama</a:t>
-            </a:r>
-            <a:r>
-              <a:rPr lang="en-US" sz="2800" b="1" dirty="0" smtClean="0">
-                <a:latin typeface="Arial" panose="020B0604020202020204" pitchFamily="34" charset="0"/>
-                <a:cs typeface="Arial" panose="020B0604020202020204" pitchFamily="34" charset="0"/>
-              </a:rPr>
-              <a:t>.”</a:t>
-            </a:r>
-          </a:p>
-          <a:p>
-            <a:r>
-              <a:rPr lang="en-US" sz="2800" b="1" dirty="0">
-                <a:latin typeface="Arial" panose="020B0604020202020204" pitchFamily="34" charset="0"/>
-                <a:cs typeface="Arial" panose="020B0604020202020204" pitchFamily="34" charset="0"/>
-              </a:rPr>
-              <a:t>PS </a:t>
-            </a:r>
-            <a:r>
-              <a:rPr lang="en-US" sz="2800" b="1" dirty="0" smtClean="0">
-                <a:latin typeface="Arial" panose="020B0604020202020204" pitchFamily="34" charset="0"/>
-                <a:cs typeface="Arial" panose="020B0604020202020204" pitchFamily="34" charset="0"/>
-              </a:rPr>
-              <a:t>19-2 -  As</a:t>
-            </a:r>
-            <a:r>
-              <a:rPr lang="en-US" sz="2800" b="1" dirty="0">
-                <a:latin typeface="Arial" panose="020B0604020202020204" pitchFamily="34" charset="0"/>
-                <a:cs typeface="Arial" panose="020B0604020202020204" pitchFamily="34" charset="0"/>
-              </a:rPr>
-              <a:t> also, according to </a:t>
-            </a:r>
-            <a:r>
-              <a:rPr lang="en-US" sz="2800" b="1" dirty="0" smtClean="0">
-                <a:latin typeface="Arial" panose="020B0604020202020204" pitchFamily="34" charset="0"/>
-                <a:cs typeface="Arial" panose="020B0604020202020204" pitchFamily="34" charset="0"/>
-              </a:rPr>
-              <a:t>Kauṇḍinya</a:t>
-            </a:r>
-            <a:r>
-              <a:rPr lang="en-US" sz="2800" b="1" dirty="0">
-                <a:latin typeface="Arial" panose="020B0604020202020204" pitchFamily="34" charset="0"/>
-                <a:cs typeface="Arial" panose="020B0604020202020204" pitchFamily="34" charset="0"/>
-              </a:rPr>
-              <a:t>, </a:t>
-            </a:r>
-            <a:r>
-              <a:rPr lang="en-US" sz="2800" b="1" dirty="0" smtClean="0">
-                <a:latin typeface="Arial" panose="020B0604020202020204" pitchFamily="34" charset="0"/>
-                <a:cs typeface="Arial" panose="020B0604020202020204" pitchFamily="34" charset="0"/>
-              </a:rPr>
-              <a:t/>
-            </a:r>
-            <a:br>
-              <a:rPr lang="en-US" sz="2800" b="1" dirty="0" smtClean="0">
-                <a:latin typeface="Arial" panose="020B0604020202020204" pitchFamily="34" charset="0"/>
-                <a:cs typeface="Arial" panose="020B0604020202020204" pitchFamily="34" charset="0"/>
-              </a:rPr>
-            </a:br>
-            <a:r>
-              <a:rPr lang="en-US" sz="2800" b="1" dirty="0" smtClean="0">
-                <a:latin typeface="Arial" panose="020B0604020202020204" pitchFamily="34" charset="0"/>
-                <a:cs typeface="Arial" panose="020B0604020202020204" pitchFamily="34" charset="0"/>
-              </a:rPr>
-              <a:t>when</a:t>
-            </a:r>
-            <a:r>
-              <a:rPr lang="en-US" sz="2800" b="1" dirty="0">
-                <a:latin typeface="Arial" panose="020B0604020202020204" pitchFamily="34" charset="0"/>
-                <a:cs typeface="Arial" panose="020B0604020202020204" pitchFamily="34" charset="0"/>
-              </a:rPr>
-              <a:t> a pracaya precedes</a:t>
-            </a:r>
+              <a:rPr lang="en-US" sz="2600" b="1" dirty="0" smtClean="0">
+                <a:latin typeface="Arial" panose="020B0604020202020204" pitchFamily="34" charset="0"/>
+                <a:cs typeface="Arial" panose="020B0604020202020204" pitchFamily="34" charset="0"/>
+              </a:rPr>
+              <a:t> is the </a:t>
+            </a:r>
+            <a:r>
+              <a:rPr lang="en-US" sz="2600" b="1" dirty="0" err="1" smtClean="0">
+                <a:latin typeface="Arial" panose="020B0604020202020204" pitchFamily="34" charset="0"/>
+                <a:cs typeface="Arial" panose="020B0604020202020204" pitchFamily="34" charset="0"/>
+              </a:rPr>
+              <a:t>acyuta</a:t>
+            </a:r>
+            <a:r>
+              <a:rPr lang="en-US" sz="2600" b="1" dirty="0" smtClean="0">
+                <a:latin typeface="Arial" panose="020B0604020202020204" pitchFamily="34" charset="0"/>
+                <a:cs typeface="Arial" panose="020B0604020202020204" pitchFamily="34" charset="0"/>
+              </a:rPr>
+              <a:t> of Vedic Swarams</a:t>
+            </a:r>
+          </a:p>
+          <a:p>
+            <a:pPr lvl="1"/>
+            <a:r>
+              <a:rPr lang="en-US" sz="2400" b="1" dirty="0" smtClean="0">
+                <a:latin typeface="Arial" panose="020B0604020202020204" pitchFamily="34" charset="0"/>
+                <a:cs typeface="Arial" panose="020B0604020202020204" pitchFamily="34" charset="0"/>
+              </a:rPr>
+              <a:t>Like all revolve around </a:t>
+            </a:r>
+            <a:r>
+              <a:rPr lang="en-US" sz="2400" b="1" dirty="0" err="1" smtClean="0">
+                <a:latin typeface="Arial" panose="020B0604020202020204" pitchFamily="34" charset="0"/>
+                <a:cs typeface="Arial" panose="020B0604020202020204" pitchFamily="34" charset="0"/>
+              </a:rPr>
+              <a:t>VishNu</a:t>
+            </a:r>
+            <a:endParaRPr lang="en-US" sz="2400" b="1" dirty="0" smtClean="0">
+              <a:latin typeface="Arial" panose="020B0604020202020204" pitchFamily="34" charset="0"/>
+              <a:cs typeface="Arial" panose="020B0604020202020204" pitchFamily="34" charset="0"/>
+            </a:endParaRPr>
+          </a:p>
+          <a:p>
+            <a:r>
+              <a:rPr lang="en-US" sz="2600" b="1" dirty="0" smtClean="0">
+                <a:latin typeface="Arial" panose="020B0604020202020204" pitchFamily="34" charset="0"/>
+                <a:cs typeface="Arial" panose="020B0604020202020204" pitchFamily="34" charset="0"/>
+              </a:rPr>
+              <a:t>Sets the </a:t>
+            </a:r>
+            <a:r>
+              <a:rPr lang="en-US" sz="2600" b="1" dirty="0" smtClean="0">
+                <a:solidFill>
+                  <a:srgbClr val="FF0000"/>
+                </a:solidFill>
+                <a:latin typeface="Arial" panose="020B0604020202020204" pitchFamily="34" charset="0"/>
+                <a:cs typeface="Arial" panose="020B0604020202020204" pitchFamily="34" charset="0"/>
+              </a:rPr>
+              <a:t>entire tone </a:t>
+            </a:r>
+            <a:r>
+              <a:rPr lang="en-US" sz="2600" b="1" dirty="0" smtClean="0">
+                <a:latin typeface="Arial" panose="020B0604020202020204" pitchFamily="34" charset="0"/>
+                <a:cs typeface="Arial" panose="020B0604020202020204" pitchFamily="34" charset="0"/>
+              </a:rPr>
+              <a:t>of your recital</a:t>
+            </a:r>
+          </a:p>
+          <a:p>
+            <a:r>
+              <a:rPr lang="en-US" sz="2600" b="1" dirty="0" err="1">
+                <a:latin typeface="Arial" panose="020B0604020202020204" pitchFamily="34" charset="0"/>
+                <a:cs typeface="Arial" panose="020B0604020202020204" pitchFamily="34" charset="0"/>
+              </a:rPr>
+              <a:t>Plutams</a:t>
+            </a:r>
+            <a:r>
+              <a:rPr lang="en-US" sz="2600" b="1" dirty="0">
+                <a:latin typeface="Arial" panose="020B0604020202020204" pitchFamily="34" charset="0"/>
+                <a:cs typeface="Arial" panose="020B0604020202020204" pitchFamily="34" charset="0"/>
+              </a:rPr>
+              <a:t> are normally udAttam only</a:t>
+            </a:r>
+          </a:p>
+          <a:p>
+            <a:r>
+              <a:rPr lang="en-US" sz="2600" b="1" dirty="0" smtClean="0">
+                <a:latin typeface="Arial" panose="020B0604020202020204" pitchFamily="34" charset="0"/>
+                <a:cs typeface="Arial" panose="020B0604020202020204" pitchFamily="34" charset="0"/>
+              </a:rPr>
+              <a:t>Various level of Swara Reach – Show </a:t>
+            </a:r>
+            <a:r>
+              <a:rPr lang="en-US" sz="2600" b="1" dirty="0" smtClean="0">
+                <a:latin typeface="Arial" panose="020B0604020202020204" pitchFamily="34" charset="0"/>
+                <a:cs typeface="Arial" panose="020B0604020202020204" pitchFamily="34" charset="0"/>
+              </a:rPr>
+              <a:t>table</a:t>
+            </a:r>
+          </a:p>
+          <a:p>
+            <a:r>
+              <a:rPr lang="en-US" sz="2600" b="1" dirty="0" smtClean="0">
+                <a:latin typeface="Arial" panose="020B0604020202020204" pitchFamily="34" charset="0"/>
+                <a:cs typeface="Arial" panose="020B0604020202020204" pitchFamily="34" charset="0"/>
+              </a:rPr>
+              <a:t>An introduction to hasta mudra in Veda recital</a:t>
+            </a:r>
+            <a:endParaRPr lang="en-US" sz="2600" b="1" dirty="0" smtClean="0">
+              <a:latin typeface="Arial" panose="020B0604020202020204" pitchFamily="34" charset="0"/>
+              <a:cs typeface="Arial" panose="020B0604020202020204" pitchFamily="34" charset="0"/>
+            </a:endParaRPr>
           </a:p>
         </p:txBody>
       </p:sp>
     </p:spTree>
     <p:extLst>
       <p:ext uri="{BB962C8B-B14F-4D97-AF65-F5344CB8AC3E}">
-        <p14:creationId xmlns:p14="http://schemas.microsoft.com/office/powerpoint/2010/main" val="4131985034"/>
+        <p14:creationId xmlns:p14="http://schemas.microsoft.com/office/powerpoint/2010/main" val="2560387084"/>
       </p:ext>
     </p:extLst>
   </p:cSld>

</xml_diff>

<commit_message>
TS 1.6 Tamil Ghanam - 01/02/2022
</commit_message>
<xml_diff>
--- a/Veda Lectures/Swaram Part 3.pptx
+++ b/Veda Lectures/Swaram Part 3.pptx
@@ -301,7 +301,7 @@
           </a:lstStyle>
           <a:p>
             <a:r>
-              <a:rPr lang="en-US" smtClean="0"/>
+              <a:rPr lang="en-US"/>
               <a:t>Click to edit Master title style</a:t>
             </a:r>
             <a:endParaRPr lang="en-US" dirty="0"/>
@@ -421,7 +421,7 @@
           </a:lstStyle>
           <a:p>
             <a:r>
-              <a:rPr lang="en-US" smtClean="0"/>
+              <a:rPr lang="en-US"/>
               <a:t>Click to edit Master subtitle style</a:t>
             </a:r>
             <a:endParaRPr lang="en-US" dirty="0"/>
@@ -461,7 +461,7 @@
             <a:fld id="{5923F103-BC34-4FE4-A40E-EDDEECFDA5D0}" type="datetimeFigureOut">
               <a:rPr lang="en-US" dirty="0"/>
               <a:pPr/>
-              <a:t>1/28/2021</a:t>
+              <a:t>1/31/2022</a:t>
             </a:fld>
             <a:endParaRPr lang="en-US" dirty="0"/>
           </a:p>
@@ -1372,7 +1372,7 @@
           </a:lstStyle>
           <a:p>
             <a:r>
-              <a:rPr lang="en-US" smtClean="0"/>
+              <a:rPr lang="en-US"/>
               <a:t>Click to edit Master title style</a:t>
             </a:r>
             <a:endParaRPr lang="en-US" dirty="0"/>
@@ -1451,7 +1451,7 @@
           </a:lstStyle>
           <a:p>
             <a:r>
-              <a:rPr lang="en-US" smtClean="0"/>
+              <a:rPr lang="en-US"/>
               <a:t>Click icon to add picture</a:t>
             </a:r>
             <a:endParaRPr lang="en-US" dirty="0"/>
@@ -1526,7 +1526,7 @@
           <a:p>
             <a:pPr lvl="0"/>
             <a:r>
-              <a:rPr lang="en-US" smtClean="0"/>
+              <a:rPr lang="en-US"/>
               <a:t>Click to edit Master text styles</a:t>
             </a:r>
           </a:p>
@@ -1549,7 +1549,7 @@
           <a:p>
             <a:fld id="{923A1CC3-2375-41D4-9E03-427CAF2A4C1A}" type="datetimeFigureOut">
               <a:rPr lang="en-US" dirty="0"/>
-              <a:t>1/28/2021</a:t>
+              <a:t>1/31/2022</a:t>
             </a:fld>
             <a:endParaRPr lang="en-US" dirty="0"/>
           </a:p>
@@ -2438,7 +2438,7 @@
           </a:lstStyle>
           <a:p>
             <a:r>
-              <a:rPr lang="en-US" smtClean="0"/>
+              <a:rPr lang="en-US"/>
               <a:t>Click to edit Master title style</a:t>
             </a:r>
             <a:endParaRPr lang="en-US" dirty="0"/>
@@ -2506,7 +2506,7 @@
           <a:p>
             <a:pPr lvl="0"/>
             <a:r>
-              <a:rPr lang="en-US" smtClean="0"/>
+              <a:rPr lang="en-US"/>
               <a:t>Click to edit Master text styles</a:t>
             </a:r>
           </a:p>
@@ -2529,7 +2529,7 @@
           <a:p>
             <a:fld id="{AFF16868-8199-4C2C-A5B1-63AEE139F88E}" type="datetimeFigureOut">
               <a:rPr lang="en-US" dirty="0"/>
-              <a:t>1/28/2021</a:t>
+              <a:t>1/31/2022</a:t>
             </a:fld>
             <a:endParaRPr lang="en-US" dirty="0"/>
           </a:p>
@@ -3496,7 +3496,7 @@
           </a:lstStyle>
           <a:p>
             <a:r>
-              <a:rPr lang="en-US" smtClean="0"/>
+              <a:rPr lang="en-US"/>
               <a:t>Click to edit Master title style</a:t>
             </a:r>
             <a:endParaRPr lang="en-US" dirty="0"/>
@@ -3573,7 +3573,7 @@
           <a:p>
             <a:pPr lvl="0"/>
             <a:r>
-              <a:rPr lang="en-US" smtClean="0"/>
+              <a:rPr lang="en-US"/>
               <a:t>Click to edit Master text styles</a:t>
             </a:r>
           </a:p>
@@ -3640,7 +3640,7 @@
           <a:p>
             <a:pPr lvl="0"/>
             <a:r>
-              <a:rPr lang="en-US" smtClean="0"/>
+              <a:rPr lang="en-US"/>
               <a:t>Click to edit Master text styles</a:t>
             </a:r>
           </a:p>
@@ -3663,7 +3663,7 @@
           <a:p>
             <a:fld id="{AAD9FF7F-6988-44CC-821B-644E70CD2F73}" type="datetimeFigureOut">
               <a:rPr lang="en-US" dirty="0"/>
-              <a:t>1/28/2021</a:t>
+              <a:t>1/31/2022</a:t>
             </a:fld>
             <a:endParaRPr lang="en-US" dirty="0"/>
           </a:p>
@@ -4552,7 +4552,7 @@
           </a:lstStyle>
           <a:p>
             <a:r>
-              <a:rPr lang="en-US" smtClean="0"/>
+              <a:rPr lang="en-US"/>
               <a:t>Click to edit Master title style</a:t>
             </a:r>
             <a:endParaRPr lang="en-US" dirty="0"/>
@@ -4673,7 +4673,7 @@
           <a:p>
             <a:pPr lvl="0"/>
             <a:r>
-              <a:rPr lang="en-US" smtClean="0"/>
+              <a:rPr lang="en-US"/>
               <a:t>Click to edit Master text styles</a:t>
             </a:r>
           </a:p>
@@ -4696,7 +4696,7 @@
           <a:p>
             <a:fld id="{5C12C299-16B2-4475-990D-751901EACC14}" type="datetimeFigureOut">
               <a:rPr lang="en-US" dirty="0"/>
-              <a:t>1/28/2021</a:t>
+              <a:t>1/31/2022</a:t>
             </a:fld>
             <a:endParaRPr lang="en-US" dirty="0"/>
           </a:p>
@@ -4835,7 +4835,7 @@
           </a:lstStyle>
           <a:p>
             <a:r>
-              <a:rPr lang="en-US" smtClean="0"/>
+              <a:rPr lang="en-US"/>
               <a:t>Click to edit Master title style</a:t>
             </a:r>
             <a:endParaRPr lang="en-US" dirty="0"/>
@@ -4910,7 +4910,7 @@
           <a:p>
             <a:pPr lvl="0"/>
             <a:r>
-              <a:rPr lang="en-US" smtClean="0"/>
+              <a:rPr lang="en-US"/>
               <a:t>Click to edit Master text styles</a:t>
             </a:r>
           </a:p>
@@ -4977,7 +4977,7 @@
           <a:p>
             <a:pPr lvl="0"/>
             <a:r>
-              <a:rPr lang="en-US" smtClean="0"/>
+              <a:rPr lang="en-US"/>
               <a:t>Click to edit Master text styles</a:t>
             </a:r>
           </a:p>
@@ -5051,7 +5051,7 @@
           <a:p>
             <a:pPr lvl="0"/>
             <a:r>
-              <a:rPr lang="en-US" smtClean="0"/>
+              <a:rPr lang="en-US"/>
               <a:t>Click to edit Master text styles</a:t>
             </a:r>
           </a:p>
@@ -5118,7 +5118,7 @@
           <a:p>
             <a:pPr lvl="0"/>
             <a:r>
-              <a:rPr lang="en-US" smtClean="0"/>
+              <a:rPr lang="en-US"/>
               <a:t>Click to edit Master text styles</a:t>
             </a:r>
           </a:p>
@@ -5192,7 +5192,7 @@
           <a:p>
             <a:pPr lvl="0"/>
             <a:r>
-              <a:rPr lang="en-US" smtClean="0"/>
+              <a:rPr lang="en-US"/>
               <a:t>Click to edit Master text styles</a:t>
             </a:r>
           </a:p>
@@ -5259,7 +5259,7 @@
           <a:p>
             <a:pPr lvl="0"/>
             <a:r>
-              <a:rPr lang="en-US" smtClean="0"/>
+              <a:rPr lang="en-US"/>
               <a:t>Click to edit Master text styles</a:t>
             </a:r>
           </a:p>
@@ -5356,7 +5356,7 @@
           <a:p>
             <a:fld id="{9FE86839-B9D8-4651-8783-F325ECE74E65}" type="datetimeFigureOut">
               <a:rPr lang="en-US" dirty="0"/>
-              <a:t>1/28/2021</a:t>
+              <a:t>1/31/2022</a:t>
             </a:fld>
             <a:endParaRPr lang="en-US" dirty="0"/>
           </a:p>
@@ -5459,7 +5459,7 @@
           </a:lstStyle>
           <a:p>
             <a:r>
-              <a:rPr lang="en-US" smtClean="0"/>
+              <a:rPr lang="en-US"/>
               <a:t>Click to edit Master title style</a:t>
             </a:r>
             <a:endParaRPr lang="en-US" dirty="0"/>
@@ -5534,7 +5534,7 @@
           <a:p>
             <a:pPr lvl="0"/>
             <a:r>
-              <a:rPr lang="en-US" smtClean="0"/>
+              <a:rPr lang="en-US"/>
               <a:t>Click to edit Master text styles</a:t>
             </a:r>
           </a:p>
@@ -5612,7 +5612,7 @@
           </a:lstStyle>
           <a:p>
             <a:r>
-              <a:rPr lang="en-US" smtClean="0"/>
+              <a:rPr lang="en-US"/>
               <a:t>Click icon to add picture</a:t>
             </a:r>
             <a:endParaRPr lang="en-US" dirty="0"/>
@@ -5680,7 +5680,7 @@
           <a:p>
             <a:pPr lvl="0"/>
             <a:r>
-              <a:rPr lang="en-US" smtClean="0"/>
+              <a:rPr lang="en-US"/>
               <a:t>Click to edit Master text styles</a:t>
             </a:r>
           </a:p>
@@ -5754,7 +5754,7 @@
           <a:p>
             <a:pPr lvl="0"/>
             <a:r>
-              <a:rPr lang="en-US" smtClean="0"/>
+              <a:rPr lang="en-US"/>
               <a:t>Click to edit Master text styles</a:t>
             </a:r>
           </a:p>
@@ -5832,7 +5832,7 @@
           </a:lstStyle>
           <a:p>
             <a:r>
-              <a:rPr lang="en-US" smtClean="0"/>
+              <a:rPr lang="en-US"/>
               <a:t>Click icon to add picture</a:t>
             </a:r>
             <a:endParaRPr lang="en-US" dirty="0"/>
@@ -5900,7 +5900,7 @@
           <a:p>
             <a:pPr lvl="0"/>
             <a:r>
-              <a:rPr lang="en-US" smtClean="0"/>
+              <a:rPr lang="en-US"/>
               <a:t>Click to edit Master text styles</a:t>
             </a:r>
           </a:p>
@@ -5974,7 +5974,7 @@
           <a:p>
             <a:pPr lvl="0"/>
             <a:r>
-              <a:rPr lang="en-US" smtClean="0"/>
+              <a:rPr lang="en-US"/>
               <a:t>Click to edit Master text styles</a:t>
             </a:r>
           </a:p>
@@ -6052,7 +6052,7 @@
           </a:lstStyle>
           <a:p>
             <a:r>
-              <a:rPr lang="en-US" smtClean="0"/>
+              <a:rPr lang="en-US"/>
               <a:t>Click icon to add picture</a:t>
             </a:r>
             <a:endParaRPr lang="en-US" dirty="0"/>
@@ -6120,7 +6120,7 @@
           <a:p>
             <a:pPr lvl="0"/>
             <a:r>
-              <a:rPr lang="en-US" smtClean="0"/>
+              <a:rPr lang="en-US"/>
               <a:t>Click to edit Master text styles</a:t>
             </a:r>
           </a:p>
@@ -6217,7 +6217,7 @@
           <a:p>
             <a:fld id="{FD484F64-32F6-45C5-931F-ADC1662401D0}" type="datetimeFigureOut">
               <a:rPr lang="en-US" dirty="0"/>
-              <a:t>1/28/2021</a:t>
+              <a:t>1/31/2022</a:t>
             </a:fld>
             <a:endParaRPr lang="en-US" dirty="0"/>
           </a:p>
@@ -6321,7 +6321,7 @@
           <a:lstStyle/>
           <a:p>
             <a:r>
-              <a:rPr lang="en-US" smtClean="0"/>
+              <a:rPr lang="en-US"/>
               <a:t>Click to edit Master title style</a:t>
             </a:r>
             <a:endParaRPr lang="en-US" dirty="0"/>
@@ -6350,35 +6350,35 @@
           <a:p>
             <a:pPr lvl="0"/>
             <a:r>
-              <a:rPr lang="en-US" smtClean="0"/>
+              <a:rPr lang="en-US"/>
               <a:t>Click to edit Master text styles</a:t>
             </a:r>
           </a:p>
           <a:p>
             <a:pPr lvl="1"/>
             <a:r>
-              <a:rPr lang="en-US" smtClean="0"/>
+              <a:rPr lang="en-US"/>
               <a:t>Second level</a:t>
             </a:r>
           </a:p>
           <a:p>
             <a:pPr lvl="2"/>
             <a:r>
-              <a:rPr lang="en-US" smtClean="0"/>
+              <a:rPr lang="en-US"/>
               <a:t>Third level</a:t>
             </a:r>
           </a:p>
           <a:p>
             <a:pPr lvl="3"/>
             <a:r>
-              <a:rPr lang="en-US" smtClean="0"/>
+              <a:rPr lang="en-US"/>
               <a:t>Fourth level</a:t>
             </a:r>
           </a:p>
           <a:p>
             <a:pPr lvl="4"/>
             <a:r>
-              <a:rPr lang="en-US" smtClean="0"/>
+              <a:rPr lang="en-US"/>
               <a:t>Fifth level</a:t>
             </a:r>
             <a:endParaRPr lang="en-US" dirty="0"/>
@@ -6407,7 +6407,7 @@
           <a:p>
             <a:fld id="{53086D93-FCAC-47E0-A2EE-787E62CA814C}" type="datetimeFigureOut">
               <a:rPr lang="en-US" dirty="0"/>
-              <a:t>1/28/2021</a:t>
+              <a:t>1/31/2022</a:t>
             </a:fld>
             <a:endParaRPr lang="en-US" dirty="0"/>
           </a:p>
@@ -7293,7 +7293,7 @@
           <a:lstStyle/>
           <a:p>
             <a:r>
-              <a:rPr lang="en-US" smtClean="0"/>
+              <a:rPr lang="en-US"/>
               <a:t>Click to edit Master title style</a:t>
             </a:r>
             <a:endParaRPr lang="en-US" dirty="0"/>
@@ -7322,35 +7322,35 @@
           <a:p>
             <a:pPr lvl="0"/>
             <a:r>
-              <a:rPr lang="en-US" smtClean="0"/>
+              <a:rPr lang="en-US"/>
               <a:t>Click to edit Master text styles</a:t>
             </a:r>
           </a:p>
           <a:p>
             <a:pPr lvl="1"/>
             <a:r>
-              <a:rPr lang="en-US" smtClean="0"/>
+              <a:rPr lang="en-US"/>
               <a:t>Second level</a:t>
             </a:r>
           </a:p>
           <a:p>
             <a:pPr lvl="2"/>
             <a:r>
-              <a:rPr lang="en-US" smtClean="0"/>
+              <a:rPr lang="en-US"/>
               <a:t>Third level</a:t>
             </a:r>
           </a:p>
           <a:p>
             <a:pPr lvl="3"/>
             <a:r>
-              <a:rPr lang="en-US" smtClean="0"/>
+              <a:rPr lang="en-US"/>
               <a:t>Fourth level</a:t>
             </a:r>
           </a:p>
           <a:p>
             <a:pPr lvl="4"/>
             <a:r>
-              <a:rPr lang="en-US" smtClean="0"/>
+              <a:rPr lang="en-US"/>
               <a:t>Fifth level</a:t>
             </a:r>
             <a:endParaRPr lang="en-US" dirty="0"/>
@@ -7379,7 +7379,7 @@
           <a:p>
             <a:fld id="{CDA879A6-0FD0-4734-A311-86BFCA472E6E}" type="datetimeFigureOut">
               <a:rPr lang="en-US" dirty="0"/>
-              <a:t>1/28/2021</a:t>
+              <a:t>1/31/2022</a:t>
             </a:fld>
             <a:endParaRPr lang="en-US" dirty="0"/>
           </a:p>
@@ -7509,7 +7509,7 @@
           <a:lstStyle/>
           <a:p>
             <a:r>
-              <a:rPr lang="en-US" smtClean="0"/>
+              <a:rPr lang="en-US"/>
               <a:t>Click to edit Master title style</a:t>
             </a:r>
             <a:endParaRPr lang="en-US" dirty="0"/>
@@ -7538,35 +7538,35 @@
           <a:p>
             <a:pPr lvl="0"/>
             <a:r>
-              <a:rPr lang="en-US" smtClean="0"/>
+              <a:rPr lang="en-US"/>
               <a:t>Click to edit Master text styles</a:t>
             </a:r>
           </a:p>
           <a:p>
             <a:pPr lvl="1"/>
             <a:r>
-              <a:rPr lang="en-US" smtClean="0"/>
+              <a:rPr lang="en-US"/>
               <a:t>Second level</a:t>
             </a:r>
           </a:p>
           <a:p>
             <a:pPr lvl="2"/>
             <a:r>
-              <a:rPr lang="en-US" smtClean="0"/>
+              <a:rPr lang="en-US"/>
               <a:t>Third level</a:t>
             </a:r>
           </a:p>
           <a:p>
             <a:pPr lvl="3"/>
             <a:r>
-              <a:rPr lang="en-US" smtClean="0"/>
+              <a:rPr lang="en-US"/>
               <a:t>Fourth level</a:t>
             </a:r>
           </a:p>
           <a:p>
             <a:pPr lvl="4"/>
             <a:r>
-              <a:rPr lang="en-US" smtClean="0"/>
+              <a:rPr lang="en-US"/>
               <a:t>Fifth level</a:t>
             </a:r>
             <a:endParaRPr lang="en-US" dirty="0"/>
@@ -7590,7 +7590,7 @@
           <a:p>
             <a:fld id="{19C9CA7B-DFD4-44B5-8C60-D14B8CD1FB59}" type="datetimeFigureOut">
               <a:rPr lang="en-US" dirty="0"/>
-              <a:t>1/28/2021</a:t>
+              <a:t>1/31/2022</a:t>
             </a:fld>
             <a:endParaRPr lang="en-US" dirty="0"/>
           </a:p>
@@ -8480,7 +8480,7 @@
           </a:lstStyle>
           <a:p>
             <a:r>
-              <a:rPr lang="en-US" smtClean="0"/>
+              <a:rPr lang="en-US"/>
               <a:t>Click to edit Master title style</a:t>
             </a:r>
             <a:endParaRPr lang="en-US" dirty="0"/>
@@ -8601,7 +8601,7 @@
           <a:p>
             <a:pPr lvl="0"/>
             <a:r>
-              <a:rPr lang="en-US" smtClean="0"/>
+              <a:rPr lang="en-US"/>
               <a:t>Click to edit Master text styles</a:t>
             </a:r>
           </a:p>
@@ -8624,7 +8624,7 @@
           <a:p>
             <a:fld id="{F34E6425-0181-43F2-84FC-787E803FD2F8}" type="datetimeFigureOut">
               <a:rPr lang="en-US" dirty="0"/>
-              <a:t>1/28/2021</a:t>
+              <a:t>1/31/2022</a:t>
             </a:fld>
             <a:endParaRPr lang="en-US" dirty="0"/>
           </a:p>
@@ -8754,7 +8754,7 @@
           <a:lstStyle/>
           <a:p>
             <a:r>
-              <a:rPr lang="en-US" smtClean="0"/>
+              <a:rPr lang="en-US"/>
               <a:t>Click to edit Master title style</a:t>
             </a:r>
             <a:endParaRPr lang="en-US" dirty="0"/>
@@ -8785,35 +8785,35 @@
           <a:p>
             <a:pPr lvl="0"/>
             <a:r>
-              <a:rPr lang="en-US" smtClean="0"/>
+              <a:rPr lang="en-US"/>
               <a:t>Click to edit Master text styles</a:t>
             </a:r>
           </a:p>
           <a:p>
             <a:pPr lvl="1"/>
             <a:r>
-              <a:rPr lang="en-US" smtClean="0"/>
+              <a:rPr lang="en-US"/>
               <a:t>Second level</a:t>
             </a:r>
           </a:p>
           <a:p>
             <a:pPr lvl="2"/>
             <a:r>
-              <a:rPr lang="en-US" smtClean="0"/>
+              <a:rPr lang="en-US"/>
               <a:t>Third level</a:t>
             </a:r>
           </a:p>
           <a:p>
             <a:pPr lvl="3"/>
             <a:r>
-              <a:rPr lang="en-US" smtClean="0"/>
+              <a:rPr lang="en-US"/>
               <a:t>Fourth level</a:t>
             </a:r>
           </a:p>
           <a:p>
             <a:pPr lvl="4"/>
             <a:r>
-              <a:rPr lang="en-US" smtClean="0"/>
+              <a:rPr lang="en-US"/>
               <a:t>Fifth level</a:t>
             </a:r>
             <a:endParaRPr lang="en-US" dirty="0"/>
@@ -8844,35 +8844,35 @@
           <a:p>
             <a:pPr lvl="0"/>
             <a:r>
-              <a:rPr lang="en-US" smtClean="0"/>
+              <a:rPr lang="en-US"/>
               <a:t>Click to edit Master text styles</a:t>
             </a:r>
           </a:p>
           <a:p>
             <a:pPr lvl="1"/>
             <a:r>
-              <a:rPr lang="en-US" smtClean="0"/>
+              <a:rPr lang="en-US"/>
               <a:t>Second level</a:t>
             </a:r>
           </a:p>
           <a:p>
             <a:pPr lvl="2"/>
             <a:r>
-              <a:rPr lang="en-US" smtClean="0"/>
+              <a:rPr lang="en-US"/>
               <a:t>Third level</a:t>
             </a:r>
           </a:p>
           <a:p>
             <a:pPr lvl="3"/>
             <a:r>
-              <a:rPr lang="en-US" smtClean="0"/>
+              <a:rPr lang="en-US"/>
               <a:t>Fourth level</a:t>
             </a:r>
           </a:p>
           <a:p>
             <a:pPr lvl="4"/>
             <a:r>
-              <a:rPr lang="en-US" smtClean="0"/>
+              <a:rPr lang="en-US"/>
               <a:t>Fifth level</a:t>
             </a:r>
             <a:endParaRPr lang="en-US" dirty="0"/>
@@ -8896,7 +8896,7 @@
           <a:p>
             <a:fld id="{3BDB8791-F1B0-41E7-B7FD-A781E65C4266}" type="datetimeFigureOut">
               <a:rPr lang="en-US" dirty="0"/>
-              <a:t>1/28/2021</a:t>
+              <a:t>1/31/2022</a:t>
             </a:fld>
             <a:endParaRPr lang="en-US" dirty="0"/>
           </a:p>
@@ -8994,7 +8994,7 @@
           </a:lstStyle>
           <a:p>
             <a:r>
-              <a:rPr lang="en-US" smtClean="0"/>
+              <a:rPr lang="en-US"/>
               <a:t>Click to edit Master title style</a:t>
             </a:r>
             <a:endParaRPr lang="en-US" dirty="0"/>
@@ -9066,7 +9066,7 @@
           <a:p>
             <a:pPr lvl="0"/>
             <a:r>
-              <a:rPr lang="en-US" smtClean="0"/>
+              <a:rPr lang="en-US"/>
               <a:t>Click to edit Master text styles</a:t>
             </a:r>
           </a:p>
@@ -9096,35 +9096,35 @@
           <a:p>
             <a:pPr lvl="0"/>
             <a:r>
-              <a:rPr lang="en-US" smtClean="0"/>
+              <a:rPr lang="en-US"/>
               <a:t>Click to edit Master text styles</a:t>
             </a:r>
           </a:p>
           <a:p>
             <a:pPr lvl="1"/>
             <a:r>
-              <a:rPr lang="en-US" smtClean="0"/>
+              <a:rPr lang="en-US"/>
               <a:t>Second level</a:t>
             </a:r>
           </a:p>
           <a:p>
             <a:pPr lvl="2"/>
             <a:r>
-              <a:rPr lang="en-US" smtClean="0"/>
+              <a:rPr lang="en-US"/>
               <a:t>Third level</a:t>
             </a:r>
           </a:p>
           <a:p>
             <a:pPr lvl="3"/>
             <a:r>
-              <a:rPr lang="en-US" smtClean="0"/>
+              <a:rPr lang="en-US"/>
               <a:t>Fourth level</a:t>
             </a:r>
           </a:p>
           <a:p>
             <a:pPr lvl="4"/>
             <a:r>
-              <a:rPr lang="en-US" smtClean="0"/>
+              <a:rPr lang="en-US"/>
               <a:t>Fifth level</a:t>
             </a:r>
             <a:endParaRPr lang="en-US" dirty="0"/>
@@ -9196,7 +9196,7 @@
           <a:p>
             <a:pPr lvl="0"/>
             <a:r>
-              <a:rPr lang="en-US" smtClean="0"/>
+              <a:rPr lang="en-US"/>
               <a:t>Click to edit Master text styles</a:t>
             </a:r>
           </a:p>
@@ -9254,35 +9254,35 @@
           <a:p>
             <a:pPr lvl="0"/>
             <a:r>
-              <a:rPr lang="en-US" smtClean="0"/>
+              <a:rPr lang="en-US"/>
               <a:t>Click to edit Master text styles</a:t>
             </a:r>
           </a:p>
           <a:p>
             <a:pPr lvl="1"/>
             <a:r>
-              <a:rPr lang="en-US" smtClean="0"/>
+              <a:rPr lang="en-US"/>
               <a:t>Second level</a:t>
             </a:r>
           </a:p>
           <a:p>
             <a:pPr lvl="2"/>
             <a:r>
-              <a:rPr lang="en-US" smtClean="0"/>
+              <a:rPr lang="en-US"/>
               <a:t>Third level</a:t>
             </a:r>
           </a:p>
           <a:p>
             <a:pPr lvl="3"/>
             <a:r>
-              <a:rPr lang="en-US" smtClean="0"/>
+              <a:rPr lang="en-US"/>
               <a:t>Fourth level</a:t>
             </a:r>
           </a:p>
           <a:p>
             <a:pPr lvl="4"/>
             <a:r>
-              <a:rPr lang="en-US" smtClean="0"/>
+              <a:rPr lang="en-US"/>
               <a:t>Fifth level</a:t>
             </a:r>
             <a:endParaRPr lang="en-US" dirty="0"/>
@@ -9306,7 +9306,7 @@
           <a:p>
             <a:fld id="{5FDD63B2-E120-4ED8-B27B-C685F510A5FE}" type="datetimeFigureOut">
               <a:rPr lang="en-US" dirty="0"/>
-              <a:t>1/28/2021</a:t>
+              <a:t>1/31/2022</a:t>
             </a:fld>
             <a:endParaRPr lang="en-US" dirty="0"/>
           </a:p>
@@ -9409,7 +9409,7 @@
           </a:lstStyle>
           <a:p>
             <a:r>
-              <a:rPr lang="en-US" smtClean="0"/>
+              <a:rPr lang="en-US"/>
               <a:t>Click to edit Master title style</a:t>
             </a:r>
             <a:endParaRPr lang="en-US" dirty="0"/>
@@ -9433,7 +9433,7 @@
           <a:p>
             <a:fld id="{7AA18ACC-A947-437B-A130-35BD54FDF1E9}" type="datetimeFigureOut">
               <a:rPr lang="en-US" dirty="0"/>
-              <a:t>1/28/2021</a:t>
+              <a:t>1/31/2022</a:t>
             </a:fld>
             <a:endParaRPr lang="en-US" dirty="0"/>
           </a:p>
@@ -9528,7 +9528,7 @@
           <a:p>
             <a:fld id="{7C8D7E02-BCB8-4D50-A234-369438C08659}" type="datetimeFigureOut">
               <a:rPr lang="en-US" dirty="0"/>
-              <a:t>1/28/2021</a:t>
+              <a:t>1/31/2022</a:t>
             </a:fld>
             <a:endParaRPr lang="en-US" dirty="0"/>
           </a:p>
@@ -10454,7 +10454,7 @@
           </a:lstStyle>
           <a:p>
             <a:r>
-              <a:rPr lang="en-US" smtClean="0"/>
+              <a:rPr lang="en-US"/>
               <a:t>Click to edit Master title style</a:t>
             </a:r>
             <a:endParaRPr lang="en-US" dirty="0"/>
@@ -10485,35 +10485,35 @@
           <a:p>
             <a:pPr lvl="0"/>
             <a:r>
-              <a:rPr lang="en-US" smtClean="0"/>
+              <a:rPr lang="en-US"/>
               <a:t>Click to edit Master text styles</a:t>
             </a:r>
           </a:p>
           <a:p>
             <a:pPr lvl="1"/>
             <a:r>
-              <a:rPr lang="en-US" smtClean="0"/>
+              <a:rPr lang="en-US"/>
               <a:t>Second level</a:t>
             </a:r>
           </a:p>
           <a:p>
             <a:pPr lvl="2"/>
             <a:r>
-              <a:rPr lang="en-US" smtClean="0"/>
+              <a:rPr lang="en-US"/>
               <a:t>Third level</a:t>
             </a:r>
           </a:p>
           <a:p>
             <a:pPr lvl="3"/>
             <a:r>
-              <a:rPr lang="en-US" smtClean="0"/>
+              <a:rPr lang="en-US"/>
               <a:t>Fourth level</a:t>
             </a:r>
           </a:p>
           <a:p>
             <a:pPr lvl="4"/>
             <a:r>
-              <a:rPr lang="en-US" smtClean="0"/>
+              <a:rPr lang="en-US"/>
               <a:t>Fifth level</a:t>
             </a:r>
             <a:endParaRPr lang="en-US" dirty="0"/>
@@ -10586,7 +10586,7 @@
           <a:p>
             <a:pPr lvl="0"/>
             <a:r>
-              <a:rPr lang="en-US" smtClean="0"/>
+              <a:rPr lang="en-US"/>
               <a:t>Click to edit Master text styles</a:t>
             </a:r>
           </a:p>
@@ -10609,7 +10609,7 @@
           <a:p>
             <a:fld id="{76E86A4C-8E40-4F87-A4F0-01A0687C5742}" type="datetimeFigureOut">
               <a:rPr lang="en-US" dirty="0"/>
-              <a:t>1/28/2021</a:t>
+              <a:t>1/31/2022</a:t>
             </a:fld>
             <a:endParaRPr lang="en-US" dirty="0"/>
           </a:p>
@@ -11537,7 +11537,7 @@
           </a:lstStyle>
           <a:p>
             <a:r>
-              <a:rPr lang="en-US" smtClean="0"/>
+              <a:rPr lang="en-US"/>
               <a:t>Click to edit Master title style</a:t>
             </a:r>
             <a:endParaRPr lang="en-US" dirty="0"/>
@@ -11619,7 +11619,7 @@
               <a:buNone/>
             </a:pPr>
             <a:r>
-              <a:rPr lang="en-US" smtClean="0"/>
+              <a:rPr lang="en-US"/>
               <a:t>Click icon to add picture</a:t>
             </a:r>
             <a:endParaRPr lang="en-US" dirty="0"/>
@@ -11694,7 +11694,7 @@
           <a:p>
             <a:pPr lvl="0"/>
             <a:r>
-              <a:rPr lang="en-US" smtClean="0"/>
+              <a:rPr lang="en-US"/>
               <a:t>Click to edit Master text styles</a:t>
             </a:r>
           </a:p>
@@ -11717,7 +11717,7 @@
           <a:p>
             <a:fld id="{35E72C73-2D91-4E12-BA25-F0AA0C03599B}" type="datetimeFigureOut">
               <a:rPr lang="en-US" dirty="0"/>
-              <a:t>1/28/2021</a:t>
+              <a:t>1/31/2022</a:t>
             </a:fld>
             <a:endParaRPr lang="en-US" dirty="0"/>
           </a:p>
@@ -12612,7 +12612,7 @@
           <a:lstStyle/>
           <a:p>
             <a:r>
-              <a:rPr lang="en-US" smtClean="0"/>
+              <a:rPr lang="en-US"/>
               <a:t>Click to edit Master title style</a:t>
             </a:r>
             <a:endParaRPr lang="en-US" dirty="0"/>
@@ -12646,35 +12646,35 @@
           <a:p>
             <a:pPr lvl="0"/>
             <a:r>
-              <a:rPr lang="en-US" smtClean="0"/>
+              <a:rPr lang="en-US"/>
               <a:t>Click to edit Master text styles</a:t>
             </a:r>
           </a:p>
           <a:p>
             <a:pPr lvl="1"/>
             <a:r>
-              <a:rPr lang="en-US" smtClean="0"/>
+              <a:rPr lang="en-US"/>
               <a:t>Second level</a:t>
             </a:r>
           </a:p>
           <a:p>
             <a:pPr lvl="2"/>
             <a:r>
-              <a:rPr lang="en-US" smtClean="0"/>
+              <a:rPr lang="en-US"/>
               <a:t>Third level</a:t>
             </a:r>
           </a:p>
           <a:p>
             <a:pPr lvl="3"/>
             <a:r>
-              <a:rPr lang="en-US" smtClean="0"/>
+              <a:rPr lang="en-US"/>
               <a:t>Fourth level</a:t>
             </a:r>
           </a:p>
           <a:p>
             <a:pPr lvl="4"/>
             <a:r>
-              <a:rPr lang="en-US" smtClean="0"/>
+              <a:rPr lang="en-US"/>
               <a:t>Fifth level</a:t>
             </a:r>
             <a:endParaRPr lang="en-US" dirty="0"/>
@@ -12714,7 +12714,7 @@
           <a:p>
             <a:fld id="{2BE451C3-0FF4-47C4-B829-773ADF60F88C}" type="datetimeFigureOut">
               <a:rPr lang="en-US" dirty="0"/>
-              <a:t>1/28/2021</a:t>
+              <a:t>1/31/2022</a:t>
             </a:fld>
             <a:endParaRPr lang="en-US" dirty="0"/>
           </a:p>
@@ -13290,10 +13290,9 @@
           <a:lstStyle/>
           <a:p>
             <a:r>
-              <a:rPr lang="en-US" dirty="0" smtClean="0"/>
+              <a:rPr lang="en-US" dirty="0"/>
               <a:t>Swaram Part 3 onwards</a:t>
             </a:r>
-            <a:endParaRPr lang="en-US" dirty="0"/>
           </a:p>
         </p:txBody>
       </p:sp>
@@ -13313,10 +13312,9 @@
           <a:lstStyle/>
           <a:p>
             <a:r>
-              <a:rPr lang="en-US" dirty="0" smtClean="0"/>
+              <a:rPr lang="en-US" dirty="0"/>
               <a:t>Veda VMS</a:t>
             </a:r>
-            <a:endParaRPr lang="en-US" dirty="0"/>
           </a:p>
         </p:txBody>
       </p:sp>
@@ -13330,13 +13328,6 @@
   <p:clrMapOvr>
     <a:masterClrMapping/>
   </p:clrMapOvr>
-  <p:timing>
-    <p:tnLst>
-      <p:par>
-        <p:cTn id="1" dur="indefinite" restart="never" nodeType="tmRoot"/>
-      </p:par>
-    </p:tnLst>
-  </p:timing>
 </p:sld>
 </file>
 
@@ -13378,10 +13369,9 @@
           <a:lstStyle/>
           <a:p>
             <a:r>
-              <a:rPr lang="en-US" dirty="0" smtClean="0"/>
+              <a:rPr lang="en-US" dirty="0"/>
               <a:t>Special Padams/Words –Swaritam followed by anudAttam</a:t>
             </a:r>
-            <a:endParaRPr lang="en-US" dirty="0"/>
           </a:p>
         </p:txBody>
       </p:sp>
@@ -13403,7 +13393,7 @@
           <a:lstStyle/>
           <a:p>
             <a:r>
-              <a:rPr lang="en-US" sz="2800" b="1" dirty="0" smtClean="0">
+              <a:rPr lang="en-US" sz="2800" b="1" dirty="0">
                 <a:latin typeface="Arial" panose="020B0604020202020204" pitchFamily="34" charset="0"/>
                 <a:cs typeface="Arial" panose="020B0604020202020204" pitchFamily="34" charset="0"/>
               </a:rPr>
@@ -13413,41 +13403,41 @@
           <a:p>
             <a:pPr lvl="1"/>
             <a:r>
-              <a:rPr lang="en-US" sz="2600" b="1" dirty="0" err="1" smtClean="0">
+              <a:rPr lang="en-US" sz="2600" b="1" dirty="0" err="1">
                 <a:latin typeface="Arial" panose="020B0604020202020204" pitchFamily="34" charset="0"/>
                 <a:cs typeface="Arial" panose="020B0604020202020204" pitchFamily="34" charset="0"/>
               </a:rPr>
               <a:t>SaravyA</a:t>
             </a:r>
             <a:r>
-              <a:rPr lang="en-US" sz="2600" b="1" dirty="0" smtClean="0">
+              <a:rPr lang="en-US" sz="2600" b="1" dirty="0">
                 <a:latin typeface="Arial" panose="020B0604020202020204" pitchFamily="34" charset="0"/>
                 <a:cs typeface="Arial" panose="020B0604020202020204" pitchFamily="34" charset="0"/>
               </a:rPr>
               <a:t>, </a:t>
             </a:r>
             <a:r>
-              <a:rPr lang="en-US" sz="2600" b="1" dirty="0" err="1" smtClean="0">
+              <a:rPr lang="en-US" sz="2600" b="1" dirty="0" err="1">
                 <a:latin typeface="Arial" panose="020B0604020202020204" pitchFamily="34" charset="0"/>
                 <a:cs typeface="Arial" panose="020B0604020202020204" pitchFamily="34" charset="0"/>
               </a:rPr>
               <a:t>yAdudhAnya</a:t>
             </a:r>
             <a:r>
-              <a:rPr lang="en-US" sz="2600" b="1" dirty="0" smtClean="0">
+              <a:rPr lang="en-US" sz="2600" b="1" dirty="0">
                 <a:latin typeface="Arial" panose="020B0604020202020204" pitchFamily="34" charset="0"/>
                 <a:cs typeface="Arial" panose="020B0604020202020204" pitchFamily="34" charset="0"/>
               </a:rPr>
               <a:t>, </a:t>
             </a:r>
             <a:r>
-              <a:rPr lang="en-US" sz="2600" b="1" dirty="0" err="1" smtClean="0">
+              <a:rPr lang="en-US" sz="2600" b="1" dirty="0" err="1">
                 <a:latin typeface="Arial" panose="020B0604020202020204" pitchFamily="34" charset="0"/>
                 <a:cs typeface="Arial" panose="020B0604020202020204" pitchFamily="34" charset="0"/>
               </a:rPr>
               <a:t>manuShyA</a:t>
             </a:r>
-            <a:endParaRPr lang="en-US" sz="2600" b="1" dirty="0" smtClean="0">
+            <a:endParaRPr lang="en-US" sz="2600" b="1" dirty="0">
               <a:latin typeface="Arial" panose="020B0604020202020204" pitchFamily="34" charset="0"/>
               <a:cs typeface="Arial" panose="020B0604020202020204" pitchFamily="34" charset="0"/>
             </a:endParaRPr>
@@ -13455,7 +13445,7 @@
           <a:p>
             <a:pPr lvl="1"/>
             <a:r>
-              <a:rPr lang="en-US" sz="2600" b="1" dirty="0" smtClean="0">
+              <a:rPr lang="en-US" sz="2600" b="1" dirty="0">
                 <a:latin typeface="Arial" panose="020B0604020202020204" pitchFamily="34" charset="0"/>
                 <a:cs typeface="Arial" panose="020B0604020202020204" pitchFamily="34" charset="0"/>
               </a:rPr>
@@ -13465,41 +13455,41 @@
           <a:p>
             <a:pPr lvl="1"/>
             <a:r>
-              <a:rPr lang="en-US" sz="2600" b="1" dirty="0" smtClean="0">
+              <a:rPr lang="en-US" sz="2600" b="1" dirty="0">
                 <a:latin typeface="Arial" panose="020B0604020202020204" pitchFamily="34" charset="0"/>
                 <a:cs typeface="Arial" panose="020B0604020202020204" pitchFamily="34" charset="0"/>
               </a:rPr>
               <a:t>Normally referred as “</a:t>
             </a:r>
             <a:r>
-              <a:rPr lang="en-US" sz="2600" b="1" dirty="0" err="1" smtClean="0">
+              <a:rPr lang="en-US" sz="2600" b="1" dirty="0" err="1">
                 <a:latin typeface="Arial" panose="020B0604020202020204" pitchFamily="34" charset="0"/>
                 <a:cs typeface="Arial" panose="020B0604020202020204" pitchFamily="34" charset="0"/>
               </a:rPr>
               <a:t>nitya</a:t>
             </a:r>
             <a:r>
-              <a:rPr lang="en-US" sz="2600" b="1" dirty="0" smtClean="0">
+              <a:rPr lang="en-US" sz="2600" b="1" dirty="0">
                 <a:latin typeface="Arial" panose="020B0604020202020204" pitchFamily="34" charset="0"/>
                 <a:cs typeface="Arial" panose="020B0604020202020204" pitchFamily="34" charset="0"/>
               </a:rPr>
               <a:t>” </a:t>
             </a:r>
             <a:r>
-              <a:rPr lang="en-US" sz="2600" b="1" dirty="0" err="1" smtClean="0">
+              <a:rPr lang="en-US" sz="2600" b="1" dirty="0" err="1">
                 <a:latin typeface="Arial" panose="020B0604020202020204" pitchFamily="34" charset="0"/>
                 <a:cs typeface="Arial" panose="020B0604020202020204" pitchFamily="34" charset="0"/>
               </a:rPr>
               <a:t>swaram</a:t>
             </a:r>
-            <a:endParaRPr lang="en-US" sz="2600" b="1" dirty="0" smtClean="0">
+            <a:endParaRPr lang="en-US" sz="2600" b="1" dirty="0">
               <a:latin typeface="Arial" panose="020B0604020202020204" pitchFamily="34" charset="0"/>
               <a:cs typeface="Arial" panose="020B0604020202020204" pitchFamily="34" charset="0"/>
             </a:endParaRPr>
           </a:p>
           <a:p>
             <a:r>
-              <a:rPr lang="en-US" sz="2800" b="1" dirty="0" smtClean="0">
+              <a:rPr lang="en-US" sz="2800" b="1" dirty="0">
                 <a:latin typeface="Arial" panose="020B0604020202020204" pitchFamily="34" charset="0"/>
                 <a:cs typeface="Arial" panose="020B0604020202020204" pitchFamily="34" charset="0"/>
               </a:rPr>
@@ -13508,7 +13498,7 @@
           </a:p>
           <a:p>
             <a:r>
-              <a:rPr lang="en-US" sz="2800" b="1" dirty="0" smtClean="0">
+              <a:rPr lang="en-US" sz="2800" b="1" dirty="0">
                 <a:latin typeface="Arial" panose="020B0604020202020204" pitchFamily="34" charset="0"/>
                 <a:cs typeface="Arial" panose="020B0604020202020204" pitchFamily="34" charset="0"/>
               </a:rPr>
@@ -13517,16 +13507,12 @@
           </a:p>
           <a:p>
             <a:r>
-              <a:rPr lang="en-US" sz="2800" b="1" dirty="0" smtClean="0">
+              <a:rPr lang="en-US" sz="2800" b="1" dirty="0">
                 <a:latin typeface="Arial" panose="020B0604020202020204" pitchFamily="34" charset="0"/>
                 <a:cs typeface="Arial" panose="020B0604020202020204" pitchFamily="34" charset="0"/>
               </a:rPr>
               <a:t>Special Swaritams and formations will be handled in a later session</a:t>
             </a:r>
-            <a:endParaRPr lang="en-US" sz="2800" b="1" dirty="0">
-              <a:latin typeface="Arial" panose="020B0604020202020204" pitchFamily="34" charset="0"/>
-              <a:cs typeface="Arial" panose="020B0604020202020204" pitchFamily="34" charset="0"/>
-            </a:endParaRPr>
           </a:p>
         </p:txBody>
       </p:sp>
@@ -13540,13 +13526,6 @@
   <p:clrMapOvr>
     <a:masterClrMapping/>
   </p:clrMapOvr>
-  <p:timing>
-    <p:tnLst>
-      <p:par>
-        <p:cTn id="1" dur="indefinite" restart="never" nodeType="tmRoot"/>
-      </p:par>
-    </p:tnLst>
-  </p:timing>
 </p:sld>
 </file>
 
@@ -13588,10 +13567,9 @@
           <a:lstStyle/>
           <a:p>
             <a:r>
-              <a:rPr lang="en-US" dirty="0" smtClean="0"/>
+              <a:rPr lang="en-US" dirty="0"/>
               <a:t>Some key Swaram Rules</a:t>
             </a:r>
-            <a:endParaRPr lang="en-US" dirty="0"/>
           </a:p>
         </p:txBody>
       </p:sp>
@@ -13613,7 +13591,7 @@
           <a:lstStyle/>
           <a:p>
             <a:r>
-              <a:rPr lang="en-US" sz="2800" b="1" dirty="0" smtClean="0">
+              <a:rPr lang="en-US" sz="2800" b="1" dirty="0">
                 <a:latin typeface="Arial" panose="020B0604020202020204" pitchFamily="34" charset="0"/>
                 <a:cs typeface="Arial" panose="020B0604020202020204" pitchFamily="34" charset="0"/>
               </a:rPr>
@@ -13623,7 +13601,7 @@
           <a:p>
             <a:pPr lvl="1"/>
             <a:r>
-              <a:rPr lang="en-US" sz="2600" b="1" dirty="0" err="1" smtClean="0">
+              <a:rPr lang="en-US" sz="2600" b="1" dirty="0" err="1">
                 <a:solidFill>
                   <a:srgbClr val="FF0000"/>
                 </a:solidFill>
@@ -13633,21 +13611,21 @@
               <a:t>Try</a:t>
             </a:r>
             <a:r>
-              <a:rPr lang="en-US" sz="2600" b="1" dirty="0" err="1" smtClean="0">
+              <a:rPr lang="en-US" sz="2600" b="1" dirty="0" err="1">
                 <a:latin typeface="Arial" panose="020B0604020202020204" pitchFamily="34" charset="0"/>
                 <a:cs typeface="Arial" panose="020B0604020202020204" pitchFamily="34" charset="0"/>
               </a:rPr>
               <a:t>mbakam</a:t>
             </a:r>
             <a:r>
-              <a:rPr lang="en-US" sz="2600" b="1" dirty="0" smtClean="0">
+              <a:rPr lang="en-US" sz="2600" b="1" dirty="0">
                 <a:latin typeface="Arial" panose="020B0604020202020204" pitchFamily="34" charset="0"/>
                 <a:cs typeface="Arial" panose="020B0604020202020204" pitchFamily="34" charset="0"/>
               </a:rPr>
               <a:t>, </a:t>
             </a:r>
             <a:r>
-              <a:rPr lang="en-US" sz="2600" b="1" dirty="0" err="1" smtClean="0">
+              <a:rPr lang="en-US" sz="2600" b="1" dirty="0" err="1">
                 <a:solidFill>
                   <a:srgbClr val="FF0000"/>
                 </a:solidFill>
@@ -13657,21 +13635,21 @@
               <a:t>svi</a:t>
             </a:r>
             <a:r>
-              <a:rPr lang="en-US" sz="2600" b="1" dirty="0" err="1" smtClean="0">
+              <a:rPr lang="en-US" sz="2600" b="1" dirty="0" err="1">
                 <a:latin typeface="Arial" panose="020B0604020202020204" pitchFamily="34" charset="0"/>
                 <a:cs typeface="Arial" panose="020B0604020202020204" pitchFamily="34" charset="0"/>
               </a:rPr>
               <a:t>Shtam</a:t>
             </a:r>
             <a:r>
-              <a:rPr lang="en-US" sz="2600" b="1" dirty="0" smtClean="0">
+              <a:rPr lang="en-US" sz="2600" b="1" dirty="0">
                 <a:latin typeface="Arial" panose="020B0604020202020204" pitchFamily="34" charset="0"/>
                 <a:cs typeface="Arial" panose="020B0604020202020204" pitchFamily="34" charset="0"/>
               </a:rPr>
               <a:t>, </a:t>
             </a:r>
             <a:r>
-              <a:rPr lang="en-US" sz="2600" b="1" dirty="0" err="1" smtClean="0">
+              <a:rPr lang="en-US" sz="2600" b="1" dirty="0" err="1">
                 <a:solidFill>
                   <a:srgbClr val="FF0000"/>
                 </a:solidFill>
@@ -13681,21 +13659,21 @@
               <a:t>nya</a:t>
             </a:r>
             <a:r>
-              <a:rPr lang="en-US" sz="2600" b="1" dirty="0" err="1" smtClean="0">
+              <a:rPr lang="en-US" sz="2600" b="1" dirty="0" err="1">
                 <a:latin typeface="Arial" panose="020B0604020202020204" pitchFamily="34" charset="0"/>
                 <a:cs typeface="Arial" panose="020B0604020202020204" pitchFamily="34" charset="0"/>
               </a:rPr>
               <a:t>ktam</a:t>
             </a:r>
             <a:r>
-              <a:rPr lang="en-US" sz="2600" b="1" dirty="0" smtClean="0">
+              <a:rPr lang="en-US" sz="2600" b="1" dirty="0">
                 <a:latin typeface="Arial" panose="020B0604020202020204" pitchFamily="34" charset="0"/>
                 <a:cs typeface="Arial" panose="020B0604020202020204" pitchFamily="34" charset="0"/>
               </a:rPr>
               <a:t>, </a:t>
             </a:r>
             <a:r>
-              <a:rPr lang="en-US" sz="2600" b="1" dirty="0" err="1" smtClean="0">
+              <a:rPr lang="en-US" sz="2600" b="1" dirty="0" err="1">
                 <a:solidFill>
                   <a:srgbClr val="FF0000"/>
                 </a:solidFill>
@@ -13705,13 +13683,13 @@
               <a:t>vyup</a:t>
             </a:r>
             <a:r>
-              <a:rPr lang="en-US" sz="2600" b="1" dirty="0" err="1" smtClean="0">
+              <a:rPr lang="en-US" sz="2600" b="1" dirty="0" err="1">
                 <a:latin typeface="Arial" panose="020B0604020202020204" pitchFamily="34" charset="0"/>
                 <a:cs typeface="Arial" panose="020B0604020202020204" pitchFamily="34" charset="0"/>
               </a:rPr>
               <a:t>takeSaya</a:t>
             </a:r>
-            <a:endParaRPr lang="en-US" sz="2600" b="1" dirty="0" smtClean="0">
+            <a:endParaRPr lang="en-US" sz="2600" b="1" dirty="0">
               <a:latin typeface="Arial" panose="020B0604020202020204" pitchFamily="34" charset="0"/>
               <a:cs typeface="Arial" panose="020B0604020202020204" pitchFamily="34" charset="0"/>
             </a:endParaRPr>
@@ -13719,20 +13697,20 @@
           <a:p>
             <a:pPr lvl="2"/>
             <a:r>
-              <a:rPr lang="en-US" sz="2400" b="1" dirty="0" smtClean="0">
+              <a:rPr lang="en-US" sz="2400" b="1" dirty="0">
                 <a:latin typeface="Arial" panose="020B0604020202020204" pitchFamily="34" charset="0"/>
                 <a:cs typeface="Arial" panose="020B0604020202020204" pitchFamily="34" charset="0"/>
               </a:rPr>
               <a:t>Referred as </a:t>
             </a:r>
             <a:r>
-              <a:rPr lang="en-US" sz="2400" b="1" dirty="0" err="1" smtClean="0">
+              <a:rPr lang="en-US" sz="2400" b="1" dirty="0" err="1">
                 <a:latin typeface="Arial" panose="020B0604020202020204" pitchFamily="34" charset="0"/>
                 <a:cs typeface="Arial" panose="020B0604020202020204" pitchFamily="34" charset="0"/>
               </a:rPr>
               <a:t>nitya</a:t>
             </a:r>
-            <a:endParaRPr lang="en-US" sz="2400" b="1" dirty="0" smtClean="0">
+            <a:endParaRPr lang="en-US" sz="2400" b="1" dirty="0">
               <a:latin typeface="Arial" panose="020B0604020202020204" pitchFamily="34" charset="0"/>
               <a:cs typeface="Arial" panose="020B0604020202020204" pitchFamily="34" charset="0"/>
             </a:endParaRPr>
@@ -13740,90 +13718,90 @@
           <a:p>
             <a:pPr lvl="1"/>
             <a:r>
-              <a:rPr lang="en-US" sz="2600" b="1" dirty="0" err="1" smtClean="0">
+              <a:rPr lang="en-US" sz="2600" b="1" dirty="0" err="1">
                 <a:latin typeface="Arial" panose="020B0604020202020204" pitchFamily="34" charset="0"/>
                 <a:cs typeface="Arial" panose="020B0604020202020204" pitchFamily="34" charset="0"/>
               </a:rPr>
               <a:t>Yo</a:t>
             </a:r>
             <a:r>
-              <a:rPr lang="en-US" sz="2600" b="1" dirty="0" smtClean="0">
+              <a:rPr lang="en-US" sz="2600" b="1" dirty="0">
                 <a:latin typeface="Arial" panose="020B0604020202020204" pitchFamily="34" charset="0"/>
                 <a:cs typeface="Arial" panose="020B0604020202020204" pitchFamily="34" charset="0"/>
               </a:rPr>
               <a:t>&amp;*</a:t>
             </a:r>
             <a:r>
-              <a:rPr lang="en-US" sz="2600" b="1" dirty="0" err="1" smtClean="0">
+              <a:rPr lang="en-US" sz="2600" b="1" dirty="0" err="1">
                 <a:latin typeface="Arial" panose="020B0604020202020204" pitchFamily="34" charset="0"/>
                 <a:cs typeface="Arial" panose="020B0604020202020204" pitchFamily="34" charset="0"/>
               </a:rPr>
               <a:t>sman</a:t>
             </a:r>
             <a:r>
-              <a:rPr lang="en-US" sz="2600" b="1" dirty="0" smtClean="0">
+              <a:rPr lang="en-US" sz="2600" b="1" dirty="0">
                 <a:latin typeface="Arial" panose="020B0604020202020204" pitchFamily="34" charset="0"/>
                 <a:cs typeface="Arial" panose="020B0604020202020204" pitchFamily="34" charset="0"/>
               </a:rPr>
               <a:t> </a:t>
             </a:r>
             <a:r>
-              <a:rPr lang="en-US" sz="2600" b="1" dirty="0" err="1" smtClean="0">
+              <a:rPr lang="en-US" sz="2600" b="1" dirty="0" err="1">
                 <a:latin typeface="Arial" panose="020B0604020202020204" pitchFamily="34" charset="0"/>
                 <a:cs typeface="Arial" panose="020B0604020202020204" pitchFamily="34" charset="0"/>
               </a:rPr>
               <a:t>dveShti</a:t>
             </a:r>
             <a:r>
-              <a:rPr lang="en-US" sz="2600" b="1" dirty="0" smtClean="0">
+              <a:rPr lang="en-US" sz="2600" b="1" dirty="0">
                 <a:latin typeface="Arial" panose="020B0604020202020204" pitchFamily="34" charset="0"/>
                 <a:cs typeface="Arial" panose="020B0604020202020204" pitchFamily="34" charset="0"/>
               </a:rPr>
               <a:t>, </a:t>
             </a:r>
             <a:r>
-              <a:rPr lang="en-US" sz="2600" b="1" dirty="0" err="1" smtClean="0">
+              <a:rPr lang="en-US" sz="2600" b="1" dirty="0" err="1">
                 <a:latin typeface="Arial" panose="020B0604020202020204" pitchFamily="34" charset="0"/>
                 <a:cs typeface="Arial" panose="020B0604020202020204" pitchFamily="34" charset="0"/>
               </a:rPr>
               <a:t>yo</a:t>
             </a:r>
             <a:r>
-              <a:rPr lang="en-US" sz="2600" b="1" dirty="0" smtClean="0">
+              <a:rPr lang="en-US" sz="2600" b="1" dirty="0">
                 <a:latin typeface="Arial" panose="020B0604020202020204" pitchFamily="34" charset="0"/>
                 <a:cs typeface="Arial" panose="020B0604020202020204" pitchFamily="34" charset="0"/>
               </a:rPr>
               <a:t>&amp;*</a:t>
             </a:r>
             <a:r>
-              <a:rPr lang="en-US" sz="2600" b="1" dirty="0" err="1" smtClean="0">
+              <a:rPr lang="en-US" sz="2600" b="1" dirty="0" err="1">
                 <a:latin typeface="Arial" panose="020B0604020202020204" pitchFamily="34" charset="0"/>
                 <a:cs typeface="Arial" panose="020B0604020202020204" pitchFamily="34" charset="0"/>
               </a:rPr>
               <a:t>apam</a:t>
             </a:r>
             <a:r>
-              <a:rPr lang="en-US" sz="2600" b="1" dirty="0" smtClean="0">
+              <a:rPr lang="en-US" sz="2600" b="1" dirty="0">
                 <a:latin typeface="Arial" panose="020B0604020202020204" pitchFamily="34" charset="0"/>
                 <a:cs typeface="Arial" panose="020B0604020202020204" pitchFamily="34" charset="0"/>
               </a:rPr>
               <a:t> with </a:t>
             </a:r>
             <a:r>
-              <a:rPr lang="en-US" sz="2600" b="1" dirty="0" err="1" smtClean="0">
+              <a:rPr lang="en-US" sz="2600" b="1" dirty="0" err="1">
                 <a:latin typeface="Arial" panose="020B0604020202020204" pitchFamily="34" charset="0"/>
                 <a:cs typeface="Arial" panose="020B0604020202020204" pitchFamily="34" charset="0"/>
               </a:rPr>
               <a:t>avagraha</a:t>
             </a:r>
-            <a:endParaRPr lang="en-US" sz="2600" b="1" dirty="0" smtClean="0">
+            <a:endParaRPr lang="en-US" sz="2600" b="1" dirty="0">
               <a:latin typeface="Arial" panose="020B0604020202020204" pitchFamily="34" charset="0"/>
               <a:cs typeface="Arial" panose="020B0604020202020204" pitchFamily="34" charset="0"/>
             </a:endParaRPr>
           </a:p>
           <a:p>
             <a:r>
-              <a:rPr lang="en-US" sz="2800" b="1" dirty="0" smtClean="0">
+              <a:rPr lang="en-US" sz="2800" b="1" dirty="0">
                 <a:latin typeface="Arial" panose="020B0604020202020204" pitchFamily="34" charset="0"/>
                 <a:cs typeface="Arial" panose="020B0604020202020204" pitchFamily="34" charset="0"/>
               </a:rPr>
@@ -13851,13 +13829,6 @@
   <p:clrMapOvr>
     <a:masterClrMapping/>
   </p:clrMapOvr>
-  <p:timing>
-    <p:tnLst>
-      <p:par>
-        <p:cTn id="1" dur="indefinite" restart="never" nodeType="tmRoot"/>
-      </p:par>
-    </p:tnLst>
-  </p:timing>
 </p:sld>
 </file>
 
@@ -13899,10 +13870,9 @@
           <a:lstStyle/>
           <a:p>
             <a:r>
-              <a:rPr lang="en-US" dirty="0" smtClean="0"/>
+              <a:rPr lang="en-US" dirty="0"/>
               <a:t>Some key Swaram Rules</a:t>
             </a:r>
-            <a:endParaRPr lang="en-US" dirty="0"/>
           </a:p>
         </p:txBody>
       </p:sp>
@@ -13924,7 +13894,7 @@
           <a:lstStyle/>
           <a:p>
             <a:r>
-              <a:rPr lang="en-US" sz="2800" b="1" dirty="0" smtClean="0">
+              <a:rPr lang="en-US" sz="2800" b="1" dirty="0">
                 <a:latin typeface="Arial" panose="020B0604020202020204" pitchFamily="34" charset="0"/>
                 <a:cs typeface="Arial" panose="020B0604020202020204" pitchFamily="34" charset="0"/>
               </a:rPr>
@@ -13934,207 +13904,203 @@
           <a:p>
             <a:pPr lvl="1"/>
             <a:r>
-              <a:rPr lang="en-US" sz="2600" b="1" dirty="0" err="1" smtClean="0">
+              <a:rPr lang="en-US" sz="2600" b="1" dirty="0" err="1">
                 <a:latin typeface="Arial" panose="020B0604020202020204" pitchFamily="34" charset="0"/>
                 <a:cs typeface="Arial" panose="020B0604020202020204" pitchFamily="34" charset="0"/>
               </a:rPr>
               <a:t>bAhvorindra</a:t>
             </a:r>
             <a:r>
-              <a:rPr lang="en-US" sz="2600" b="1" dirty="0" smtClean="0">
+              <a:rPr lang="en-US" sz="2600" b="1" dirty="0">
                 <a:latin typeface="Arial" panose="020B0604020202020204" pitchFamily="34" charset="0"/>
                 <a:cs typeface="Arial" panose="020B0604020202020204" pitchFamily="34" charset="0"/>
               </a:rPr>
               <a:t> </a:t>
             </a:r>
             <a:r>
-              <a:rPr lang="en-US" sz="2600" b="1" dirty="0" err="1" smtClean="0">
+              <a:rPr lang="en-US" sz="2600" b="1" dirty="0" err="1">
                 <a:latin typeface="Arial" panose="020B0604020202020204" pitchFamily="34" charset="0"/>
                 <a:cs typeface="Arial" panose="020B0604020202020204" pitchFamily="34" charset="0"/>
               </a:rPr>
               <a:t>tiShThatu</a:t>
             </a:r>
             <a:r>
-              <a:rPr lang="en-US" sz="2600" b="1" dirty="0" smtClean="0">
+              <a:rPr lang="en-US" sz="2600" b="1" dirty="0">
                 <a:latin typeface="Arial" panose="020B0604020202020204" pitchFamily="34" charset="0"/>
                 <a:cs typeface="Arial" panose="020B0604020202020204" pitchFamily="34" charset="0"/>
               </a:rPr>
               <a:t>, </a:t>
             </a:r>
             <a:r>
-              <a:rPr lang="en-US" sz="2600" b="1" dirty="0" err="1" smtClean="0">
+              <a:rPr lang="en-US" sz="2600" b="1" dirty="0" err="1">
                 <a:latin typeface="Arial" panose="020B0604020202020204" pitchFamily="34" charset="0"/>
                 <a:cs typeface="Arial" panose="020B0604020202020204" pitchFamily="34" charset="0"/>
               </a:rPr>
               <a:t>dhenur</a:t>
             </a:r>
             <a:r>
-              <a:rPr lang="en-US" sz="2600" b="1" dirty="0" smtClean="0">
+              <a:rPr lang="en-US" sz="2600" b="1" dirty="0">
                 <a:latin typeface="Arial" panose="020B0604020202020204" pitchFamily="34" charset="0"/>
                 <a:cs typeface="Arial" panose="020B0604020202020204" pitchFamily="34" charset="0"/>
               </a:rPr>
               <a:t> </a:t>
             </a:r>
             <a:r>
-              <a:rPr lang="en-US" sz="2600" b="1" dirty="0" err="1" smtClean="0">
+              <a:rPr lang="en-US" sz="2600" b="1" dirty="0" err="1">
                 <a:latin typeface="Arial" panose="020B0604020202020204" pitchFamily="34" charset="0"/>
                 <a:cs typeface="Arial" panose="020B0604020202020204" pitchFamily="34" charset="0"/>
               </a:rPr>
               <a:t>dakshiNa</a:t>
-            </a:r>
-            <a:endParaRPr lang="en-US" sz="2600" b="1" dirty="0" smtClean="0">
-              <a:latin typeface="Arial" panose="020B0604020202020204" pitchFamily="34" charset="0"/>
-              <a:cs typeface="Arial" panose="020B0604020202020204" pitchFamily="34" charset="0"/>
-            </a:endParaRPr>
-          </a:p>
-          <a:p>
-            <a:r>
-              <a:rPr lang="en-US" sz="2800" b="1" dirty="0" smtClean="0">
-                <a:latin typeface="Arial" panose="020B0604020202020204" pitchFamily="34" charset="0"/>
-                <a:cs typeface="Arial" panose="020B0604020202020204" pitchFamily="34" charset="0"/>
-              </a:rPr>
-              <a:t>Special Padams with udAttam as first letter and anudAttam as second</a:t>
-            </a:r>
-          </a:p>
-          <a:p>
-            <a:pPr lvl="1"/>
-            <a:r>
-              <a:rPr lang="en-US" sz="2600" b="1" dirty="0" err="1" smtClean="0">
-                <a:latin typeface="Arial" panose="020B0604020202020204" pitchFamily="34" charset="0"/>
-                <a:cs typeface="Arial" panose="020B0604020202020204" pitchFamily="34" charset="0"/>
-              </a:rPr>
-              <a:t>Vanaspate</a:t>
-            </a:r>
-            <a:r>
-              <a:rPr lang="en-US" sz="2600" b="1" dirty="0" smtClean="0">
-                <a:latin typeface="Arial" panose="020B0604020202020204" pitchFamily="34" charset="0"/>
-                <a:cs typeface="Arial" panose="020B0604020202020204" pitchFamily="34" charset="0"/>
-              </a:rPr>
-              <a:t>, </a:t>
-            </a:r>
-            <a:r>
-              <a:rPr lang="en-US" sz="2600" b="1" dirty="0" err="1" smtClean="0">
-                <a:latin typeface="Arial" panose="020B0604020202020204" pitchFamily="34" charset="0"/>
-                <a:cs typeface="Arial" panose="020B0604020202020204" pitchFamily="34" charset="0"/>
-              </a:rPr>
-              <a:t>bRuhaspate</a:t>
-            </a:r>
-            <a:endParaRPr lang="en-US" sz="2600" b="1" dirty="0" smtClean="0">
-              <a:latin typeface="Arial" panose="020B0604020202020204" pitchFamily="34" charset="0"/>
-              <a:cs typeface="Arial" panose="020B0604020202020204" pitchFamily="34" charset="0"/>
-            </a:endParaRPr>
-          </a:p>
-          <a:p>
-            <a:r>
-              <a:rPr lang="en-US" sz="2800" b="1" dirty="0" smtClean="0">
-                <a:latin typeface="Arial" panose="020B0604020202020204" pitchFamily="34" charset="0"/>
-                <a:cs typeface="Arial" panose="020B0604020202020204" pitchFamily="34" charset="0"/>
-              </a:rPr>
-              <a:t>The last letter of a vAkyam cannot be anudAttam</a:t>
-            </a:r>
-          </a:p>
-          <a:p>
-            <a:r>
-              <a:rPr lang="en-US" sz="2800" b="1" dirty="0" smtClean="0">
-                <a:latin typeface="Arial" panose="020B0604020202020204" pitchFamily="34" charset="0"/>
-                <a:cs typeface="Arial" panose="020B0604020202020204" pitchFamily="34" charset="0"/>
-              </a:rPr>
-              <a:t>Padam can have all letters as anudAttam</a:t>
-            </a:r>
-          </a:p>
-          <a:p>
-            <a:pPr lvl="1"/>
-            <a:r>
-              <a:rPr lang="en-US" sz="2600" b="1" dirty="0" smtClean="0">
-                <a:latin typeface="Arial" panose="020B0604020202020204" pitchFamily="34" charset="0"/>
-                <a:cs typeface="Arial" panose="020B0604020202020204" pitchFamily="34" charset="0"/>
-              </a:rPr>
-              <a:t>Rendered as pracaya in </a:t>
-            </a:r>
-            <a:r>
-              <a:rPr lang="en-US" sz="2600" b="1" dirty="0" err="1" smtClean="0">
-                <a:latin typeface="Arial" panose="020B0604020202020204" pitchFamily="34" charset="0"/>
-                <a:cs typeface="Arial" panose="020B0604020202020204" pitchFamily="34" charset="0"/>
-              </a:rPr>
-              <a:t>Krama</a:t>
-            </a:r>
-            <a:r>
-              <a:rPr lang="en-US" sz="2600" b="1" dirty="0" smtClean="0">
-                <a:latin typeface="Arial" panose="020B0604020202020204" pitchFamily="34" charset="0"/>
-                <a:cs typeface="Arial" panose="020B0604020202020204" pitchFamily="34" charset="0"/>
-              </a:rPr>
-              <a:t>, </a:t>
-            </a:r>
-            <a:r>
-              <a:rPr lang="en-US" sz="2600" b="1" dirty="0" err="1" smtClean="0">
-                <a:latin typeface="Arial" panose="020B0604020202020204" pitchFamily="34" charset="0"/>
-                <a:cs typeface="Arial" panose="020B0604020202020204" pitchFamily="34" charset="0"/>
-              </a:rPr>
-              <a:t>Jata</a:t>
-            </a:r>
-            <a:r>
-              <a:rPr lang="en-US" sz="2600" b="1" dirty="0" smtClean="0">
-                <a:latin typeface="Arial" panose="020B0604020202020204" pitchFamily="34" charset="0"/>
-                <a:cs typeface="Arial" panose="020B0604020202020204" pitchFamily="34" charset="0"/>
-              </a:rPr>
-              <a:t> and Ghana </a:t>
-            </a:r>
-            <a:r>
-              <a:rPr lang="en-US" sz="2600" b="1" dirty="0" err="1" smtClean="0">
-                <a:latin typeface="Arial" panose="020B0604020202020204" pitchFamily="34" charset="0"/>
-                <a:cs typeface="Arial" panose="020B0604020202020204" pitchFamily="34" charset="0"/>
-              </a:rPr>
-              <a:t>vAkyams</a:t>
-            </a:r>
-            <a:r>
-              <a:rPr lang="en-US" sz="2600" b="1" dirty="0" smtClean="0">
-                <a:latin typeface="Arial" panose="020B0604020202020204" pitchFamily="34" charset="0"/>
-                <a:cs typeface="Arial" panose="020B0604020202020204" pitchFamily="34" charset="0"/>
-              </a:rPr>
-              <a:t>.</a:t>
-            </a:r>
-          </a:p>
-          <a:p>
-            <a:pPr lvl="1"/>
-            <a:r>
-              <a:rPr lang="en-US" sz="2600" b="1" dirty="0" smtClean="0">
-                <a:latin typeface="Arial" panose="020B0604020202020204" pitchFamily="34" charset="0"/>
-                <a:cs typeface="Arial" panose="020B0604020202020204" pitchFamily="34" charset="0"/>
-              </a:rPr>
-              <a:t>More coverage in </a:t>
-            </a:r>
-            <a:r>
-              <a:rPr lang="en-US" sz="2600" b="1" dirty="0" err="1" smtClean="0">
-                <a:latin typeface="Arial" panose="020B0604020202020204" pitchFamily="34" charset="0"/>
-                <a:cs typeface="Arial" panose="020B0604020202020204" pitchFamily="34" charset="0"/>
-              </a:rPr>
-              <a:t>Pada</a:t>
-            </a:r>
-            <a:r>
-              <a:rPr lang="en-US" sz="2600" b="1" dirty="0" smtClean="0">
-                <a:latin typeface="Arial" panose="020B0604020202020204" pitchFamily="34" charset="0"/>
-                <a:cs typeface="Arial" panose="020B0604020202020204" pitchFamily="34" charset="0"/>
-              </a:rPr>
-              <a:t> </a:t>
-            </a:r>
-            <a:r>
-              <a:rPr lang="en-US" sz="2600" b="1" dirty="0" err="1" smtClean="0">
-                <a:latin typeface="Arial" panose="020B0604020202020204" pitchFamily="34" charset="0"/>
-                <a:cs typeface="Arial" panose="020B0604020202020204" pitchFamily="34" charset="0"/>
-              </a:rPr>
-              <a:t>Paatam</a:t>
-            </a:r>
-            <a:r>
-              <a:rPr lang="en-US" sz="2600" b="1" dirty="0" smtClean="0">
-                <a:latin typeface="Arial" panose="020B0604020202020204" pitchFamily="34" charset="0"/>
-                <a:cs typeface="Arial" panose="020B0604020202020204" pitchFamily="34" charset="0"/>
-              </a:rPr>
-              <a:t> later.</a:t>
             </a:r>
             <a:endParaRPr lang="en-US" sz="2600" b="1" dirty="0">
               <a:latin typeface="Arial" panose="020B0604020202020204" pitchFamily="34" charset="0"/>
               <a:cs typeface="Arial" panose="020B0604020202020204" pitchFamily="34" charset="0"/>
             </a:endParaRPr>
+          </a:p>
+          <a:p>
+            <a:r>
+              <a:rPr lang="en-US" sz="2800" b="1" dirty="0">
+                <a:latin typeface="Arial" panose="020B0604020202020204" pitchFamily="34" charset="0"/>
+                <a:cs typeface="Arial" panose="020B0604020202020204" pitchFamily="34" charset="0"/>
+              </a:rPr>
+              <a:t>Special Padams with udAttam as first letter and anudAttam as second</a:t>
+            </a:r>
+          </a:p>
+          <a:p>
+            <a:pPr lvl="1"/>
+            <a:r>
+              <a:rPr lang="en-US" sz="2600" b="1" dirty="0" err="1">
+                <a:latin typeface="Arial" panose="020B0604020202020204" pitchFamily="34" charset="0"/>
+                <a:cs typeface="Arial" panose="020B0604020202020204" pitchFamily="34" charset="0"/>
+              </a:rPr>
+              <a:t>Vanaspate</a:t>
+            </a:r>
+            <a:r>
+              <a:rPr lang="en-US" sz="2600" b="1" dirty="0">
+                <a:latin typeface="Arial" panose="020B0604020202020204" pitchFamily="34" charset="0"/>
+                <a:cs typeface="Arial" panose="020B0604020202020204" pitchFamily="34" charset="0"/>
+              </a:rPr>
+              <a:t>, </a:t>
+            </a:r>
+            <a:r>
+              <a:rPr lang="en-US" sz="2600" b="1" dirty="0" err="1">
+                <a:latin typeface="Arial" panose="020B0604020202020204" pitchFamily="34" charset="0"/>
+                <a:cs typeface="Arial" panose="020B0604020202020204" pitchFamily="34" charset="0"/>
+              </a:rPr>
+              <a:t>bRuhaspate</a:t>
+            </a:r>
+            <a:endParaRPr lang="en-US" sz="2600" b="1" dirty="0">
+              <a:latin typeface="Arial" panose="020B0604020202020204" pitchFamily="34" charset="0"/>
+              <a:cs typeface="Arial" panose="020B0604020202020204" pitchFamily="34" charset="0"/>
+            </a:endParaRPr>
+          </a:p>
+          <a:p>
+            <a:r>
+              <a:rPr lang="en-US" sz="2800" b="1" dirty="0">
+                <a:latin typeface="Arial" panose="020B0604020202020204" pitchFamily="34" charset="0"/>
+                <a:cs typeface="Arial" panose="020B0604020202020204" pitchFamily="34" charset="0"/>
+              </a:rPr>
+              <a:t>The last letter of a vAkyam cannot be anudAttam</a:t>
+            </a:r>
+          </a:p>
+          <a:p>
+            <a:r>
+              <a:rPr lang="en-US" sz="2800" b="1" dirty="0">
+                <a:latin typeface="Arial" panose="020B0604020202020204" pitchFamily="34" charset="0"/>
+                <a:cs typeface="Arial" panose="020B0604020202020204" pitchFamily="34" charset="0"/>
+              </a:rPr>
+              <a:t>Padam can have all letters as anudAttam</a:t>
+            </a:r>
+          </a:p>
+          <a:p>
+            <a:pPr lvl="1"/>
+            <a:r>
+              <a:rPr lang="en-US" sz="2600" b="1" dirty="0">
+                <a:latin typeface="Arial" panose="020B0604020202020204" pitchFamily="34" charset="0"/>
+                <a:cs typeface="Arial" panose="020B0604020202020204" pitchFamily="34" charset="0"/>
+              </a:rPr>
+              <a:t>Rendered as pracaya in </a:t>
+            </a:r>
+            <a:r>
+              <a:rPr lang="en-US" sz="2600" b="1" dirty="0" err="1">
+                <a:latin typeface="Arial" panose="020B0604020202020204" pitchFamily="34" charset="0"/>
+                <a:cs typeface="Arial" panose="020B0604020202020204" pitchFamily="34" charset="0"/>
+              </a:rPr>
+              <a:t>Krama</a:t>
+            </a:r>
+            <a:r>
+              <a:rPr lang="en-US" sz="2600" b="1" dirty="0">
+                <a:latin typeface="Arial" panose="020B0604020202020204" pitchFamily="34" charset="0"/>
+                <a:cs typeface="Arial" panose="020B0604020202020204" pitchFamily="34" charset="0"/>
+              </a:rPr>
+              <a:t>, </a:t>
+            </a:r>
+            <a:r>
+              <a:rPr lang="en-US" sz="2600" b="1" dirty="0" err="1">
+                <a:latin typeface="Arial" panose="020B0604020202020204" pitchFamily="34" charset="0"/>
+                <a:cs typeface="Arial" panose="020B0604020202020204" pitchFamily="34" charset="0"/>
+              </a:rPr>
+              <a:t>Jata</a:t>
+            </a:r>
+            <a:r>
+              <a:rPr lang="en-US" sz="2600" b="1" dirty="0">
+                <a:latin typeface="Arial" panose="020B0604020202020204" pitchFamily="34" charset="0"/>
+                <a:cs typeface="Arial" panose="020B0604020202020204" pitchFamily="34" charset="0"/>
+              </a:rPr>
+              <a:t> and Ghana </a:t>
+            </a:r>
+            <a:r>
+              <a:rPr lang="en-US" sz="2600" b="1" dirty="0" err="1">
+                <a:latin typeface="Arial" panose="020B0604020202020204" pitchFamily="34" charset="0"/>
+                <a:cs typeface="Arial" panose="020B0604020202020204" pitchFamily="34" charset="0"/>
+              </a:rPr>
+              <a:t>vAkyams</a:t>
+            </a:r>
+            <a:r>
+              <a:rPr lang="en-US" sz="2600" b="1" dirty="0">
+                <a:latin typeface="Arial" panose="020B0604020202020204" pitchFamily="34" charset="0"/>
+                <a:cs typeface="Arial" panose="020B0604020202020204" pitchFamily="34" charset="0"/>
+              </a:rPr>
+              <a:t>.</a:t>
+            </a:r>
+          </a:p>
+          <a:p>
+            <a:pPr lvl="1"/>
+            <a:r>
+              <a:rPr lang="en-US" sz="2600" b="1" dirty="0">
+                <a:latin typeface="Arial" panose="020B0604020202020204" pitchFamily="34" charset="0"/>
+                <a:cs typeface="Arial" panose="020B0604020202020204" pitchFamily="34" charset="0"/>
+              </a:rPr>
+              <a:t>More coverage in </a:t>
+            </a:r>
+            <a:r>
+              <a:rPr lang="en-US" sz="2600" b="1" dirty="0" err="1">
+                <a:latin typeface="Arial" panose="020B0604020202020204" pitchFamily="34" charset="0"/>
+                <a:cs typeface="Arial" panose="020B0604020202020204" pitchFamily="34" charset="0"/>
+              </a:rPr>
+              <a:t>Pada</a:t>
+            </a:r>
+            <a:r>
+              <a:rPr lang="en-US" sz="2600" b="1" dirty="0">
+                <a:latin typeface="Arial" panose="020B0604020202020204" pitchFamily="34" charset="0"/>
+                <a:cs typeface="Arial" panose="020B0604020202020204" pitchFamily="34" charset="0"/>
+              </a:rPr>
+              <a:t> </a:t>
+            </a:r>
+            <a:r>
+              <a:rPr lang="en-US" sz="2600" b="1" dirty="0" err="1">
+                <a:latin typeface="Arial" panose="020B0604020202020204" pitchFamily="34" charset="0"/>
+                <a:cs typeface="Arial" panose="020B0604020202020204" pitchFamily="34" charset="0"/>
+              </a:rPr>
+              <a:t>Paatam</a:t>
+            </a:r>
+            <a:r>
+              <a:rPr lang="en-US" sz="2600" b="1" dirty="0">
+                <a:latin typeface="Arial" panose="020B0604020202020204" pitchFamily="34" charset="0"/>
+                <a:cs typeface="Arial" panose="020B0604020202020204" pitchFamily="34" charset="0"/>
+              </a:rPr>
+              <a:t> later.</a:t>
+            </a:r>
           </a:p>
         </p:txBody>
       </p:sp>
@@ -14148,13 +14114,6 @@
   <p:clrMapOvr>
     <a:masterClrMapping/>
   </p:clrMapOvr>
-  <p:timing>
-    <p:tnLst>
-      <p:par>
-        <p:cTn id="1" dur="indefinite" restart="never" nodeType="tmRoot"/>
-      </p:par>
-    </p:tnLst>
-  </p:timing>
 </p:sld>
 </file>
 
@@ -14191,10 +14150,9 @@
           <a:lstStyle/>
           <a:p>
             <a:r>
-              <a:rPr lang="en-US" dirty="0" smtClean="0"/>
+              <a:rPr lang="en-US" dirty="0"/>
               <a:t>Vikrama Concept</a:t>
             </a:r>
-            <a:endParaRPr lang="en-US" dirty="0"/>
           </a:p>
         </p:txBody>
       </p:sp>
@@ -14220,34 +14178,20 @@
                 <a:latin typeface="Arial" panose="020B0604020202020204" pitchFamily="34" charset="0"/>
                 <a:cs typeface="Arial" panose="020B0604020202020204" pitchFamily="34" charset="0"/>
               </a:rPr>
-              <a:t>PS 19-1 says – “ Where a syllable of low tone (anudAttam) occurs  between two </a:t>
-            </a:r>
-            <a:r>
-              <a:rPr lang="en-US" sz="2800" b="1" dirty="0" smtClean="0">
-                <a:latin typeface="Arial" panose="020B0604020202020204" pitchFamily="34" charset="0"/>
-                <a:cs typeface="Arial" panose="020B0604020202020204" pitchFamily="34" charset="0"/>
-              </a:rPr>
-              <a:t>circumflex</a:t>
+              <a:t>PS 19-1 says – “ Where a syllable of low tone (anudAttam) occurs  between two circumflex</a:t>
             </a:r>
             <a:br>
-              <a:rPr lang="en-US" sz="2800" b="1" dirty="0" smtClean="0">
+              <a:rPr lang="en-US" sz="2800" b="1" dirty="0">
                 <a:latin typeface="Arial" panose="020B0604020202020204" pitchFamily="34" charset="0"/>
                 <a:cs typeface="Arial" panose="020B0604020202020204" pitchFamily="34" charset="0"/>
               </a:rPr>
             </a:br>
             <a:r>
-              <a:rPr lang="en-US" sz="2800" b="1" dirty="0" smtClean="0">
-                <a:latin typeface="Arial" panose="020B0604020202020204" pitchFamily="34" charset="0"/>
-                <a:cs typeface="Arial" panose="020B0604020202020204" pitchFamily="34" charset="0"/>
-              </a:rPr>
-              <a:t>(</a:t>
-            </a:r>
-            <a:r>
               <a:rPr lang="en-US" sz="2800" b="1" dirty="0">
                 <a:latin typeface="Arial" panose="020B0604020202020204" pitchFamily="34" charset="0"/>
                 <a:cs typeface="Arial" panose="020B0604020202020204" pitchFamily="34" charset="0"/>
               </a:rPr>
-              <a:t>Swaritam) syllables, or two acute(</a:t>
+              <a:t>(Swaritam) syllables, or two acute(</a:t>
             </a:r>
             <a:r>
               <a:rPr lang="en-US" sz="2800" b="1" dirty="0" err="1">
@@ -14263,32 +14207,18 @@
               </a:rPr>
               <a:t>),  </a:t>
             </a:r>
-            <a:r>
-              <a:rPr lang="en-US" sz="2800" b="1" dirty="0" smtClean="0">
-                <a:latin typeface="Arial" panose="020B0604020202020204" pitchFamily="34" charset="0"/>
-                <a:cs typeface="Arial" panose="020B0604020202020204" pitchFamily="34" charset="0"/>
-              </a:rPr>
-              <a:t/>
-            </a:r>
             <a:br>
-              <a:rPr lang="en-US" sz="2800" b="1" dirty="0" smtClean="0">
+              <a:rPr lang="en-US" sz="2800" b="1" dirty="0">
                 <a:latin typeface="Arial" panose="020B0604020202020204" pitchFamily="34" charset="0"/>
                 <a:cs typeface="Arial" panose="020B0604020202020204" pitchFamily="34" charset="0"/>
               </a:rPr>
             </a:br>
             <a:r>
-              <a:rPr lang="en-US" sz="2800" b="1" dirty="0" smtClean="0">
-                <a:latin typeface="Arial" panose="020B0604020202020204" pitchFamily="34" charset="0"/>
-                <a:cs typeface="Arial" panose="020B0604020202020204" pitchFamily="34" charset="0"/>
-              </a:rPr>
-              <a:t>or</a:t>
-            </a:r>
-            <a:r>
               <a:rPr lang="en-US" sz="2800" b="1" dirty="0">
                 <a:latin typeface="Arial" panose="020B0604020202020204" pitchFamily="34" charset="0"/>
                 <a:cs typeface="Arial" panose="020B0604020202020204" pitchFamily="34" charset="0"/>
               </a:rPr>
-              <a:t> two of which either one is acute(</a:t>
+              <a:t>or two of which either one is acute(</a:t>
             </a:r>
             <a:r>
               <a:rPr lang="en-US" sz="2800" b="1" dirty="0" err="1">
@@ -14302,154 +14232,70 @@
                 <a:latin typeface="Arial" panose="020B0604020202020204" pitchFamily="34" charset="0"/>
                 <a:cs typeface="Arial" panose="020B0604020202020204" pitchFamily="34" charset="0"/>
               </a:rPr>
-              <a:t>) </a:t>
-            </a:r>
-            <a:r>
-              <a:rPr lang="en-US" sz="2800" b="1" dirty="0" smtClean="0">
-                <a:latin typeface="Arial" panose="020B0604020202020204" pitchFamily="34" charset="0"/>
-                <a:cs typeface="Arial" panose="020B0604020202020204" pitchFamily="34" charset="0"/>
-              </a:rPr>
-              <a:t>and </a:t>
+              <a:t>) and  the other  circumflex(</a:t>
+            </a:r>
+            <a:r>
+              <a:rPr lang="en-US" sz="2800" b="1" dirty="0" err="1">
+                <a:latin typeface="Arial" panose="020B0604020202020204" pitchFamily="34" charset="0"/>
+                <a:cs typeface="Arial" panose="020B0604020202020204" pitchFamily="34" charset="0"/>
+              </a:rPr>
+              <a:t>Swarita</a:t>
             </a:r>
             <a:r>
               <a:rPr lang="en-US" sz="2800" b="1" dirty="0">
                 <a:latin typeface="Arial" panose="020B0604020202020204" pitchFamily="34" charset="0"/>
                 <a:cs typeface="Arial" panose="020B0604020202020204" pitchFamily="34" charset="0"/>
               </a:rPr>
-              <a:t> the other </a:t>
-            </a:r>
-            <a:r>
-              <a:rPr lang="en-US" sz="2800" b="1" dirty="0" smtClean="0">
-                <a:latin typeface="Arial" panose="020B0604020202020204" pitchFamily="34" charset="0"/>
-                <a:cs typeface="Arial" panose="020B0604020202020204" pitchFamily="34" charset="0"/>
-              </a:rPr>
-              <a:t> circumflex(</a:t>
-            </a:r>
-            <a:r>
-              <a:rPr lang="en-US" sz="2800" b="1" dirty="0" err="1" smtClean="0">
-                <a:latin typeface="Arial" panose="020B0604020202020204" pitchFamily="34" charset="0"/>
-                <a:cs typeface="Arial" panose="020B0604020202020204" pitchFamily="34" charset="0"/>
-              </a:rPr>
-              <a:t>Swarita</a:t>
-            </a:r>
-            <a:r>
+              <a:t>),   </a:t>
+            </a:r>
+            <a:br>
               <a:rPr lang="en-US" sz="2800" b="1" dirty="0">
                 <a:latin typeface="Arial" panose="020B0604020202020204" pitchFamily="34" charset="0"/>
                 <a:cs typeface="Arial" panose="020B0604020202020204" pitchFamily="34" charset="0"/>
               </a:rPr>
-              <a:t>),  </a:t>
-            </a:r>
-            <a:r>
-              <a:rPr lang="en-US" sz="2800" b="1" dirty="0" smtClean="0">
-                <a:latin typeface="Arial" panose="020B0604020202020204" pitchFamily="34" charset="0"/>
-                <a:cs typeface="Arial" panose="020B0604020202020204" pitchFamily="34" charset="0"/>
-              </a:rPr>
-              <a:t> </a:t>
+            </a:br>
+            <a:r>
+              <a:rPr lang="en-US" sz="2800" b="1" dirty="0">
+                <a:latin typeface="Arial" panose="020B0604020202020204" pitchFamily="34" charset="0"/>
+                <a:cs typeface="Arial" panose="020B0604020202020204" pitchFamily="34" charset="0"/>
+              </a:rPr>
+              <a:t>that is ”</a:t>
+            </a:r>
+            <a:r>
+              <a:rPr lang="en-US" sz="3200" b="1" dirty="0" err="1">
+                <a:latin typeface="Arial" panose="020B0604020202020204" pitchFamily="34" charset="0"/>
+                <a:cs typeface="Arial" panose="020B0604020202020204" pitchFamily="34" charset="0"/>
+              </a:rPr>
+              <a:t>vikrama</a:t>
+            </a:r>
+            <a:r>
+              <a:rPr lang="en-US" sz="2800" b="1" dirty="0">
+                <a:latin typeface="Arial" panose="020B0604020202020204" pitchFamily="34" charset="0"/>
+                <a:cs typeface="Arial" panose="020B0604020202020204" pitchFamily="34" charset="0"/>
+              </a:rPr>
+              <a:t>.”</a:t>
+            </a:r>
+          </a:p>
+          <a:p>
+            <a:r>
+              <a:rPr lang="en-US" sz="2800" b="1" dirty="0">
+                <a:latin typeface="Arial" panose="020B0604020202020204" pitchFamily="34" charset="0"/>
+                <a:cs typeface="Arial" panose="020B0604020202020204" pitchFamily="34" charset="0"/>
+              </a:rPr>
+              <a:t>PS 19-2 -  As also, according to Kauṇḍinya, </a:t>
             </a:r>
             <a:br>
-              <a:rPr lang="en-US" sz="2800" b="1" dirty="0" smtClean="0">
+              <a:rPr lang="en-US" sz="2800" b="1" dirty="0">
                 <a:latin typeface="Arial" panose="020B0604020202020204" pitchFamily="34" charset="0"/>
                 <a:cs typeface="Arial" panose="020B0604020202020204" pitchFamily="34" charset="0"/>
               </a:rPr>
             </a:br>
             <a:r>
-              <a:rPr lang="en-US" sz="2800" b="1" dirty="0" smtClean="0">
-                <a:latin typeface="Arial" panose="020B0604020202020204" pitchFamily="34" charset="0"/>
-                <a:cs typeface="Arial" panose="020B0604020202020204" pitchFamily="34" charset="0"/>
-              </a:rPr>
-              <a:t>that</a:t>
-            </a:r>
-            <a:r>
               <a:rPr lang="en-US" sz="2800" b="1" dirty="0">
                 <a:latin typeface="Arial" panose="020B0604020202020204" pitchFamily="34" charset="0"/>
                 <a:cs typeface="Arial" panose="020B0604020202020204" pitchFamily="34" charset="0"/>
               </a:rPr>
-              <a:t> is </a:t>
-            </a:r>
-            <a:r>
-              <a:rPr lang="en-US" sz="2800" b="1" dirty="0" smtClean="0">
-                <a:latin typeface="Arial" panose="020B0604020202020204" pitchFamily="34" charset="0"/>
-                <a:cs typeface="Arial" panose="020B0604020202020204" pitchFamily="34" charset="0"/>
-              </a:rPr>
-              <a:t>”</a:t>
-            </a:r>
-            <a:r>
-              <a:rPr lang="en-US" sz="3200" b="1" dirty="0" err="1" smtClean="0">
-                <a:latin typeface="Arial" panose="020B0604020202020204" pitchFamily="34" charset="0"/>
-                <a:cs typeface="Arial" panose="020B0604020202020204" pitchFamily="34" charset="0"/>
-              </a:rPr>
-              <a:t>vikrama</a:t>
-            </a:r>
-            <a:r>
-              <a:rPr lang="en-US" sz="2800" b="1" dirty="0" smtClean="0">
-                <a:latin typeface="Arial" panose="020B0604020202020204" pitchFamily="34" charset="0"/>
-                <a:cs typeface="Arial" panose="020B0604020202020204" pitchFamily="34" charset="0"/>
-              </a:rPr>
-              <a:t>.”</a:t>
-            </a:r>
-          </a:p>
-          <a:p>
-            <a:r>
-              <a:rPr lang="en-US" sz="2800" b="1" dirty="0">
-                <a:latin typeface="Arial" panose="020B0604020202020204" pitchFamily="34" charset="0"/>
-                <a:cs typeface="Arial" panose="020B0604020202020204" pitchFamily="34" charset="0"/>
-              </a:rPr>
-              <a:t>PS </a:t>
-            </a:r>
-            <a:r>
-              <a:rPr lang="en-US" sz="2800" b="1" dirty="0" smtClean="0">
-                <a:latin typeface="Arial" panose="020B0604020202020204" pitchFamily="34" charset="0"/>
-                <a:cs typeface="Arial" panose="020B0604020202020204" pitchFamily="34" charset="0"/>
-              </a:rPr>
-              <a:t>19-2 -  As</a:t>
-            </a:r>
-            <a:r>
-              <a:rPr lang="en-US" sz="2800" b="1" dirty="0">
-                <a:latin typeface="Arial" panose="020B0604020202020204" pitchFamily="34" charset="0"/>
-                <a:cs typeface="Arial" panose="020B0604020202020204" pitchFamily="34" charset="0"/>
-              </a:rPr>
-              <a:t> also, according to </a:t>
-            </a:r>
-            <a:r>
-              <a:rPr lang="en-US" sz="2800" b="1" dirty="0" smtClean="0">
-                <a:latin typeface="Arial" panose="020B0604020202020204" pitchFamily="34" charset="0"/>
-                <a:cs typeface="Arial" panose="020B0604020202020204" pitchFamily="34" charset="0"/>
-              </a:rPr>
-              <a:t>Kauṇḍinya</a:t>
-            </a:r>
-            <a:r>
-              <a:rPr lang="en-US" sz="2800" b="1" dirty="0">
-                <a:latin typeface="Arial" panose="020B0604020202020204" pitchFamily="34" charset="0"/>
-                <a:cs typeface="Arial" panose="020B0604020202020204" pitchFamily="34" charset="0"/>
-              </a:rPr>
-              <a:t>, </a:t>
-            </a:r>
-            <a:r>
-              <a:rPr lang="en-US" sz="2800" b="1" dirty="0" smtClean="0">
-                <a:latin typeface="Arial" panose="020B0604020202020204" pitchFamily="34" charset="0"/>
-                <a:cs typeface="Arial" panose="020B0604020202020204" pitchFamily="34" charset="0"/>
-              </a:rPr>
-              <a:t/>
-            </a:r>
-            <a:br>
-              <a:rPr lang="en-US" sz="2800" b="1" dirty="0" smtClean="0">
-                <a:latin typeface="Arial" panose="020B0604020202020204" pitchFamily="34" charset="0"/>
-                <a:cs typeface="Arial" panose="020B0604020202020204" pitchFamily="34" charset="0"/>
-              </a:rPr>
-            </a:br>
-            <a:r>
-              <a:rPr lang="en-US" sz="2800" b="1" dirty="0" smtClean="0">
-                <a:latin typeface="Arial" panose="020B0604020202020204" pitchFamily="34" charset="0"/>
-                <a:cs typeface="Arial" panose="020B0604020202020204" pitchFamily="34" charset="0"/>
-              </a:rPr>
-              <a:t>when</a:t>
-            </a:r>
-            <a:r>
-              <a:rPr lang="en-US" sz="2800" b="1" dirty="0">
-                <a:latin typeface="Arial" panose="020B0604020202020204" pitchFamily="34" charset="0"/>
-                <a:cs typeface="Arial" panose="020B0604020202020204" pitchFamily="34" charset="0"/>
-              </a:rPr>
-              <a:t> a pracaya precedes</a:t>
+              <a:t>when a pracaya precedes</a:t>
             </a:r>
           </a:p>
         </p:txBody>
@@ -14464,13 +14310,6 @@
   <p:clrMapOvr>
     <a:masterClrMapping/>
   </p:clrMapOvr>
-  <p:timing>
-    <p:tnLst>
-      <p:par>
-        <p:cTn id="1" dur="indefinite" restart="never" nodeType="tmRoot"/>
-      </p:par>
-    </p:tnLst>
-  </p:timing>
 </p:sld>
 </file>
 
@@ -14512,11 +14351,11 @@
           <a:lstStyle/>
           <a:p>
             <a:r>
-              <a:rPr lang="en-US" dirty="0" smtClean="0"/>
+              <a:rPr lang="en-US" dirty="0"/>
               <a:t>Importance of </a:t>
             </a:r>
             <a:r>
-              <a:rPr lang="en-US" dirty="0" err="1" smtClean="0"/>
+              <a:rPr lang="en-US" dirty="0" err="1"/>
               <a:t>udAtta</a:t>
             </a:r>
             <a:endParaRPr lang="en-US" dirty="0"/>
@@ -14541,28 +14380,28 @@
           <a:lstStyle/>
           <a:p>
             <a:r>
-              <a:rPr lang="en-US" sz="2600" b="1" dirty="0" err="1" smtClean="0">
+              <a:rPr lang="en-US" sz="2600" b="1" dirty="0" err="1">
                 <a:latin typeface="Arial" panose="020B0604020202020204" pitchFamily="34" charset="0"/>
                 <a:cs typeface="Arial" panose="020B0604020202020204" pitchFamily="34" charset="0"/>
               </a:rPr>
               <a:t>udAtta</a:t>
             </a:r>
             <a:r>
-              <a:rPr lang="en-US" sz="2600" b="1" dirty="0" smtClean="0">
+              <a:rPr lang="en-US" sz="2600" b="1" dirty="0">
                 <a:latin typeface="Arial" panose="020B0604020202020204" pitchFamily="34" charset="0"/>
                 <a:cs typeface="Arial" panose="020B0604020202020204" pitchFamily="34" charset="0"/>
               </a:rPr>
               <a:t> is the </a:t>
             </a:r>
             <a:r>
-              <a:rPr lang="en-US" sz="2600" b="1" dirty="0" err="1" smtClean="0">
+              <a:rPr lang="en-US" sz="2600" b="1" dirty="0" err="1">
                 <a:latin typeface="Arial" panose="020B0604020202020204" pitchFamily="34" charset="0"/>
                 <a:cs typeface="Arial" panose="020B0604020202020204" pitchFamily="34" charset="0"/>
               </a:rPr>
               <a:t>acyuta</a:t>
             </a:r>
             <a:r>
-              <a:rPr lang="en-US" sz="2600" b="1" dirty="0" smtClean="0">
+              <a:rPr lang="en-US" sz="2600" b="1" dirty="0">
                 <a:latin typeface="Arial" panose="020B0604020202020204" pitchFamily="34" charset="0"/>
                 <a:cs typeface="Arial" panose="020B0604020202020204" pitchFamily="34" charset="0"/>
               </a:rPr>
@@ -14572,34 +14411,34 @@
           <a:p>
             <a:pPr lvl="1"/>
             <a:r>
-              <a:rPr lang="en-US" sz="2400" b="1" dirty="0" smtClean="0">
+              <a:rPr lang="en-US" sz="2400" b="1" dirty="0">
                 <a:latin typeface="Arial" panose="020B0604020202020204" pitchFamily="34" charset="0"/>
                 <a:cs typeface="Arial" panose="020B0604020202020204" pitchFamily="34" charset="0"/>
               </a:rPr>
               <a:t>Like all revolve around </a:t>
             </a:r>
             <a:r>
-              <a:rPr lang="en-US" sz="2400" b="1" dirty="0" err="1" smtClean="0">
+              <a:rPr lang="en-US" sz="2400" b="1" dirty="0" err="1">
                 <a:latin typeface="Arial" panose="020B0604020202020204" pitchFamily="34" charset="0"/>
                 <a:cs typeface="Arial" panose="020B0604020202020204" pitchFamily="34" charset="0"/>
               </a:rPr>
               <a:t>VishNu</a:t>
             </a:r>
-            <a:endParaRPr lang="en-US" sz="2400" b="1" dirty="0" smtClean="0">
+            <a:endParaRPr lang="en-US" sz="2400" b="1" dirty="0">
               <a:latin typeface="Arial" panose="020B0604020202020204" pitchFamily="34" charset="0"/>
               <a:cs typeface="Arial" panose="020B0604020202020204" pitchFamily="34" charset="0"/>
             </a:endParaRPr>
           </a:p>
           <a:p>
             <a:r>
-              <a:rPr lang="en-US" sz="2600" b="1" dirty="0" smtClean="0">
+              <a:rPr lang="en-US" sz="2600" b="1" dirty="0">
                 <a:latin typeface="Arial" panose="020B0604020202020204" pitchFamily="34" charset="0"/>
                 <a:cs typeface="Arial" panose="020B0604020202020204" pitchFamily="34" charset="0"/>
               </a:rPr>
               <a:t>Sets the </a:t>
             </a:r>
             <a:r>
-              <a:rPr lang="en-US" sz="2600" b="1" dirty="0" smtClean="0">
+              <a:rPr lang="en-US" sz="2600" b="1" dirty="0">
                 <a:solidFill>
                   <a:srgbClr val="FF0000"/>
                 </a:solidFill>
@@ -14609,7 +14448,7 @@
               <a:t>entire tone </a:t>
             </a:r>
             <a:r>
-              <a:rPr lang="en-US" sz="2600" b="1" dirty="0" smtClean="0">
+              <a:rPr lang="en-US" sz="2600" b="1" dirty="0">
                 <a:latin typeface="Arial" panose="020B0604020202020204" pitchFamily="34" charset="0"/>
                 <a:cs typeface="Arial" panose="020B0604020202020204" pitchFamily="34" charset="0"/>
               </a:rPr>
@@ -14634,32 +14473,21 @@
           </a:p>
           <a:p>
             <a:r>
-              <a:rPr lang="en-US" sz="2600" b="1" dirty="0" smtClean="0">
-                <a:latin typeface="Arial" panose="020B0604020202020204" pitchFamily="34" charset="0"/>
-                <a:cs typeface="Arial" panose="020B0604020202020204" pitchFamily="34" charset="0"/>
-              </a:rPr>
-              <a:t>Various level of Swara Reach – Show </a:t>
-            </a:r>
-            <a:r>
-              <a:rPr lang="en-US" sz="2600" b="1" dirty="0" smtClean="0">
-                <a:latin typeface="Arial" panose="020B0604020202020204" pitchFamily="34" charset="0"/>
-                <a:cs typeface="Arial" panose="020B0604020202020204" pitchFamily="34" charset="0"/>
-              </a:rPr>
-              <a:t>table</a:t>
-            </a:r>
-          </a:p>
-          <a:p>
-            <a:r>
-              <a:rPr lang="en-US" sz="2600" b="1" dirty="0" smtClean="0">
+              <a:rPr lang="en-US" sz="2600" b="1" dirty="0">
+                <a:latin typeface="Arial" panose="020B0604020202020204" pitchFamily="34" charset="0"/>
+                <a:cs typeface="Arial" panose="020B0604020202020204" pitchFamily="34" charset="0"/>
+              </a:rPr>
+              <a:t>Various level of Swara Reach – Show table</a:t>
+            </a:r>
+          </a:p>
+          <a:p>
+            <a:r>
+              <a:rPr lang="en-US" sz="2600" b="1" dirty="0">
                 <a:latin typeface="Arial" panose="020B0604020202020204" pitchFamily="34" charset="0"/>
                 <a:cs typeface="Arial" panose="020B0604020202020204" pitchFamily="34" charset="0"/>
               </a:rPr>
               <a:t>An introduction to hasta mudra in Veda recital</a:t>
             </a:r>
-            <a:endParaRPr lang="en-US" sz="2600" b="1" dirty="0" smtClean="0">
-              <a:latin typeface="Arial" panose="020B0604020202020204" pitchFamily="34" charset="0"/>
-              <a:cs typeface="Arial" panose="020B0604020202020204" pitchFamily="34" charset="0"/>
-            </a:endParaRPr>
           </a:p>
         </p:txBody>
       </p:sp>
@@ -14673,13 +14501,6 @@
   <p:clrMapOvr>
     <a:masterClrMapping/>
   </p:clrMapOvr>
-  <p:timing>
-    <p:tnLst>
-      <p:par>
-        <p:cTn id="1" dur="indefinite" restart="never" nodeType="tmRoot"/>
-      </p:par>
-    </p:tnLst>
-  </p:timing>
 </p:sld>
 </file>
 
@@ -14716,10 +14537,9 @@
           <a:lstStyle/>
           <a:p>
             <a:r>
-              <a:rPr lang="en-US" dirty="0" smtClean="0"/>
+              <a:rPr lang="en-US" dirty="0"/>
               <a:t>Summary of Swaram Part 1 and 2</a:t>
             </a:r>
-            <a:endParaRPr lang="en-US" dirty="0"/>
           </a:p>
         </p:txBody>
       </p:sp>
@@ -14746,7 +14566,7 @@
           <a:lstStyle/>
           <a:p>
             <a:r>
-              <a:rPr lang="en-US" sz="2800" b="1" dirty="0" smtClean="0">
+              <a:rPr lang="en-US" sz="2800" b="1" dirty="0">
                 <a:latin typeface="Arial" panose="020B0604020202020204" pitchFamily="34" charset="0"/>
                 <a:cs typeface="Arial" panose="020B0604020202020204" pitchFamily="34" charset="0"/>
               </a:rPr>
@@ -14756,7 +14576,7 @@
           <a:p>
             <a:pPr lvl="1"/>
             <a:r>
-              <a:rPr lang="en-US" sz="2800" b="1" dirty="0" smtClean="0">
+              <a:rPr lang="en-US" sz="2800" b="1" dirty="0">
                 <a:latin typeface="Arial" panose="020B0604020202020204" pitchFamily="34" charset="0"/>
                 <a:cs typeface="Arial" panose="020B0604020202020204" pitchFamily="34" charset="0"/>
               </a:rPr>
@@ -14766,7 +14586,7 @@
           <a:p>
             <a:pPr lvl="1"/>
             <a:r>
-              <a:rPr lang="en-US" sz="2800" b="1" dirty="0" smtClean="0">
+              <a:rPr lang="en-US" sz="2800" b="1" dirty="0">
                 <a:latin typeface="Arial" panose="020B0604020202020204" pitchFamily="34" charset="0"/>
                 <a:cs typeface="Arial" panose="020B0604020202020204" pitchFamily="34" charset="0"/>
               </a:rPr>
@@ -14776,7 +14596,7 @@
           <a:p>
             <a:pPr lvl="1"/>
             <a:r>
-              <a:rPr lang="en-US" sz="2800" b="1" dirty="0" smtClean="0">
+              <a:rPr lang="en-US" sz="2800" b="1" dirty="0">
                 <a:latin typeface="Arial" panose="020B0604020202020204" pitchFamily="34" charset="0"/>
                 <a:cs typeface="Arial" panose="020B0604020202020204" pitchFamily="34" charset="0"/>
               </a:rPr>
@@ -14785,7 +14605,7 @@
           </a:p>
           <a:p>
             <a:r>
-              <a:rPr lang="en-US" sz="3000" b="1" dirty="0" smtClean="0">
+              <a:rPr lang="en-US" sz="3000" b="1" dirty="0">
                 <a:latin typeface="Arial" panose="020B0604020202020204" pitchFamily="34" charset="0"/>
                 <a:cs typeface="Arial" panose="020B0604020202020204" pitchFamily="34" charset="0"/>
               </a:rPr>
@@ -14795,28 +14615,28 @@
           <a:p>
             <a:pPr lvl="1"/>
             <a:r>
-              <a:rPr lang="en-US" sz="2800" b="1" dirty="0" smtClean="0">
+              <a:rPr lang="en-US" sz="2800" b="1" dirty="0">
                 <a:latin typeface="Arial" panose="020B0604020202020204" pitchFamily="34" charset="0"/>
                 <a:cs typeface="Arial" panose="020B0604020202020204" pitchFamily="34" charset="0"/>
               </a:rPr>
               <a:t>Pracaya, </a:t>
             </a:r>
             <a:r>
-              <a:rPr lang="en-US" sz="2800" b="1" dirty="0" err="1" smtClean="0">
+              <a:rPr lang="en-US" sz="2800" b="1" dirty="0" err="1">
                 <a:latin typeface="Arial" panose="020B0604020202020204" pitchFamily="34" charset="0"/>
                 <a:cs typeface="Arial" panose="020B0604020202020204" pitchFamily="34" charset="0"/>
               </a:rPr>
               <a:t>sannatara</a:t>
             </a:r>
             <a:r>
-              <a:rPr lang="en-US" sz="2800" b="1" dirty="0" smtClean="0">
+              <a:rPr lang="en-US" sz="2800" b="1" dirty="0">
                 <a:latin typeface="Arial" panose="020B0604020202020204" pitchFamily="34" charset="0"/>
                 <a:cs typeface="Arial" panose="020B0604020202020204" pitchFamily="34" charset="0"/>
               </a:rPr>
               <a:t>, </a:t>
             </a:r>
             <a:r>
-              <a:rPr lang="en-US" sz="2800" b="1" dirty="0" err="1" smtClean="0">
+              <a:rPr lang="en-US" sz="2800" b="1" dirty="0" err="1">
                 <a:latin typeface="Arial" panose="020B0604020202020204" pitchFamily="34" charset="0"/>
                 <a:cs typeface="Arial" panose="020B0604020202020204" pitchFamily="34" charset="0"/>
               </a:rPr>
@@ -14839,13 +14659,6 @@
   <p:clrMapOvr>
     <a:masterClrMapping/>
   </p:clrMapOvr>
-  <p:timing>
-    <p:tnLst>
-      <p:par>
-        <p:cTn id="1" dur="indefinite" restart="never" nodeType="tmRoot"/>
-      </p:par>
-    </p:tnLst>
-  </p:timing>
 </p:sld>
 </file>
 
@@ -14882,10 +14695,9 @@
           <a:lstStyle/>
           <a:p>
             <a:r>
-              <a:rPr lang="en-US" dirty="0" smtClean="0"/>
+              <a:rPr lang="en-US" dirty="0"/>
               <a:t>Conceptual view of Sliding</a:t>
             </a:r>
-            <a:endParaRPr lang="en-US" dirty="0"/>
           </a:p>
         </p:txBody>
       </p:sp>
@@ -14905,41 +14717,41 @@
           <a:lstStyle/>
           <a:p>
             <a:r>
-              <a:rPr lang="en-US" sz="2800" b="1" dirty="0" smtClean="0">
+              <a:rPr lang="en-US" sz="2800" b="1" dirty="0">
                 <a:latin typeface="Arial" panose="020B0604020202020204" pitchFamily="34" charset="0"/>
                 <a:cs typeface="Arial" panose="020B0604020202020204" pitchFamily="34" charset="0"/>
               </a:rPr>
               <a:t>Demonstrate the Pages for </a:t>
             </a:r>
             <a:r>
-              <a:rPr lang="en-US" sz="2800" b="1" dirty="0" err="1" smtClean="0">
+              <a:rPr lang="en-US" sz="2800" b="1" dirty="0" err="1">
                 <a:latin typeface="Arial" panose="020B0604020202020204" pitchFamily="34" charset="0"/>
                 <a:cs typeface="Arial" panose="020B0604020202020204" pitchFamily="34" charset="0"/>
               </a:rPr>
               <a:t>asya</a:t>
             </a:r>
             <a:r>
-              <a:rPr lang="en-US" sz="2800" b="1" dirty="0" smtClean="0">
+              <a:rPr lang="en-US" sz="2800" b="1" dirty="0">
                 <a:latin typeface="Arial" panose="020B0604020202020204" pitchFamily="34" charset="0"/>
                 <a:cs typeface="Arial" panose="020B0604020202020204" pitchFamily="34" charset="0"/>
               </a:rPr>
               <a:t> and </a:t>
             </a:r>
             <a:r>
-              <a:rPr lang="en-US" sz="2800" b="1" dirty="0" err="1" smtClean="0">
+              <a:rPr lang="en-US" sz="2800" b="1" dirty="0" err="1">
                 <a:latin typeface="Arial" panose="020B0604020202020204" pitchFamily="34" charset="0"/>
                 <a:cs typeface="Arial" panose="020B0604020202020204" pitchFamily="34" charset="0"/>
               </a:rPr>
               <a:t>asyA</a:t>
             </a:r>
-            <a:endParaRPr lang="en-US" sz="2800" b="1" dirty="0" smtClean="0">
+            <a:endParaRPr lang="en-US" sz="2800" b="1" dirty="0">
               <a:latin typeface="Arial" panose="020B0604020202020204" pitchFamily="34" charset="0"/>
               <a:cs typeface="Arial" panose="020B0604020202020204" pitchFamily="34" charset="0"/>
             </a:endParaRPr>
           </a:p>
           <a:p>
             <a:r>
-              <a:rPr lang="en-US" sz="2800" b="1" dirty="0" smtClean="0">
+              <a:rPr lang="en-US" sz="2800" b="1" dirty="0">
                 <a:latin typeface="Arial" panose="020B0604020202020204" pitchFamily="34" charset="0"/>
                 <a:cs typeface="Arial" panose="020B0604020202020204" pitchFamily="34" charset="0"/>
               </a:rPr>
@@ -14948,34 +14760,34 @@
           </a:p>
           <a:p>
             <a:r>
-              <a:rPr lang="en-US" sz="2800" b="1" dirty="0" smtClean="0">
+              <a:rPr lang="en-US" sz="2800" b="1" dirty="0">
                 <a:latin typeface="Arial" panose="020B0604020202020204" pitchFamily="34" charset="0"/>
                 <a:cs typeface="Arial" panose="020B0604020202020204" pitchFamily="34" charset="0"/>
               </a:rPr>
               <a:t>See the distinction of </a:t>
             </a:r>
             <a:r>
-              <a:rPr lang="en-US" sz="2800" b="1" dirty="0" err="1" smtClean="0">
+              <a:rPr lang="en-US" sz="2800" b="1" dirty="0" err="1">
                 <a:latin typeface="Arial" panose="020B0604020202020204" pitchFamily="34" charset="0"/>
                 <a:cs typeface="Arial" panose="020B0604020202020204" pitchFamily="34" charset="0"/>
               </a:rPr>
               <a:t>manyava</a:t>
             </a:r>
             <a:r>
-              <a:rPr lang="en-US" sz="2800" b="1" dirty="0" smtClean="0">
+              <a:rPr lang="en-US" sz="2800" b="1" dirty="0">
                 <a:latin typeface="Arial" panose="020B0604020202020204" pitchFamily="34" charset="0"/>
                 <a:cs typeface="Arial" panose="020B0604020202020204" pitchFamily="34" charset="0"/>
               </a:rPr>
               <a:t> and </a:t>
             </a:r>
             <a:r>
-              <a:rPr lang="en-US" sz="2800" b="1" dirty="0" err="1" smtClean="0">
+              <a:rPr lang="en-US" sz="2800" b="1" dirty="0" err="1">
                 <a:latin typeface="Arial" panose="020B0604020202020204" pitchFamily="34" charset="0"/>
                 <a:cs typeface="Arial" panose="020B0604020202020204" pitchFamily="34" charset="0"/>
               </a:rPr>
               <a:t>mIDhuShe</a:t>
             </a:r>
-            <a:endParaRPr lang="en-US" sz="2800" b="1" dirty="0" smtClean="0">
+            <a:endParaRPr lang="en-US" sz="2800" b="1" dirty="0">
               <a:latin typeface="Arial" panose="020B0604020202020204" pitchFamily="34" charset="0"/>
               <a:cs typeface="Arial" panose="020B0604020202020204" pitchFamily="34" charset="0"/>
             </a:endParaRPr>
@@ -14983,21 +14795,21 @@
           <a:p>
             <a:pPr lvl="1"/>
             <a:r>
-              <a:rPr lang="en-US" sz="2800" b="1" dirty="0" smtClean="0">
+              <a:rPr lang="en-US" sz="2800" b="1" dirty="0">
                 <a:latin typeface="Arial" panose="020B0604020202020204" pitchFamily="34" charset="0"/>
                 <a:cs typeface="Arial" panose="020B0604020202020204" pitchFamily="34" charset="0"/>
               </a:rPr>
               <a:t>Observe example utterance of me, </a:t>
             </a:r>
             <a:r>
-              <a:rPr lang="en-US" sz="2800" b="1" dirty="0" err="1" smtClean="0">
+              <a:rPr lang="en-US" sz="2800" b="1" dirty="0" err="1">
                 <a:latin typeface="Arial" panose="020B0604020202020204" pitchFamily="34" charset="0"/>
                 <a:cs typeface="Arial" panose="020B0604020202020204" pitchFamily="34" charset="0"/>
               </a:rPr>
               <a:t>ae</a:t>
             </a:r>
             <a:r>
-              <a:rPr lang="en-US" sz="2800" b="1" dirty="0" smtClean="0">
+              <a:rPr lang="en-US" sz="2800" b="1" dirty="0">
                 <a:latin typeface="Arial" panose="020B0604020202020204" pitchFamily="34" charset="0"/>
                 <a:cs typeface="Arial" panose="020B0604020202020204" pitchFamily="34" charset="0"/>
               </a:rPr>
@@ -15006,7 +14818,7 @@
           </a:p>
           <a:p>
             <a:r>
-              <a:rPr lang="en-US" sz="3000" b="1" dirty="0" smtClean="0">
+              <a:rPr lang="en-US" sz="3000" b="1" dirty="0">
                 <a:latin typeface="Arial" panose="020B0604020202020204" pitchFamily="34" charset="0"/>
                 <a:cs typeface="Arial" panose="020B0604020202020204" pitchFamily="34" charset="0"/>
               </a:rPr>
@@ -15029,13 +14841,6 @@
   <p:clrMapOvr>
     <a:masterClrMapping/>
   </p:clrMapOvr>
-  <p:timing>
-    <p:tnLst>
-      <p:par>
-        <p:cTn id="1" dur="indefinite" restart="never" nodeType="tmRoot"/>
-      </p:par>
-    </p:tnLst>
-  </p:timing>
 </p:sld>
 </file>
 
@@ -15072,18 +14877,17 @@
           <a:lstStyle/>
           <a:p>
             <a:r>
-              <a:rPr lang="en-US" dirty="0" smtClean="0"/>
+              <a:rPr lang="en-US" dirty="0"/>
               <a:t>Tip from </a:t>
             </a:r>
             <a:r>
-              <a:rPr lang="en-US" dirty="0" err="1" smtClean="0"/>
+              <a:rPr lang="en-US" dirty="0" err="1"/>
               <a:t>prAtiSAkyam</a:t>
             </a:r>
             <a:r>
-              <a:rPr lang="en-US" dirty="0" smtClean="0"/>
+              <a:rPr lang="en-US" dirty="0"/>
               <a:t> </a:t>
             </a:r>
-            <a:endParaRPr lang="en-US" dirty="0"/>
           </a:p>
         </p:txBody>
       </p:sp>
@@ -15107,164 +14911,59 @@
                 <a:latin typeface="Arial" panose="020B0604020202020204" pitchFamily="34" charset="0"/>
                 <a:cs typeface="Arial" panose="020B0604020202020204" pitchFamily="34" charset="0"/>
               </a:rPr>
-              <a:t>PS 1.41 </a:t>
-            </a:r>
-            <a:r>
-              <a:rPr lang="en-US" sz="2800" b="1" dirty="0" smtClean="0">
-                <a:latin typeface="Arial" panose="020B0604020202020204" pitchFamily="34" charset="0"/>
-                <a:cs typeface="Arial" panose="020B0604020202020204" pitchFamily="34" charset="0"/>
-              </a:rPr>
-              <a:t>--Of</a:t>
-            </a:r>
-            <a:r>
+              <a:t>PS 1.41 --Of this Swaritam (Circumflex), in case it immediately follows </a:t>
+            </a:r>
+            <a:br>
               <a:rPr lang="en-US" sz="2800" b="1" dirty="0">
                 <a:latin typeface="Arial" panose="020B0604020202020204" pitchFamily="34" charset="0"/>
                 <a:cs typeface="Arial" panose="020B0604020202020204" pitchFamily="34" charset="0"/>
               </a:rPr>
-              <a:t> this </a:t>
-            </a:r>
-            <a:r>
-              <a:rPr lang="en-US" sz="2800" b="1" dirty="0" smtClean="0">
-                <a:latin typeface="Arial" panose="020B0604020202020204" pitchFamily="34" charset="0"/>
-                <a:cs typeface="Arial" panose="020B0604020202020204" pitchFamily="34" charset="0"/>
-              </a:rPr>
-              <a:t>Swaritam </a:t>
-            </a:r>
+            </a:br>
             <a:r>
               <a:rPr lang="en-US" sz="2800" b="1" dirty="0">
                 <a:latin typeface="Arial" panose="020B0604020202020204" pitchFamily="34" charset="0"/>
                 <a:cs typeface="Arial" panose="020B0604020202020204" pitchFamily="34" charset="0"/>
               </a:rPr>
-              <a:t>(Circumflex</a:t>
-            </a:r>
-            <a:r>
-              <a:rPr lang="en-US" sz="2800" b="1" dirty="0" smtClean="0">
-                <a:latin typeface="Arial" panose="020B0604020202020204" pitchFamily="34" charset="0"/>
-                <a:cs typeface="Arial" panose="020B0604020202020204" pitchFamily="34" charset="0"/>
-              </a:rPr>
-              <a:t>), in</a:t>
-            </a:r>
-            <a:r>
+              <a:t>udAttam)(acute)the first part,   to the extent of half a short vowel, </a:t>
+            </a:r>
+            <a:br>
               <a:rPr lang="en-US" sz="2800" b="1" dirty="0">
                 <a:latin typeface="Arial" panose="020B0604020202020204" pitchFamily="34" charset="0"/>
                 <a:cs typeface="Arial" panose="020B0604020202020204" pitchFamily="34" charset="0"/>
               </a:rPr>
-              <a:t> case it immediately follows </a:t>
-            </a:r>
-            <a:r>
-              <a:rPr lang="en-US" sz="2800" b="1" dirty="0" smtClean="0">
-                <a:latin typeface="Arial" panose="020B0604020202020204" pitchFamily="34" charset="0"/>
-                <a:cs typeface="Arial" panose="020B0604020202020204" pitchFamily="34" charset="0"/>
-              </a:rPr>
-              <a:t/>
-            </a:r>
-            <a:br>
-              <a:rPr lang="en-US" sz="2800" b="1" dirty="0" smtClean="0">
-                <a:latin typeface="Arial" panose="020B0604020202020204" pitchFamily="34" charset="0"/>
-                <a:cs typeface="Arial" panose="020B0604020202020204" pitchFamily="34" charset="0"/>
-              </a:rPr>
             </a:br>
             <a:r>
-              <a:rPr lang="en-US" sz="2800" b="1" dirty="0" smtClean="0">
-                <a:latin typeface="Arial" panose="020B0604020202020204" pitchFamily="34" charset="0"/>
-                <a:cs typeface="Arial" panose="020B0604020202020204" pitchFamily="34" charset="0"/>
-              </a:rPr>
-              <a:t>udAttam)(acute)the</a:t>
-            </a:r>
-            <a:r>
               <a:rPr lang="en-US" sz="2800" b="1" dirty="0">
                 <a:latin typeface="Arial" panose="020B0604020202020204" pitchFamily="34" charset="0"/>
                 <a:cs typeface="Arial" panose="020B0604020202020204" pitchFamily="34" charset="0"/>
               </a:rPr>
-              <a:t> first </a:t>
-            </a:r>
-            <a:r>
-              <a:rPr lang="en-US" sz="2800" b="1" dirty="0" smtClean="0">
-                <a:latin typeface="Arial" panose="020B0604020202020204" pitchFamily="34" charset="0"/>
-                <a:cs typeface="Arial" panose="020B0604020202020204" pitchFamily="34" charset="0"/>
-              </a:rPr>
-              <a:t>part,   to</a:t>
-            </a:r>
+              <a:t>is uttered in a yet higher tone.</a:t>
+            </a:r>
+          </a:p>
+          <a:p>
             <a:r>
               <a:rPr lang="en-US" sz="2800" b="1" dirty="0">
                 <a:latin typeface="Arial" panose="020B0604020202020204" pitchFamily="34" charset="0"/>
                 <a:cs typeface="Arial" panose="020B0604020202020204" pitchFamily="34" charset="0"/>
               </a:rPr>
-              <a:t> the extent of half a </a:t>
-            </a:r>
-            <a:r>
-              <a:rPr lang="en-US" sz="2800" b="1" dirty="0" smtClean="0">
-                <a:latin typeface="Arial" panose="020B0604020202020204" pitchFamily="34" charset="0"/>
-                <a:cs typeface="Arial" panose="020B0604020202020204" pitchFamily="34" charset="0"/>
-              </a:rPr>
-              <a:t>short</a:t>
+              <a:t>Example </a:t>
+            </a:r>
+            <a:r>
+              <a:rPr lang="en-US" sz="2800" b="1" dirty="0" err="1">
+                <a:latin typeface="Arial" panose="020B0604020202020204" pitchFamily="34" charset="0"/>
+                <a:cs typeface="Arial" panose="020B0604020202020204" pitchFamily="34" charset="0"/>
+              </a:rPr>
+              <a:t>gaNAnAm</a:t>
             </a:r>
             <a:r>
               <a:rPr lang="en-US" sz="2800" b="1" dirty="0">
                 <a:latin typeface="Arial" panose="020B0604020202020204" pitchFamily="34" charset="0"/>
                 <a:cs typeface="Arial" panose="020B0604020202020204" pitchFamily="34" charset="0"/>
               </a:rPr>
-              <a:t> vowel, </a:t>
-            </a:r>
-            <a:r>
-              <a:rPr lang="en-US" sz="2800" b="1" dirty="0" smtClean="0">
-                <a:latin typeface="Arial" panose="020B0604020202020204" pitchFamily="34" charset="0"/>
-                <a:cs typeface="Arial" panose="020B0604020202020204" pitchFamily="34" charset="0"/>
-              </a:rPr>
-              <a:t/>
-            </a:r>
-            <a:br>
-              <a:rPr lang="en-US" sz="2800" b="1" dirty="0" smtClean="0">
-                <a:latin typeface="Arial" panose="020B0604020202020204" pitchFamily="34" charset="0"/>
-                <a:cs typeface="Arial" panose="020B0604020202020204" pitchFamily="34" charset="0"/>
-              </a:rPr>
-            </a:br>
-            <a:r>
-              <a:rPr lang="en-US" sz="2800" b="1" dirty="0" smtClean="0">
-                <a:latin typeface="Arial" panose="020B0604020202020204" pitchFamily="34" charset="0"/>
-                <a:cs typeface="Arial" panose="020B0604020202020204" pitchFamily="34" charset="0"/>
-              </a:rPr>
-              <a:t>is</a:t>
-            </a:r>
-            <a:r>
-              <a:rPr lang="en-US" sz="2800" b="1" dirty="0">
-                <a:latin typeface="Arial" panose="020B0604020202020204" pitchFamily="34" charset="0"/>
-                <a:cs typeface="Arial" panose="020B0604020202020204" pitchFamily="34" charset="0"/>
-              </a:rPr>
-              <a:t> uttered in a yet higher tone</a:t>
-            </a:r>
-            <a:r>
-              <a:rPr lang="en-US" sz="2800" b="1" dirty="0" smtClean="0">
-                <a:latin typeface="Arial" panose="020B0604020202020204" pitchFamily="34" charset="0"/>
-                <a:cs typeface="Arial" panose="020B0604020202020204" pitchFamily="34" charset="0"/>
-              </a:rPr>
-              <a:t>.</a:t>
-            </a:r>
-          </a:p>
-          <a:p>
-            <a:r>
-              <a:rPr lang="en-US" sz="2800" b="1" dirty="0" smtClean="0">
-                <a:latin typeface="Arial" panose="020B0604020202020204" pitchFamily="34" charset="0"/>
-                <a:cs typeface="Arial" panose="020B0604020202020204" pitchFamily="34" charset="0"/>
-              </a:rPr>
-              <a:t>Example </a:t>
-            </a:r>
-            <a:r>
-              <a:rPr lang="en-US" sz="2800" b="1" dirty="0" err="1" smtClean="0">
-                <a:latin typeface="Arial" panose="020B0604020202020204" pitchFamily="34" charset="0"/>
-                <a:cs typeface="Arial" panose="020B0604020202020204" pitchFamily="34" charset="0"/>
-              </a:rPr>
-              <a:t>gaNAnAm</a:t>
-            </a:r>
-            <a:r>
-              <a:rPr lang="en-US" sz="2800" b="1" dirty="0" smtClean="0">
-                <a:latin typeface="Arial" panose="020B0604020202020204" pitchFamily="34" charset="0"/>
-                <a:cs typeface="Arial" panose="020B0604020202020204" pitchFamily="34" charset="0"/>
-              </a:rPr>
               <a:t> </a:t>
             </a:r>
             <a:r>
-              <a:rPr lang="en-US" sz="2800" b="1" dirty="0" err="1" smtClean="0">
+              <a:rPr lang="en-US" sz="2800" b="1" dirty="0" err="1">
                 <a:latin typeface="Arial" panose="020B0604020202020204" pitchFamily="34" charset="0"/>
                 <a:cs typeface="Arial" panose="020B0604020202020204" pitchFamily="34" charset="0"/>
               </a:rPr>
@@ -15276,7 +14975,7 @@
             </a:endParaRPr>
           </a:p>
           <a:p>
-            <a:endParaRPr lang="en-US" sz="3000" b="1" dirty="0" smtClean="0">
+            <a:endParaRPr lang="en-US" sz="3000" b="1" dirty="0">
               <a:latin typeface="Arial" panose="020B0604020202020204" pitchFamily="34" charset="0"/>
               <a:cs typeface="Arial" panose="020B0604020202020204" pitchFamily="34" charset="0"/>
             </a:endParaRPr>
@@ -15297,13 +14996,6 @@
   <p:clrMapOvr>
     <a:masterClrMapping/>
   </p:clrMapOvr>
-  <p:timing>
-    <p:tnLst>
-      <p:par>
-        <p:cTn id="1" dur="indefinite" restart="never" nodeType="tmRoot"/>
-      </p:par>
-    </p:tnLst>
-  </p:timing>
 </p:sld>
 </file>
 
@@ -15340,10 +15032,9 @@
           <a:lstStyle/>
           <a:p>
             <a:r>
-              <a:rPr lang="en-US" dirty="0" smtClean="0"/>
+              <a:rPr lang="en-US" dirty="0"/>
               <a:t>Definition Pracaya – Swaram 4 </a:t>
             </a:r>
-            <a:endParaRPr lang="en-US" dirty="0"/>
           </a:p>
         </p:txBody>
       </p:sp>
@@ -15374,19 +15065,8 @@
                 <a:latin typeface="Arial" panose="020B0604020202020204" pitchFamily="34" charset="0"/>
                 <a:cs typeface="Arial" panose="020B0604020202020204" pitchFamily="34" charset="0"/>
               </a:rPr>
-              <a:t>Pracaya is a collection or accumulation of letters that get a same Swara </a:t>
-            </a:r>
-            <a:r>
-              <a:rPr lang="en-US" sz="2800" b="1" dirty="0" smtClean="0">
-                <a:latin typeface="Arial" panose="020B0604020202020204" pitchFamily="34" charset="0"/>
-                <a:cs typeface="Arial" panose="020B0604020202020204" pitchFamily="34" charset="0"/>
-              </a:rPr>
-              <a:t>tone</a:t>
-            </a:r>
-            <a:endParaRPr lang="en-US" sz="2800" b="1" dirty="0">
-              <a:latin typeface="Arial" panose="020B0604020202020204" pitchFamily="34" charset="0"/>
-              <a:cs typeface="Arial" panose="020B0604020202020204" pitchFamily="34" charset="0"/>
-            </a:endParaRPr>
+              <a:t>Pracaya is a collection or accumulation of letters that get a same Swara tone</a:t>
+            </a:r>
           </a:p>
           <a:p>
             <a:pPr lvl="1"/>
@@ -15547,13 +15227,13 @@
               <a:t> and </a:t>
             </a:r>
             <a:r>
-              <a:rPr lang="en-US" sz="2800" b="1" dirty="0" err="1" smtClean="0">
+              <a:rPr lang="en-US" sz="2800" b="1" dirty="0" err="1">
                 <a:latin typeface="Arial" panose="020B0604020202020204" pitchFamily="34" charset="0"/>
                 <a:cs typeface="Arial" panose="020B0604020202020204" pitchFamily="34" charset="0"/>
               </a:rPr>
               <a:t>ekasruti</a:t>
             </a:r>
-            <a:endParaRPr lang="en-US" sz="2800" b="1" dirty="0" smtClean="0">
+            <a:endParaRPr lang="en-US" sz="2800" b="1" dirty="0">
               <a:latin typeface="Arial" panose="020B0604020202020204" pitchFamily="34" charset="0"/>
               <a:cs typeface="Arial" panose="020B0604020202020204" pitchFamily="34" charset="0"/>
             </a:endParaRPr>
@@ -15570,13 +15250,6 @@
   <p:clrMapOvr>
     <a:masterClrMapping/>
   </p:clrMapOvr>
-  <p:timing>
-    <p:tnLst>
-      <p:par>
-        <p:cTn id="1" dur="indefinite" restart="never" nodeType="tmRoot"/>
-      </p:par>
-    </p:tnLst>
-  </p:timing>
 </p:sld>
 </file>
 
@@ -15618,10 +15291,9 @@
           <a:lstStyle/>
           <a:p>
             <a:r>
-              <a:rPr lang="en-US" dirty="0" smtClean="0"/>
+              <a:rPr lang="en-US" dirty="0"/>
               <a:t>Flow Order of Swarams in Vedic Statements</a:t>
             </a:r>
-            <a:endParaRPr lang="en-US" dirty="0"/>
           </a:p>
         </p:txBody>
       </p:sp>
@@ -15648,20 +15320,20 @@
           <a:lstStyle/>
           <a:p>
             <a:r>
-              <a:rPr lang="en-US" sz="2800" b="1" dirty="0" smtClean="0">
+              <a:rPr lang="en-US" sz="2800" b="1" dirty="0">
                 <a:latin typeface="Arial" panose="020B0604020202020204" pitchFamily="34" charset="0"/>
                 <a:cs typeface="Arial" panose="020B0604020202020204" pitchFamily="34" charset="0"/>
               </a:rPr>
               <a:t>Starting letters can be pracaya/</a:t>
             </a:r>
             <a:r>
-              <a:rPr lang="en-US" sz="2800" b="1" dirty="0" err="1" smtClean="0">
+              <a:rPr lang="en-US" sz="2800" b="1" dirty="0" err="1">
                 <a:latin typeface="Arial" panose="020B0604020202020204" pitchFamily="34" charset="0"/>
                 <a:cs typeface="Arial" panose="020B0604020202020204" pitchFamily="34" charset="0"/>
               </a:rPr>
               <a:t>sannatara</a:t>
             </a:r>
-            <a:endParaRPr lang="en-US" sz="2800" b="1" dirty="0" smtClean="0">
+            <a:endParaRPr lang="en-US" sz="2800" b="1" dirty="0">
               <a:latin typeface="Arial" panose="020B0604020202020204" pitchFamily="34" charset="0"/>
               <a:cs typeface="Arial" panose="020B0604020202020204" pitchFamily="34" charset="0"/>
             </a:endParaRPr>
@@ -15669,7 +15341,7 @@
           <a:p>
             <a:pPr lvl="1"/>
             <a:r>
-              <a:rPr lang="en-US" sz="2600" b="1" dirty="0" smtClean="0">
+              <a:rPr lang="en-US" sz="2600" b="1" dirty="0">
                 <a:latin typeface="Arial" panose="020B0604020202020204" pitchFamily="34" charset="0"/>
                 <a:cs typeface="Arial" panose="020B0604020202020204" pitchFamily="34" charset="0"/>
               </a:rPr>
@@ -15679,115 +15351,111 @@
           <a:p>
             <a:pPr lvl="1"/>
             <a:r>
-              <a:rPr lang="en-US" sz="2400" b="1" dirty="0" smtClean="0">
+              <a:rPr lang="en-US" sz="2400" b="1" dirty="0">
                 <a:latin typeface="Arial" panose="020B0604020202020204" pitchFamily="34" charset="0"/>
                 <a:cs typeface="Arial" panose="020B0604020202020204" pitchFamily="34" charset="0"/>
               </a:rPr>
               <a:t>pracaya/</a:t>
             </a:r>
             <a:r>
-              <a:rPr lang="en-US" sz="2400" b="1" dirty="0" err="1" smtClean="0">
+              <a:rPr lang="en-US" sz="2400" b="1" dirty="0" err="1">
                 <a:latin typeface="Arial" panose="020B0604020202020204" pitchFamily="34" charset="0"/>
                 <a:cs typeface="Arial" panose="020B0604020202020204" pitchFamily="34" charset="0"/>
               </a:rPr>
               <a:t>sannatara</a:t>
             </a:r>
             <a:r>
-              <a:rPr lang="en-US" sz="2400" b="1" dirty="0" smtClean="0">
+              <a:rPr lang="en-US" sz="2400" b="1" dirty="0">
                 <a:latin typeface="Arial" panose="020B0604020202020204" pitchFamily="34" charset="0"/>
                 <a:cs typeface="Arial" panose="020B0604020202020204" pitchFamily="34" charset="0"/>
               </a:rPr>
               <a:t> , udAttam Swaritam</a:t>
             </a:r>
-            <a:endParaRPr lang="en-US" sz="2400" b="1" dirty="0">
+          </a:p>
+          <a:p>
+            <a:r>
+              <a:rPr lang="en-US" sz="2800" b="1" dirty="0">
+                <a:latin typeface="Arial" panose="020B0604020202020204" pitchFamily="34" charset="0"/>
+                <a:cs typeface="Arial" panose="020B0604020202020204" pitchFamily="34" charset="0"/>
+              </a:rPr>
+              <a:t>Starting letter is anudAttam (because of next udAttam </a:t>
+            </a:r>
+          </a:p>
+          <a:p>
+            <a:pPr lvl="1"/>
+            <a:r>
+              <a:rPr lang="en-US" sz="2600" b="1" dirty="0">
+                <a:latin typeface="Arial" panose="020B0604020202020204" pitchFamily="34" charset="0"/>
+                <a:cs typeface="Arial" panose="020B0604020202020204" pitchFamily="34" charset="0"/>
+              </a:rPr>
+              <a:t>anudAttam, </a:t>
+            </a:r>
+            <a:r>
+              <a:rPr lang="en-US" sz="2600" b="1" dirty="0" err="1">
+                <a:latin typeface="Arial" panose="020B0604020202020204" pitchFamily="34" charset="0"/>
+                <a:cs typeface="Arial" panose="020B0604020202020204" pitchFamily="34" charset="0"/>
+              </a:rPr>
+              <a:t>udAttam,Swaritam</a:t>
+            </a:r>
+            <a:r>
+              <a:rPr lang="en-US" sz="2600" b="1" dirty="0">
+                <a:latin typeface="Arial" panose="020B0604020202020204" pitchFamily="34" charset="0"/>
+                <a:cs typeface="Arial" panose="020B0604020202020204" pitchFamily="34" charset="0"/>
+              </a:rPr>
+              <a:t>, </a:t>
+            </a:r>
+            <a:r>
+              <a:rPr lang="en-US" sz="2600" b="1" dirty="0" err="1">
+                <a:latin typeface="Arial" panose="020B0604020202020204" pitchFamily="34" charset="0"/>
+                <a:cs typeface="Arial" panose="020B0604020202020204" pitchFamily="34" charset="0"/>
+              </a:rPr>
+              <a:t>EkaSruti</a:t>
+            </a:r>
+            <a:endParaRPr lang="en-US" sz="2600" b="1" dirty="0">
               <a:latin typeface="Arial" panose="020B0604020202020204" pitchFamily="34" charset="0"/>
               <a:cs typeface="Arial" panose="020B0604020202020204" pitchFamily="34" charset="0"/>
             </a:endParaRPr>
           </a:p>
           <a:p>
             <a:r>
-              <a:rPr lang="en-US" sz="2800" b="1" dirty="0" smtClean="0">
-                <a:latin typeface="Arial" panose="020B0604020202020204" pitchFamily="34" charset="0"/>
-                <a:cs typeface="Arial" panose="020B0604020202020204" pitchFamily="34" charset="0"/>
-              </a:rPr>
-              <a:t>Starting letter is anudAttam (because of next udAttam </a:t>
+              <a:rPr lang="en-US" sz="2800" b="1" dirty="0">
+                <a:latin typeface="Arial" panose="020B0604020202020204" pitchFamily="34" charset="0"/>
+                <a:cs typeface="Arial" panose="020B0604020202020204" pitchFamily="34" charset="0"/>
+              </a:rPr>
+              <a:t>Starting letter is udAttam</a:t>
             </a:r>
           </a:p>
           <a:p>
             <a:pPr lvl="1"/>
             <a:r>
-              <a:rPr lang="en-US" sz="2600" b="1" dirty="0" smtClean="0">
-                <a:latin typeface="Arial" panose="020B0604020202020204" pitchFamily="34" charset="0"/>
-                <a:cs typeface="Arial" panose="020B0604020202020204" pitchFamily="34" charset="0"/>
-              </a:rPr>
-              <a:t>anudAttam, </a:t>
-            </a:r>
-            <a:r>
-              <a:rPr lang="en-US" sz="2600" b="1" dirty="0" err="1" smtClean="0">
+              <a:rPr lang="en-US" sz="2600" b="1" dirty="0" err="1">
                 <a:latin typeface="Arial" panose="020B0604020202020204" pitchFamily="34" charset="0"/>
                 <a:cs typeface="Arial" panose="020B0604020202020204" pitchFamily="34" charset="0"/>
               </a:rPr>
               <a:t>udAttam,Swaritam</a:t>
             </a:r>
             <a:r>
-              <a:rPr lang="en-US" sz="2600" b="1" dirty="0" smtClean="0">
+              <a:rPr lang="en-US" sz="2600" b="1" dirty="0">
                 <a:latin typeface="Arial" panose="020B0604020202020204" pitchFamily="34" charset="0"/>
                 <a:cs typeface="Arial" panose="020B0604020202020204" pitchFamily="34" charset="0"/>
               </a:rPr>
               <a:t>, </a:t>
             </a:r>
             <a:r>
-              <a:rPr lang="en-US" sz="2600" b="1" dirty="0" err="1" smtClean="0">
+              <a:rPr lang="en-US" sz="2600" b="1" dirty="0" err="1">
                 <a:latin typeface="Arial" panose="020B0604020202020204" pitchFamily="34" charset="0"/>
                 <a:cs typeface="Arial" panose="020B0604020202020204" pitchFamily="34" charset="0"/>
               </a:rPr>
               <a:t>EkaSruti</a:t>
             </a:r>
-            <a:endParaRPr lang="en-US" sz="2600" b="1" dirty="0" smtClean="0">
+            <a:endParaRPr lang="en-US" sz="2600" b="1" dirty="0">
               <a:latin typeface="Arial" panose="020B0604020202020204" pitchFamily="34" charset="0"/>
               <a:cs typeface="Arial" panose="020B0604020202020204" pitchFamily="34" charset="0"/>
             </a:endParaRPr>
           </a:p>
           <a:p>
-            <a:r>
-              <a:rPr lang="en-US" sz="2800" b="1" dirty="0" smtClean="0">
-                <a:latin typeface="Arial" panose="020B0604020202020204" pitchFamily="34" charset="0"/>
-                <a:cs typeface="Arial" panose="020B0604020202020204" pitchFamily="34" charset="0"/>
-              </a:rPr>
-              <a:t>Starting letter is udAttam</a:t>
-            </a:r>
-          </a:p>
-          <a:p>
             <a:pPr lvl="1"/>
-            <a:r>
-              <a:rPr lang="en-US" sz="2600" b="1" dirty="0" err="1" smtClean="0">
-                <a:latin typeface="Arial" panose="020B0604020202020204" pitchFamily="34" charset="0"/>
-                <a:cs typeface="Arial" panose="020B0604020202020204" pitchFamily="34" charset="0"/>
-              </a:rPr>
-              <a:t>udAttam,Swaritam</a:t>
-            </a:r>
-            <a:r>
-              <a:rPr lang="en-US" sz="2600" b="1" dirty="0" smtClean="0">
-                <a:latin typeface="Arial" panose="020B0604020202020204" pitchFamily="34" charset="0"/>
-                <a:cs typeface="Arial" panose="020B0604020202020204" pitchFamily="34" charset="0"/>
-              </a:rPr>
-              <a:t>, </a:t>
-            </a:r>
-            <a:r>
-              <a:rPr lang="en-US" sz="2600" b="1" dirty="0" err="1" smtClean="0">
-                <a:latin typeface="Arial" panose="020B0604020202020204" pitchFamily="34" charset="0"/>
-                <a:cs typeface="Arial" panose="020B0604020202020204" pitchFamily="34" charset="0"/>
-              </a:rPr>
-              <a:t>EkaSruti</a:t>
-            </a:r>
-            <a:endParaRPr lang="en-US" sz="2600" b="1" dirty="0" smtClean="0">
-              <a:latin typeface="Arial" panose="020B0604020202020204" pitchFamily="34" charset="0"/>
-              <a:cs typeface="Arial" panose="020B0604020202020204" pitchFamily="34" charset="0"/>
-            </a:endParaRPr>
-          </a:p>
-          <a:p>
-            <a:pPr lvl="1"/>
-            <a:endParaRPr lang="en-US" sz="2600" b="1" dirty="0" smtClean="0">
+            <a:endParaRPr lang="en-US" sz="2600" b="1" dirty="0">
               <a:latin typeface="Arial" panose="020B0604020202020204" pitchFamily="34" charset="0"/>
               <a:cs typeface="Arial" panose="020B0604020202020204" pitchFamily="34" charset="0"/>
             </a:endParaRPr>
@@ -15804,13 +15472,6 @@
   <p:clrMapOvr>
     <a:masterClrMapping/>
   </p:clrMapOvr>
-  <p:timing>
-    <p:tnLst>
-      <p:par>
-        <p:cTn id="1" dur="indefinite" restart="never" nodeType="tmRoot"/>
-      </p:par>
-    </p:tnLst>
-  </p:timing>
 </p:sld>
 </file>
 
@@ -15876,7 +15537,7 @@
           <a:lstStyle/>
           <a:p>
             <a:r>
-              <a:rPr lang="en-US" sz="2800" b="1" dirty="0" smtClean="0">
+              <a:rPr lang="en-US" sz="2800" b="1" dirty="0">
                 <a:latin typeface="Arial" panose="020B0604020202020204" pitchFamily="34" charset="0"/>
                 <a:cs typeface="Arial" panose="020B0604020202020204" pitchFamily="34" charset="0"/>
               </a:rPr>
@@ -15890,20 +15551,13 @@
                 <a:latin typeface="Arial" panose="020B0604020202020204" pitchFamily="34" charset="0"/>
                 <a:cs typeface="Arial" panose="020B0604020202020204" pitchFamily="34" charset="0"/>
               </a:rPr>
-              <a:t>u</a:t>
-            </a:r>
-            <a:r>
-              <a:rPr lang="en-US" sz="2600" b="1" dirty="0" smtClean="0">
-                <a:latin typeface="Arial" panose="020B0604020202020204" pitchFamily="34" charset="0"/>
-                <a:cs typeface="Arial" panose="020B0604020202020204" pitchFamily="34" charset="0"/>
-              </a:rPr>
-              <a:t>dAttam, udAttam</a:t>
+              <a:t>udAttam, udAttam</a:t>
             </a:r>
           </a:p>
           <a:p>
             <a:pPr lvl="1"/>
             <a:r>
-              <a:rPr lang="en-US" sz="2600" b="1" dirty="0" smtClean="0">
+              <a:rPr lang="en-US" sz="2600" b="1" dirty="0">
                 <a:latin typeface="Arial" panose="020B0604020202020204" pitchFamily="34" charset="0"/>
                 <a:cs typeface="Arial" panose="020B0604020202020204" pitchFamily="34" charset="0"/>
               </a:rPr>
@@ -15913,7 +15567,7 @@
           <a:p>
             <a:pPr lvl="1"/>
             <a:r>
-              <a:rPr lang="en-US" sz="2600" b="1" dirty="0" smtClean="0">
+              <a:rPr lang="en-US" sz="2600" b="1" dirty="0">
                 <a:latin typeface="Arial" panose="020B0604020202020204" pitchFamily="34" charset="0"/>
                 <a:cs typeface="Arial" panose="020B0604020202020204" pitchFamily="34" charset="0"/>
               </a:rPr>
@@ -15923,7 +15577,7 @@
           <a:p>
             <a:pPr lvl="1"/>
             <a:r>
-              <a:rPr lang="en-US" sz="2600" b="1" dirty="0" smtClean="0">
+              <a:rPr lang="en-US" sz="2600" b="1" dirty="0">
                 <a:latin typeface="Arial" panose="020B0604020202020204" pitchFamily="34" charset="0"/>
                 <a:cs typeface="Arial" panose="020B0604020202020204" pitchFamily="34" charset="0"/>
               </a:rPr>
@@ -15932,7 +15586,7 @@
           </a:p>
           <a:p>
             <a:r>
-              <a:rPr lang="en-US" sz="2800" b="1" dirty="0" smtClean="0">
+              <a:rPr lang="en-US" sz="2800" b="1" dirty="0">
                 <a:latin typeface="Arial" panose="020B0604020202020204" pitchFamily="34" charset="0"/>
                 <a:cs typeface="Arial" panose="020B0604020202020204" pitchFamily="34" charset="0"/>
               </a:rPr>
@@ -15941,16 +15595,12 @@
           </a:p>
           <a:p>
             <a:r>
-              <a:rPr lang="en-US" sz="2800" b="1" dirty="0" smtClean="0">
+              <a:rPr lang="en-US" sz="2800" b="1" dirty="0">
                 <a:latin typeface="Arial" panose="020B0604020202020204" pitchFamily="34" charset="0"/>
                 <a:cs typeface="Arial" panose="020B0604020202020204" pitchFamily="34" charset="0"/>
               </a:rPr>
               <a:t>udAttam, anudAttam, udAttam, anudAttam</a:t>
             </a:r>
-            <a:endParaRPr lang="en-US" sz="2800" b="1" dirty="0">
-              <a:latin typeface="Arial" panose="020B0604020202020204" pitchFamily="34" charset="0"/>
-              <a:cs typeface="Arial" panose="020B0604020202020204" pitchFamily="34" charset="0"/>
-            </a:endParaRPr>
           </a:p>
         </p:txBody>
       </p:sp>
@@ -15964,13 +15614,6 @@
   <p:clrMapOvr>
     <a:masterClrMapping/>
   </p:clrMapOvr>
-  <p:timing>
-    <p:tnLst>
-      <p:par>
-        <p:cTn id="1" dur="indefinite" restart="never" nodeType="tmRoot"/>
-      </p:par>
-    </p:tnLst>
-  </p:timing>
 </p:sld>
 </file>
 
@@ -16034,20 +15677,20 @@
           <a:lstStyle/>
           <a:p>
             <a:r>
-              <a:rPr lang="en-US" sz="2800" b="1" dirty="0" smtClean="0">
+              <a:rPr lang="en-US" sz="2800" b="1" dirty="0">
                 <a:latin typeface="Arial" panose="020B0604020202020204" pitchFamily="34" charset="0"/>
                 <a:cs typeface="Arial" panose="020B0604020202020204" pitchFamily="34" charset="0"/>
               </a:rPr>
               <a:t>udAttam has to be preceded by anudAttam </a:t>
             </a:r>
             <a:br>
-              <a:rPr lang="en-US" sz="2800" b="1" dirty="0" smtClean="0">
+              <a:rPr lang="en-US" sz="2800" b="1" dirty="0">
                 <a:latin typeface="Arial" panose="020B0604020202020204" pitchFamily="34" charset="0"/>
                 <a:cs typeface="Arial" panose="020B0604020202020204" pitchFamily="34" charset="0"/>
               </a:rPr>
             </a:br>
             <a:r>
-              <a:rPr lang="en-US" sz="2800" b="1" dirty="0" smtClean="0">
+              <a:rPr lang="en-US" sz="2800" b="1" dirty="0">
                 <a:latin typeface="Arial" panose="020B0604020202020204" pitchFamily="34" charset="0"/>
                 <a:cs typeface="Arial" panose="020B0604020202020204" pitchFamily="34" charset="0"/>
               </a:rPr>
@@ -16056,21 +15699,21 @@
           </a:p>
           <a:p>
             <a:r>
-              <a:rPr lang="en-US" sz="2800" b="1" dirty="0" smtClean="0">
+              <a:rPr lang="en-US" sz="2800" b="1" dirty="0">
                 <a:latin typeface="Arial" panose="020B0604020202020204" pitchFamily="34" charset="0"/>
                 <a:cs typeface="Arial" panose="020B0604020202020204" pitchFamily="34" charset="0"/>
               </a:rPr>
               <a:t>Many </a:t>
             </a:r>
             <a:r>
-              <a:rPr lang="en-US" sz="2800" b="1" dirty="0" err="1" smtClean="0">
+              <a:rPr lang="en-US" sz="2800" b="1" dirty="0" err="1">
                 <a:latin typeface="Arial" panose="020B0604020202020204" pitchFamily="34" charset="0"/>
                 <a:cs typeface="Arial" panose="020B0604020202020204" pitchFamily="34" charset="0"/>
               </a:rPr>
               <a:t>udAttams</a:t>
             </a:r>
             <a:r>
-              <a:rPr lang="en-US" sz="2800" b="1" dirty="0" smtClean="0">
+              <a:rPr lang="en-US" sz="2800" b="1" dirty="0">
                 <a:latin typeface="Arial" panose="020B0604020202020204" pitchFamily="34" charset="0"/>
                 <a:cs typeface="Arial" panose="020B0604020202020204" pitchFamily="34" charset="0"/>
               </a:rPr>
@@ -16079,7 +15722,7 @@
           </a:p>
           <a:p>
             <a:r>
-              <a:rPr lang="en-US" sz="2800" b="1" dirty="0" smtClean="0">
+              <a:rPr lang="en-US" sz="2800" b="1" dirty="0">
                 <a:latin typeface="Arial" panose="020B0604020202020204" pitchFamily="34" charset="0"/>
                 <a:cs typeface="Arial" panose="020B0604020202020204" pitchFamily="34" charset="0"/>
               </a:rPr>
@@ -16101,13 +15744,6 @@
   <p:clrMapOvr>
     <a:masterClrMapping/>
   </p:clrMapOvr>
-  <p:timing>
-    <p:tnLst>
-      <p:par>
-        <p:cTn id="1" dur="indefinite" restart="never" nodeType="tmRoot"/>
-      </p:par>
-    </p:tnLst>
-  </p:timing>
 </p:sld>
 </file>
 
@@ -16171,7 +15807,7 @@
           <a:lstStyle/>
           <a:p>
             <a:r>
-              <a:rPr lang="en-US" sz="2800" b="1" dirty="0" smtClean="0">
+              <a:rPr lang="en-US" sz="2800" b="1" dirty="0">
                 <a:latin typeface="Arial" panose="020B0604020202020204" pitchFamily="34" charset="0"/>
                 <a:cs typeface="Arial" panose="020B0604020202020204" pitchFamily="34" charset="0"/>
               </a:rPr>
@@ -16181,27 +15817,27 @@
           <a:p>
             <a:pPr lvl="1"/>
             <a:r>
-              <a:rPr lang="en-US" sz="2600" b="1" dirty="0" err="1" smtClean="0">
+              <a:rPr lang="en-US" sz="2600" b="1" dirty="0" err="1">
                 <a:latin typeface="Arial" panose="020B0604020202020204" pitchFamily="34" charset="0"/>
                 <a:cs typeface="Arial" panose="020B0604020202020204" pitchFamily="34" charset="0"/>
               </a:rPr>
               <a:t>EkaSruti</a:t>
             </a:r>
             <a:r>
-              <a:rPr lang="en-US" sz="2600" b="1" dirty="0" smtClean="0">
+              <a:rPr lang="en-US" sz="2600" b="1" dirty="0">
                 <a:latin typeface="Arial" panose="020B0604020202020204" pitchFamily="34" charset="0"/>
                 <a:cs typeface="Arial" panose="020B0604020202020204" pitchFamily="34" charset="0"/>
               </a:rPr>
               <a:t>, Pracaya/</a:t>
             </a:r>
             <a:r>
-              <a:rPr lang="en-US" sz="2600" b="1" dirty="0" err="1" smtClean="0">
+              <a:rPr lang="en-US" sz="2600" b="1" dirty="0" err="1">
                 <a:latin typeface="Arial" panose="020B0604020202020204" pitchFamily="34" charset="0"/>
                 <a:cs typeface="Arial" panose="020B0604020202020204" pitchFamily="34" charset="0"/>
               </a:rPr>
               <a:t>Sannatara</a:t>
             </a:r>
-            <a:endParaRPr lang="en-US" sz="2600" b="1" dirty="0" smtClean="0">
+            <a:endParaRPr lang="en-US" sz="2600" b="1" dirty="0">
               <a:latin typeface="Arial" panose="020B0604020202020204" pitchFamily="34" charset="0"/>
               <a:cs typeface="Arial" panose="020B0604020202020204" pitchFamily="34" charset="0"/>
             </a:endParaRPr>
@@ -16209,27 +15845,27 @@
           <a:p>
             <a:pPr lvl="1"/>
             <a:r>
-              <a:rPr lang="en-US" sz="2600" b="1" dirty="0" err="1" smtClean="0">
+              <a:rPr lang="en-US" sz="2600" b="1" dirty="0" err="1">
                 <a:latin typeface="Arial" panose="020B0604020202020204" pitchFamily="34" charset="0"/>
                 <a:cs typeface="Arial" panose="020B0604020202020204" pitchFamily="34" charset="0"/>
               </a:rPr>
               <a:t>EkaSruti</a:t>
             </a:r>
             <a:r>
-              <a:rPr lang="en-US" sz="2600" b="1" dirty="0" smtClean="0">
+              <a:rPr lang="en-US" sz="2600" b="1" dirty="0">
                 <a:latin typeface="Arial" panose="020B0604020202020204" pitchFamily="34" charset="0"/>
                 <a:cs typeface="Arial" panose="020B0604020202020204" pitchFamily="34" charset="0"/>
               </a:rPr>
               <a:t>, </a:t>
             </a:r>
             <a:r>
-              <a:rPr lang="en-US" sz="2600" b="1" dirty="0" err="1" smtClean="0">
+              <a:rPr lang="en-US" sz="2600" b="1" dirty="0" err="1">
                 <a:latin typeface="Arial" panose="020B0604020202020204" pitchFamily="34" charset="0"/>
                 <a:cs typeface="Arial" panose="020B0604020202020204" pitchFamily="34" charset="0"/>
               </a:rPr>
               <a:t>anudAttam,udAttam</a:t>
             </a:r>
-            <a:endParaRPr lang="en-US" sz="2600" b="1" dirty="0" smtClean="0">
+            <a:endParaRPr lang="en-US" sz="2600" b="1" dirty="0">
               <a:latin typeface="Arial" panose="020B0604020202020204" pitchFamily="34" charset="0"/>
               <a:cs typeface="Arial" panose="020B0604020202020204" pitchFamily="34" charset="0"/>
             </a:endParaRPr>
@@ -16237,13 +15873,13 @@
           <a:p>
             <a:pPr lvl="1"/>
             <a:r>
-              <a:rPr lang="en-US" sz="2600" b="1" dirty="0" err="1" smtClean="0">
+              <a:rPr lang="en-US" sz="2600" b="1" dirty="0" err="1">
                 <a:latin typeface="Arial" panose="020B0604020202020204" pitchFamily="34" charset="0"/>
                 <a:cs typeface="Arial" panose="020B0604020202020204" pitchFamily="34" charset="0"/>
               </a:rPr>
               <a:t>anudAttam,udAttam,Swaritam</a:t>
             </a:r>
-            <a:endParaRPr lang="en-US" sz="2600" b="1" dirty="0" smtClean="0">
+            <a:endParaRPr lang="en-US" sz="2600" b="1" dirty="0">
               <a:latin typeface="Arial" panose="020B0604020202020204" pitchFamily="34" charset="0"/>
               <a:cs typeface="Arial" panose="020B0604020202020204" pitchFamily="34" charset="0"/>
             </a:endParaRPr>
@@ -16251,32 +15887,18 @@
           <a:p>
             <a:pPr lvl="1"/>
             <a:r>
-              <a:rPr lang="en-US" sz="2600" b="1" dirty="0" err="1" smtClean="0">
+              <a:rPr lang="en-US" sz="2600" b="1" dirty="0" err="1">
                 <a:latin typeface="Arial" panose="020B0604020202020204" pitchFamily="34" charset="0"/>
                 <a:cs typeface="Arial" panose="020B0604020202020204" pitchFamily="34" charset="0"/>
               </a:rPr>
               <a:t>udAttam,Swaritam</a:t>
             </a:r>
             <a:r>
-              <a:rPr lang="en-US" sz="2600" b="1" dirty="0" smtClean="0">
-                <a:latin typeface="Arial" panose="020B0604020202020204" pitchFamily="34" charset="0"/>
-                <a:cs typeface="Arial" panose="020B0604020202020204" pitchFamily="34" charset="0"/>
-              </a:rPr>
-              <a:t> – due to </a:t>
-            </a:r>
-            <a:r>
               <a:rPr lang="en-US" sz="2600" b="1" dirty="0">
                 <a:latin typeface="Arial" panose="020B0604020202020204" pitchFamily="34" charset="0"/>
                 <a:cs typeface="Arial" panose="020B0604020202020204" pitchFamily="34" charset="0"/>
               </a:rPr>
-              <a:t>S</a:t>
-            </a:r>
-            <a:r>
-              <a:rPr lang="en-US" sz="2600" b="1" dirty="0" smtClean="0">
-                <a:latin typeface="Arial" panose="020B0604020202020204" pitchFamily="34" charset="0"/>
-                <a:cs typeface="Arial" panose="020B0604020202020204" pitchFamily="34" charset="0"/>
-              </a:rPr>
-              <a:t>andhi rules</a:t>
+              <a:t> – due to Sandhi rules</a:t>
             </a:r>
           </a:p>
           <a:p>
@@ -16294,13 +15916,6 @@
   <p:clrMapOvr>
     <a:masterClrMapping/>
   </p:clrMapOvr>
-  <p:timing>
-    <p:tnLst>
-      <p:par>
-        <p:cTn id="1" dur="indefinite" restart="never" nodeType="tmRoot"/>
-      </p:par>
-    </p:tnLst>
-  </p:timing>
 </p:sld>
 </file>
 

</xml_diff>